<commit_message>
Working on Word2Vec illustrations
</commit_message>
<xml_diff>
--- a/assets/word2vec/Word2Vec_Illustrations.pptx
+++ b/assets/word2vec/Word2Vec_Illustrations.pptx
@@ -8,6 +8,7 @@
     <p:sldId id="256" r:id="rId2"/>
     <p:sldId id="257" r:id="rId3"/>
     <p:sldId id="258" r:id="rId4"/>
+    <p:sldId id="259" r:id="rId5"/>
   </p:sldIdLst>
   <p:sldSz cx="12192000" cy="6858000"/>
   <p:notesSz cx="6858000" cy="9144000"/>
@@ -2979,7 +2980,7 @@
         </p:nvSpPr>
         <p:spPr>
           <a:xfrm>
-            <a:off x="2145313" y="1908902"/>
+            <a:off x="2606421" y="2471609"/>
             <a:ext cx="228600" cy="228600"/>
           </a:xfrm>
           <a:prstGeom prst="rect">
@@ -3032,7 +3033,7 @@
         </p:nvSpPr>
         <p:spPr>
           <a:xfrm>
-            <a:off x="2145313" y="2137502"/>
+            <a:off x="2606421" y="2700209"/>
             <a:ext cx="228600" cy="228600"/>
           </a:xfrm>
           <a:prstGeom prst="rect">
@@ -3085,7 +3086,7 @@
         </p:nvSpPr>
         <p:spPr>
           <a:xfrm>
-            <a:off x="2145313" y="2366102"/>
+            <a:off x="2606421" y="2928809"/>
             <a:ext cx="228600" cy="228600"/>
           </a:xfrm>
           <a:prstGeom prst="rect">
@@ -3138,7 +3139,7 @@
         </p:nvSpPr>
         <p:spPr>
           <a:xfrm>
-            <a:off x="2145313" y="2594702"/>
+            <a:off x="2606421" y="3157409"/>
             <a:ext cx="228600" cy="228600"/>
           </a:xfrm>
           <a:prstGeom prst="rect">
@@ -3191,7 +3192,7 @@
         </p:nvSpPr>
         <p:spPr>
           <a:xfrm>
-            <a:off x="2145313" y="2823302"/>
+            <a:off x="2606421" y="3386009"/>
             <a:ext cx="228600" cy="228600"/>
           </a:xfrm>
           <a:prstGeom prst="rect">
@@ -3244,7 +3245,7 @@
         </p:nvSpPr>
         <p:spPr>
           <a:xfrm>
-            <a:off x="2145313" y="3051902"/>
+            <a:off x="2606421" y="3614609"/>
             <a:ext cx="228600" cy="228600"/>
           </a:xfrm>
           <a:prstGeom prst="rect">
@@ -3297,7 +3298,7 @@
         </p:nvSpPr>
         <p:spPr>
           <a:xfrm>
-            <a:off x="2145313" y="3280502"/>
+            <a:off x="2606421" y="3843209"/>
             <a:ext cx="228600" cy="228600"/>
           </a:xfrm>
           <a:prstGeom prst="rect">
@@ -3350,7 +3351,7 @@
         </p:nvSpPr>
         <p:spPr>
           <a:xfrm>
-            <a:off x="2145313" y="3509102"/>
+            <a:off x="2606421" y="4071809"/>
             <a:ext cx="228600" cy="228600"/>
           </a:xfrm>
           <a:prstGeom prst="rect">
@@ -3402,7 +3403,7 @@
         </p:nvSpPr>
         <p:spPr>
           <a:xfrm>
-            <a:off x="2145313" y="3737702"/>
+            <a:off x="2606421" y="4300409"/>
             <a:ext cx="228600" cy="228600"/>
           </a:xfrm>
           <a:prstGeom prst="rect">
@@ -3455,7 +3456,7 @@
         </p:nvSpPr>
         <p:spPr>
           <a:xfrm>
-            <a:off x="2145313" y="3966302"/>
+            <a:off x="2606421" y="4529009"/>
             <a:ext cx="228600" cy="228600"/>
           </a:xfrm>
           <a:prstGeom prst="rect">
@@ -3508,7 +3509,7 @@
         </p:nvSpPr>
         <p:spPr>
           <a:xfrm>
-            <a:off x="2145313" y="4575902"/>
+            <a:off x="2606421" y="5138609"/>
             <a:ext cx="228600" cy="228600"/>
           </a:xfrm>
           <a:prstGeom prst="rect">
@@ -3561,7 +3562,7 @@
         </p:nvCxnSpPr>
         <p:spPr>
           <a:xfrm>
-            <a:off x="2259612" y="4263287"/>
+            <a:off x="2720720" y="4825994"/>
             <a:ext cx="1" cy="266700"/>
           </a:xfrm>
           <a:prstGeom prst="line">
@@ -3594,7 +3595,7 @@
         </p:nvSpPr>
         <p:spPr>
           <a:xfrm>
-            <a:off x="1611913" y="1387170"/>
+            <a:off x="2073021" y="1949877"/>
             <a:ext cx="1524000" cy="369332"/>
           </a:xfrm>
           <a:prstGeom prst="rect">
@@ -3624,7 +3625,7 @@
         </p:nvSpPr>
         <p:spPr>
           <a:xfrm>
-            <a:off x="1790688" y="4921733"/>
+            <a:off x="2251796" y="5484440"/>
             <a:ext cx="937847" cy="415498"/>
           </a:xfrm>
           <a:prstGeom prst="rect">
@@ -3662,7 +3663,7 @@
         </p:nvSpPr>
         <p:spPr>
           <a:xfrm>
-            <a:off x="568561" y="3357065"/>
+            <a:off x="1029669" y="3919772"/>
             <a:ext cx="1352061" cy="553998"/>
           </a:xfrm>
           <a:prstGeom prst="rect">
@@ -3692,7 +3693,7 @@
         </p:nvSpPr>
         <p:spPr>
           <a:xfrm>
-            <a:off x="4307041" y="2702170"/>
+            <a:off x="4768149" y="3264877"/>
             <a:ext cx="825572" cy="825572"/>
           </a:xfrm>
           <a:prstGeom prst="ellipse">
@@ -3738,7 +3739,7 @@
         </p:nvSpPr>
         <p:spPr>
           <a:xfrm>
-            <a:off x="4500857" y="2785969"/>
+            <a:off x="4961965" y="3348676"/>
             <a:ext cx="437940" cy="646331"/>
           </a:xfrm>
           <a:prstGeom prst="rect">
@@ -3771,7 +3772,7 @@
         </p:nvCxnSpPr>
         <p:spPr>
           <a:xfrm>
-            <a:off x="4719827" y="3700369"/>
+            <a:off x="5180935" y="4263076"/>
             <a:ext cx="0" cy="486000"/>
           </a:xfrm>
           <a:prstGeom prst="line">
@@ -3804,7 +3805,7 @@
         </p:nvSpPr>
         <p:spPr>
           <a:xfrm>
-            <a:off x="4307041" y="4316386"/>
+            <a:off x="4768149" y="4879093"/>
             <a:ext cx="825572" cy="825572"/>
           </a:xfrm>
           <a:prstGeom prst="ellipse">
@@ -3850,7 +3851,7 @@
         </p:nvSpPr>
         <p:spPr>
           <a:xfrm>
-            <a:off x="4500857" y="4425638"/>
+            <a:off x="4961965" y="4988345"/>
             <a:ext cx="437940" cy="646331"/>
           </a:xfrm>
           <a:prstGeom prst="rect">
@@ -3883,7 +3884,7 @@
         </p:nvSpPr>
         <p:spPr>
           <a:xfrm>
-            <a:off x="4307041" y="1566075"/>
+            <a:off x="4768149" y="2128782"/>
             <a:ext cx="825572" cy="825572"/>
           </a:xfrm>
           <a:prstGeom prst="ellipse">
@@ -3929,7 +3930,7 @@
         </p:nvSpPr>
         <p:spPr>
           <a:xfrm>
-            <a:off x="4500857" y="1649874"/>
+            <a:off x="4961965" y="2212581"/>
             <a:ext cx="437940" cy="646331"/>
           </a:xfrm>
           <a:prstGeom prst="rect">
@@ -3962,7 +3963,7 @@
         </p:nvSpPr>
         <p:spPr>
           <a:xfrm>
-            <a:off x="3957827" y="782776"/>
+            <a:off x="4418935" y="1345483"/>
             <a:ext cx="1524000" cy="646331"/>
           </a:xfrm>
           <a:prstGeom prst="rect">
@@ -3993,7 +3994,7 @@
         </p:nvSpPr>
         <p:spPr>
           <a:xfrm>
-            <a:off x="4250903" y="5277752"/>
+            <a:off x="4712011" y="5840459"/>
             <a:ext cx="937847" cy="253916"/>
           </a:xfrm>
           <a:prstGeom prst="rect">
@@ -4024,7 +4025,7 @@
         </p:nvCxnSpPr>
         <p:spPr>
           <a:xfrm flipV="1">
-            <a:off x="2517522" y="2092018"/>
+            <a:off x="2978630" y="2654725"/>
             <a:ext cx="1663701" cy="954589"/>
           </a:xfrm>
           <a:prstGeom prst="straightConnector1">
@@ -4057,7 +4058,7 @@
         </p:nvCxnSpPr>
         <p:spPr>
           <a:xfrm>
-            <a:off x="2517522" y="3274082"/>
+            <a:off x="2978630" y="3836789"/>
             <a:ext cx="1663701" cy="1104488"/>
           </a:xfrm>
           <a:prstGeom prst="straightConnector1">
@@ -4090,7 +4091,7 @@
         </p:nvCxnSpPr>
         <p:spPr>
           <a:xfrm>
-            <a:off x="2517522" y="3149597"/>
+            <a:off x="2978630" y="3712304"/>
             <a:ext cx="1663701" cy="0"/>
           </a:xfrm>
           <a:prstGeom prst="straightConnector1">
@@ -4123,7 +4124,7 @@
         </p:nvSpPr>
         <p:spPr>
           <a:xfrm>
-            <a:off x="6984966" y="2059570"/>
+            <a:off x="7446074" y="2622277"/>
             <a:ext cx="825572" cy="825572"/>
           </a:xfrm>
           <a:prstGeom prst="ellipse">
@@ -4169,7 +4170,7 @@
         </p:nvSpPr>
         <p:spPr>
           <a:xfrm>
-            <a:off x="7178782" y="2143369"/>
+            <a:off x="7639890" y="2706076"/>
             <a:ext cx="437940" cy="646331"/>
           </a:xfrm>
           <a:prstGeom prst="rect">
@@ -4202,7 +4203,7 @@
         </p:nvCxnSpPr>
         <p:spPr>
           <a:xfrm>
-            <a:off x="7397752" y="3057769"/>
+            <a:off x="7858860" y="3620476"/>
             <a:ext cx="0" cy="486000"/>
           </a:xfrm>
           <a:prstGeom prst="line">
@@ -4238,7 +4239,7 @@
         </p:nvCxnSpPr>
         <p:spPr>
           <a:xfrm>
-            <a:off x="5132613" y="1978861"/>
+            <a:off x="5593721" y="2541568"/>
             <a:ext cx="1852353" cy="493495"/>
           </a:xfrm>
           <a:prstGeom prst="straightConnector1">
@@ -4274,7 +4275,7 @@
         </p:nvCxnSpPr>
         <p:spPr>
           <a:xfrm>
-            <a:off x="5132613" y="1978861"/>
+            <a:off x="5593721" y="2541568"/>
             <a:ext cx="1852353" cy="2107711"/>
           </a:xfrm>
           <a:prstGeom prst="straightConnector1">
@@ -4310,7 +4311,7 @@
         </p:nvCxnSpPr>
         <p:spPr>
           <a:xfrm flipV="1">
-            <a:off x="5132613" y="2472356"/>
+            <a:off x="5593721" y="3035063"/>
             <a:ext cx="1852353" cy="642600"/>
           </a:xfrm>
           <a:prstGeom prst="straightConnector1">
@@ -4346,7 +4347,7 @@
         </p:nvCxnSpPr>
         <p:spPr>
           <a:xfrm flipV="1">
-            <a:off x="5132613" y="2472356"/>
+            <a:off x="5593721" y="3035063"/>
             <a:ext cx="1852353" cy="2256816"/>
           </a:xfrm>
           <a:prstGeom prst="straightConnector1">
@@ -4382,7 +4383,7 @@
         </p:nvCxnSpPr>
         <p:spPr>
           <a:xfrm flipV="1">
-            <a:off x="5132613" y="4086572"/>
+            <a:off x="5593721" y="4649279"/>
             <a:ext cx="1852353" cy="642600"/>
           </a:xfrm>
           <a:prstGeom prst="straightConnector1">
@@ -4415,7 +4416,7 @@
         </p:nvCxnSpPr>
         <p:spPr>
           <a:xfrm>
-            <a:off x="7934572" y="2472356"/>
+            <a:off x="8395680" y="3035063"/>
             <a:ext cx="304800" cy="0"/>
           </a:xfrm>
           <a:prstGeom prst="straightConnector1">
@@ -4451,7 +4452,7 @@
         </p:nvCxnSpPr>
         <p:spPr>
           <a:xfrm>
-            <a:off x="5132613" y="3114956"/>
+            <a:off x="5593721" y="3677663"/>
             <a:ext cx="1852353" cy="971616"/>
           </a:xfrm>
           <a:prstGeom prst="straightConnector1">
@@ -4484,7 +4485,7 @@
         </p:nvSpPr>
         <p:spPr>
           <a:xfrm>
-            <a:off x="6984966" y="3673786"/>
+            <a:off x="7446074" y="4236493"/>
             <a:ext cx="825572" cy="825572"/>
           </a:xfrm>
           <a:prstGeom prst="ellipse">
@@ -4530,7 +4531,7 @@
         </p:nvSpPr>
         <p:spPr>
           <a:xfrm>
-            <a:off x="6769102" y="1316837"/>
+            <a:off x="7230210" y="1879544"/>
             <a:ext cx="1257300" cy="646331"/>
           </a:xfrm>
           <a:prstGeom prst="rect">
@@ -4561,7 +4562,7 @@
         </p:nvSpPr>
         <p:spPr>
           <a:xfrm>
-            <a:off x="7178782" y="3767408"/>
+            <a:off x="7639890" y="4330115"/>
             <a:ext cx="437940" cy="646331"/>
           </a:xfrm>
           <a:prstGeom prst="rect">
@@ -4594,7 +4595,7 @@
         </p:nvSpPr>
         <p:spPr>
           <a:xfrm>
-            <a:off x="9411459" y="2059828"/>
+            <a:off x="9872567" y="2622535"/>
             <a:ext cx="1462631" cy="461665"/>
           </a:xfrm>
           <a:prstGeom prst="rect">
@@ -4628,7 +4629,7 @@
         </p:nvCxnSpPr>
         <p:spPr>
           <a:xfrm>
-            <a:off x="7950202" y="4086572"/>
+            <a:off x="8411310" y="4649279"/>
             <a:ext cx="304800" cy="0"/>
           </a:xfrm>
           <a:prstGeom prst="straightConnector1">
@@ -4661,7 +4662,7 @@
         </p:nvSpPr>
         <p:spPr>
           <a:xfrm>
-            <a:off x="8464558" y="1553371"/>
+            <a:off x="8925666" y="2116078"/>
             <a:ext cx="583222" cy="228600"/>
           </a:xfrm>
           <a:prstGeom prst="rect">
@@ -4714,7 +4715,7 @@
         </p:nvSpPr>
         <p:spPr>
           <a:xfrm>
-            <a:off x="8287245" y="3108474"/>
+            <a:off x="8748353" y="3671181"/>
             <a:ext cx="937847" cy="415498"/>
           </a:xfrm>
           <a:prstGeom prst="rect">
@@ -4752,7 +4753,7 @@
         </p:nvSpPr>
         <p:spPr>
           <a:xfrm>
-            <a:off x="8464558" y="1779465"/>
+            <a:off x="8925666" y="2342172"/>
             <a:ext cx="583222" cy="228600"/>
           </a:xfrm>
           <a:prstGeom prst="rect">
@@ -4805,7 +4806,7 @@
         </p:nvSpPr>
         <p:spPr>
           <a:xfrm>
-            <a:off x="8464558" y="2005559"/>
+            <a:off x="8925666" y="2568266"/>
             <a:ext cx="583222" cy="228600"/>
           </a:xfrm>
           <a:prstGeom prst="rect">
@@ -4858,7 +4859,7 @@
         </p:nvSpPr>
         <p:spPr>
           <a:xfrm>
-            <a:off x="8464558" y="2231652"/>
+            <a:off x="8925666" y="2794359"/>
             <a:ext cx="583222" cy="228600"/>
           </a:xfrm>
           <a:prstGeom prst="rect">
@@ -4911,7 +4912,7 @@
         </p:nvSpPr>
         <p:spPr>
           <a:xfrm>
-            <a:off x="8469300" y="2845691"/>
+            <a:off x="8930408" y="3408398"/>
             <a:ext cx="583222" cy="228600"/>
           </a:xfrm>
           <a:prstGeom prst="rect">
@@ -4964,7 +4965,7 @@
         </p:nvCxnSpPr>
         <p:spPr>
           <a:xfrm>
-            <a:off x="8758470" y="2520717"/>
+            <a:off x="9219578" y="3083424"/>
             <a:ext cx="1" cy="266700"/>
           </a:xfrm>
           <a:prstGeom prst="line">
@@ -4997,7 +4998,7 @@
         </p:nvSpPr>
         <p:spPr>
           <a:xfrm>
-            <a:off x="6928829" y="4654078"/>
+            <a:off x="7389937" y="5216785"/>
             <a:ext cx="937847" cy="253916"/>
           </a:xfrm>
           <a:prstGeom prst="rect">
@@ -5032,7 +5033,7 @@
         </p:nvSpPr>
         <p:spPr>
           <a:xfrm>
-            <a:off x="9158611" y="1532709"/>
+            <a:off x="9619719" y="2095416"/>
             <a:ext cx="176875" cy="1548110"/>
           </a:xfrm>
           <a:prstGeom prst="rightBrace">
@@ -5073,7 +5074,7 @@
         </p:nvSpPr>
         <p:spPr>
           <a:xfrm>
-            <a:off x="9427089" y="4317103"/>
+            <a:off x="9888197" y="4879810"/>
             <a:ext cx="1395996" cy="461665"/>
           </a:xfrm>
           <a:prstGeom prst="rect">
@@ -5107,7 +5108,7 @@
         </p:nvSpPr>
         <p:spPr>
           <a:xfrm>
-            <a:off x="8480188" y="3810646"/>
+            <a:off x="8941296" y="4373353"/>
             <a:ext cx="583222" cy="228600"/>
           </a:xfrm>
           <a:prstGeom prst="rect">
@@ -5160,7 +5161,7 @@
         </p:nvSpPr>
         <p:spPr>
           <a:xfrm>
-            <a:off x="8302875" y="5365749"/>
+            <a:off x="8763983" y="5928456"/>
             <a:ext cx="937847" cy="415498"/>
           </a:xfrm>
           <a:prstGeom prst="rect">
@@ -5198,7 +5199,7 @@
         </p:nvSpPr>
         <p:spPr>
           <a:xfrm>
-            <a:off x="8480188" y="4036740"/>
+            <a:off x="8941296" y="4599447"/>
             <a:ext cx="583222" cy="228600"/>
           </a:xfrm>
           <a:prstGeom prst="rect">
@@ -5251,7 +5252,7 @@
         </p:nvSpPr>
         <p:spPr>
           <a:xfrm>
-            <a:off x="8480188" y="4262834"/>
+            <a:off x="8941296" y="4825541"/>
             <a:ext cx="583222" cy="228600"/>
           </a:xfrm>
           <a:prstGeom prst="rect">
@@ -5304,7 +5305,7 @@
         </p:nvSpPr>
         <p:spPr>
           <a:xfrm>
-            <a:off x="8480188" y="4488927"/>
+            <a:off x="8941296" y="5051634"/>
             <a:ext cx="583222" cy="228600"/>
           </a:xfrm>
           <a:prstGeom prst="rect">
@@ -5357,7 +5358,7 @@
         </p:nvSpPr>
         <p:spPr>
           <a:xfrm>
-            <a:off x="8484930" y="5102966"/>
+            <a:off x="8946038" y="5665673"/>
             <a:ext cx="583222" cy="228600"/>
           </a:xfrm>
           <a:prstGeom prst="rect">
@@ -5410,7 +5411,7 @@
         </p:nvCxnSpPr>
         <p:spPr>
           <a:xfrm>
-            <a:off x="8774100" y="4777992"/>
+            <a:off x="9235208" y="5340699"/>
             <a:ext cx="1" cy="266700"/>
           </a:xfrm>
           <a:prstGeom prst="line">
@@ -5443,7 +5444,7 @@
         </p:nvSpPr>
         <p:spPr>
           <a:xfrm>
-            <a:off x="9174241" y="3789984"/>
+            <a:off x="9635349" y="4352691"/>
             <a:ext cx="176875" cy="1548110"/>
           </a:xfrm>
           <a:prstGeom prst="rightBrace">
@@ -5484,7 +5485,7 @@
         </p:nvCxnSpPr>
         <p:spPr>
           <a:xfrm>
-            <a:off x="1814144" y="3622726"/>
+            <a:off x="2275252" y="4185433"/>
             <a:ext cx="251055" cy="0"/>
           </a:xfrm>
           <a:prstGeom prst="straightConnector1">
@@ -5509,6 +5510,36 @@
           </a:fontRef>
         </p:style>
       </p:cxnSp>
+      <p:sp>
+        <p:nvSpPr>
+          <p:cNvPr id="64" name="TextBox 63"/>
+          <p:cNvSpPr txBox="1"/>
+          <p:nvPr/>
+        </p:nvSpPr>
+        <p:spPr>
+          <a:xfrm>
+            <a:off x="262596" y="118396"/>
+            <a:ext cx="7354642" cy="646331"/>
+          </a:xfrm>
+          <a:prstGeom prst="rect">
+            <a:avLst/>
+          </a:prstGeom>
+          <a:noFill/>
+        </p:spPr>
+        <p:txBody>
+          <a:bodyPr wrap="none" rtlCol="0">
+            <a:spAutoFit/>
+          </a:bodyPr>
+          <a:lstStyle/>
+          <a:p>
+            <a:r>
+              <a:rPr lang="en-US" sz="3600" dirty="0" smtClean="0"/>
+              <a:t>Skip gram neural network architecture</a:t>
+            </a:r>
+            <a:endParaRPr lang="en-US" sz="3600" dirty="0"/>
+          </a:p>
+        </p:txBody>
+      </p:sp>
     </p:spTree>
     <p:extLst>
       <p:ext uri="{BB962C8B-B14F-4D97-AF65-F5344CB8AC3E}">
@@ -5547,7 +5578,7 @@
         </p:nvSpPr>
         <p:spPr>
           <a:xfrm rot="16200000">
-            <a:off x="1402364" y="2824303"/>
+            <a:off x="2065304" y="3776803"/>
             <a:ext cx="1139736" cy="276999"/>
           </a:xfrm>
           <a:prstGeom prst="rect">
@@ -5577,7 +5608,7 @@
         </p:nvSpPr>
         <p:spPr>
           <a:xfrm>
-            <a:off x="2323862" y="1219414"/>
+            <a:off x="2986802" y="2171914"/>
             <a:ext cx="1036566" cy="276999"/>
           </a:xfrm>
           <a:prstGeom prst="rect">
@@ -5607,7 +5638,7 @@
         </p:nvSpPr>
         <p:spPr>
           <a:xfrm>
-            <a:off x="4916365" y="1473200"/>
+            <a:off x="5579305" y="2425700"/>
             <a:ext cx="1500557" cy="113323"/>
           </a:xfrm>
           <a:prstGeom prst="rect">
@@ -5647,7 +5678,7 @@
         </p:nvSpPr>
         <p:spPr>
           <a:xfrm>
-            <a:off x="4916365" y="1586070"/>
+            <a:off x="5579305" y="2538570"/>
             <a:ext cx="1500557" cy="113323"/>
           </a:xfrm>
           <a:prstGeom prst="rect">
@@ -5687,7 +5718,7 @@
         </p:nvSpPr>
         <p:spPr>
           <a:xfrm>
-            <a:off x="4916365" y="1698940"/>
+            <a:off x="5579305" y="2651440"/>
             <a:ext cx="1500557" cy="113323"/>
           </a:xfrm>
           <a:prstGeom prst="rect">
@@ -5727,7 +5758,7 @@
         </p:nvSpPr>
         <p:spPr>
           <a:xfrm>
-            <a:off x="4917830" y="1811810"/>
+            <a:off x="5580770" y="2764310"/>
             <a:ext cx="1500557" cy="113323"/>
           </a:xfrm>
           <a:prstGeom prst="rect">
@@ -5767,7 +5798,7 @@
         </p:nvSpPr>
         <p:spPr>
           <a:xfrm>
-            <a:off x="4917830" y="1924680"/>
+            <a:off x="5580770" y="2877180"/>
             <a:ext cx="1500557" cy="113323"/>
           </a:xfrm>
           <a:prstGeom prst="rect">
@@ -5807,7 +5838,7 @@
         </p:nvSpPr>
         <p:spPr>
           <a:xfrm>
-            <a:off x="4917830" y="2037550"/>
+            <a:off x="5580770" y="2990050"/>
             <a:ext cx="1500557" cy="113323"/>
           </a:xfrm>
           <a:prstGeom prst="rect">
@@ -5847,7 +5878,7 @@
         </p:nvSpPr>
         <p:spPr>
           <a:xfrm>
-            <a:off x="4916362" y="2150420"/>
+            <a:off x="5579302" y="3102920"/>
             <a:ext cx="1500557" cy="113323"/>
           </a:xfrm>
           <a:prstGeom prst="rect">
@@ -5887,7 +5918,7 @@
         </p:nvSpPr>
         <p:spPr>
           <a:xfrm>
-            <a:off x="4916362" y="2263290"/>
+            <a:off x="5579302" y="3215790"/>
             <a:ext cx="1500557" cy="113323"/>
           </a:xfrm>
           <a:prstGeom prst="rect">
@@ -5927,7 +5958,7 @@
         </p:nvSpPr>
         <p:spPr>
           <a:xfrm>
-            <a:off x="4916362" y="2376160"/>
+            <a:off x="5579302" y="3328660"/>
             <a:ext cx="1500557" cy="113323"/>
           </a:xfrm>
           <a:prstGeom prst="rect">
@@ -5967,7 +5998,7 @@
         </p:nvSpPr>
         <p:spPr>
           <a:xfrm>
-            <a:off x="4916362" y="2489030"/>
+            <a:off x="5579302" y="3441530"/>
             <a:ext cx="1500557" cy="113323"/>
           </a:xfrm>
           <a:prstGeom prst="rect">
@@ -6007,7 +6038,7 @@
         </p:nvSpPr>
         <p:spPr>
           <a:xfrm>
-            <a:off x="4916362" y="2601900"/>
+            <a:off x="5579302" y="3554400"/>
             <a:ext cx="1500557" cy="113323"/>
           </a:xfrm>
           <a:prstGeom prst="rect">
@@ -6047,7 +6078,7 @@
         </p:nvSpPr>
         <p:spPr>
           <a:xfrm>
-            <a:off x="4916362" y="2714770"/>
+            <a:off x="5579302" y="3667270"/>
             <a:ext cx="1500557" cy="113323"/>
           </a:xfrm>
           <a:prstGeom prst="rect">
@@ -6087,7 +6118,7 @@
         </p:nvSpPr>
         <p:spPr>
           <a:xfrm>
-            <a:off x="4916362" y="2827640"/>
+            <a:off x="5579302" y="3780140"/>
             <a:ext cx="1500557" cy="113323"/>
           </a:xfrm>
           <a:prstGeom prst="rect">
@@ -6127,7 +6158,7 @@
         </p:nvSpPr>
         <p:spPr>
           <a:xfrm>
-            <a:off x="4916362" y="2940510"/>
+            <a:off x="5579302" y="3893010"/>
             <a:ext cx="1500557" cy="113323"/>
           </a:xfrm>
           <a:prstGeom prst="rect">
@@ -6167,7 +6198,7 @@
         </p:nvSpPr>
         <p:spPr>
           <a:xfrm>
-            <a:off x="4916362" y="3053380"/>
+            <a:off x="5579302" y="4005880"/>
             <a:ext cx="1500557" cy="113323"/>
           </a:xfrm>
           <a:prstGeom prst="rect">
@@ -6207,7 +6238,7 @@
         </p:nvSpPr>
         <p:spPr>
           <a:xfrm>
-            <a:off x="4916362" y="3166250"/>
+            <a:off x="5579302" y="4118750"/>
             <a:ext cx="1500557" cy="113323"/>
           </a:xfrm>
           <a:prstGeom prst="rect">
@@ -6247,7 +6278,7 @@
         </p:nvSpPr>
         <p:spPr>
           <a:xfrm>
-            <a:off x="4916362" y="3279120"/>
+            <a:off x="5579302" y="4231620"/>
             <a:ext cx="1500557" cy="113323"/>
           </a:xfrm>
           <a:prstGeom prst="rect">
@@ -6287,7 +6318,7 @@
         </p:nvSpPr>
         <p:spPr>
           <a:xfrm>
-            <a:off x="4916362" y="3391990"/>
+            <a:off x="5579302" y="4344490"/>
             <a:ext cx="1500557" cy="113323"/>
           </a:xfrm>
           <a:prstGeom prst="rect">
@@ -6327,7 +6358,7 @@
         </p:nvSpPr>
         <p:spPr>
           <a:xfrm>
-            <a:off x="4916362" y="3504860"/>
+            <a:off x="5579302" y="4457360"/>
             <a:ext cx="1500557" cy="113323"/>
           </a:xfrm>
           <a:prstGeom prst="rect">
@@ -6367,7 +6398,7 @@
         </p:nvSpPr>
         <p:spPr>
           <a:xfrm>
-            <a:off x="4916362" y="3617730"/>
+            <a:off x="5579302" y="4570230"/>
             <a:ext cx="1500557" cy="113323"/>
           </a:xfrm>
           <a:prstGeom prst="rect">
@@ -6407,7 +6438,7 @@
         </p:nvSpPr>
         <p:spPr>
           <a:xfrm>
-            <a:off x="4916362" y="3730600"/>
+            <a:off x="5579302" y="4683100"/>
             <a:ext cx="1500557" cy="113323"/>
           </a:xfrm>
           <a:prstGeom prst="rect">
@@ -6447,7 +6478,7 @@
         </p:nvSpPr>
         <p:spPr>
           <a:xfrm>
-            <a:off x="4916362" y="3843470"/>
+            <a:off x="5579302" y="4795970"/>
             <a:ext cx="1500557" cy="113323"/>
           </a:xfrm>
           <a:prstGeom prst="rect">
@@ -6487,7 +6518,7 @@
         </p:nvSpPr>
         <p:spPr>
           <a:xfrm>
-            <a:off x="4916362" y="3956340"/>
+            <a:off x="5579302" y="4908840"/>
             <a:ext cx="1500557" cy="113323"/>
           </a:xfrm>
           <a:prstGeom prst="rect">
@@ -6527,7 +6558,7 @@
         </p:nvSpPr>
         <p:spPr>
           <a:xfrm>
-            <a:off x="4916362" y="4069210"/>
+            <a:off x="5579302" y="5021710"/>
             <a:ext cx="1500557" cy="113323"/>
           </a:xfrm>
           <a:prstGeom prst="rect">
@@ -6567,7 +6598,7 @@
         </p:nvSpPr>
         <p:spPr>
           <a:xfrm>
-            <a:off x="4916362" y="4182080"/>
+            <a:off x="5579302" y="5134580"/>
             <a:ext cx="1500557" cy="113323"/>
           </a:xfrm>
           <a:prstGeom prst="rect">
@@ -6607,7 +6638,7 @@
         </p:nvSpPr>
         <p:spPr>
           <a:xfrm>
-            <a:off x="4916362" y="4294950"/>
+            <a:off x="5579302" y="5247450"/>
             <a:ext cx="1500557" cy="113323"/>
           </a:xfrm>
           <a:prstGeom prst="rect">
@@ -6647,7 +6678,7 @@
         </p:nvSpPr>
         <p:spPr>
           <a:xfrm>
-            <a:off x="4916362" y="4407822"/>
+            <a:off x="5579302" y="5360322"/>
             <a:ext cx="1500557" cy="113323"/>
           </a:xfrm>
           <a:prstGeom prst="rect">
@@ -6687,7 +6718,7 @@
         </p:nvSpPr>
         <p:spPr>
           <a:xfrm>
-            <a:off x="2104668" y="1473200"/>
+            <a:off x="2767608" y="2425700"/>
             <a:ext cx="160210" cy="3047945"/>
           </a:xfrm>
           <a:prstGeom prst="rect">
@@ -6727,7 +6758,7 @@
         </p:nvSpPr>
         <p:spPr>
           <a:xfrm>
-            <a:off x="2229714" y="1473200"/>
+            <a:off x="2892654" y="2425700"/>
             <a:ext cx="160210" cy="3047945"/>
           </a:xfrm>
           <a:prstGeom prst="rect">
@@ -6767,7 +6798,7 @@
         </p:nvSpPr>
         <p:spPr>
           <a:xfrm>
-            <a:off x="2354760" y="1473200"/>
+            <a:off x="3017700" y="2425700"/>
             <a:ext cx="160210" cy="3047945"/>
           </a:xfrm>
           <a:prstGeom prst="rect">
@@ -6807,7 +6838,7 @@
         </p:nvSpPr>
         <p:spPr>
           <a:xfrm>
-            <a:off x="2479806" y="1473200"/>
+            <a:off x="3142746" y="2425700"/>
             <a:ext cx="160210" cy="3047945"/>
           </a:xfrm>
           <a:prstGeom prst="rect">
@@ -6847,7 +6878,7 @@
         </p:nvSpPr>
         <p:spPr>
           <a:xfrm>
-            <a:off x="2604852" y="1473200"/>
+            <a:off x="3267792" y="2425700"/>
             <a:ext cx="160210" cy="3047945"/>
           </a:xfrm>
           <a:prstGeom prst="rect">
@@ -6887,7 +6918,7 @@
         </p:nvSpPr>
         <p:spPr>
           <a:xfrm>
-            <a:off x="2729898" y="1473200"/>
+            <a:off x="3392838" y="2425700"/>
             <a:ext cx="160210" cy="3047945"/>
           </a:xfrm>
           <a:prstGeom prst="rect">
@@ -6927,7 +6958,7 @@
         </p:nvSpPr>
         <p:spPr>
           <a:xfrm>
-            <a:off x="2854944" y="1473200"/>
+            <a:off x="3517884" y="2425700"/>
             <a:ext cx="160210" cy="3047945"/>
           </a:xfrm>
           <a:prstGeom prst="rect">
@@ -6967,7 +6998,7 @@
         </p:nvSpPr>
         <p:spPr>
           <a:xfrm>
-            <a:off x="2979990" y="1473200"/>
+            <a:off x="3642930" y="2425700"/>
             <a:ext cx="160210" cy="3047945"/>
           </a:xfrm>
           <a:prstGeom prst="rect">
@@ -7007,7 +7038,7 @@
         </p:nvSpPr>
         <p:spPr>
           <a:xfrm>
-            <a:off x="3105036" y="1473200"/>
+            <a:off x="3767976" y="2425700"/>
             <a:ext cx="160210" cy="3047945"/>
           </a:xfrm>
           <a:prstGeom prst="rect">
@@ -7047,7 +7078,7 @@
         </p:nvSpPr>
         <p:spPr>
           <a:xfrm>
-            <a:off x="3230082" y="1473200"/>
+            <a:off x="3893022" y="2425700"/>
             <a:ext cx="160210" cy="3047945"/>
           </a:xfrm>
           <a:prstGeom prst="rect">
@@ -7087,7 +7118,7 @@
         </p:nvSpPr>
         <p:spPr>
           <a:xfrm>
-            <a:off x="3355128" y="1473200"/>
+            <a:off x="4018068" y="2425700"/>
             <a:ext cx="160210" cy="3047945"/>
           </a:xfrm>
           <a:prstGeom prst="rect">
@@ -7127,7 +7158,7 @@
         </p:nvSpPr>
         <p:spPr>
           <a:xfrm>
-            <a:off x="3480179" y="1473200"/>
+            <a:off x="4143119" y="2425700"/>
             <a:ext cx="125041" cy="3047945"/>
           </a:xfrm>
           <a:prstGeom prst="rect">
@@ -7167,7 +7198,7 @@
         </p:nvSpPr>
         <p:spPr>
           <a:xfrm rot="16200000">
-            <a:off x="4225350" y="2824303"/>
+            <a:off x="4888290" y="3776803"/>
             <a:ext cx="1139736" cy="276999"/>
           </a:xfrm>
           <a:prstGeom prst="rect">
@@ -7198,7 +7229,7 @@
         </p:nvSpPr>
         <p:spPr>
           <a:xfrm>
-            <a:off x="5136769" y="1219414"/>
+            <a:off x="5799709" y="2171914"/>
             <a:ext cx="1038169" cy="276999"/>
           </a:xfrm>
           <a:prstGeom prst="rect">
@@ -7229,7 +7260,7 @@
         </p:nvSpPr>
         <p:spPr>
           <a:xfrm>
-            <a:off x="1919237" y="471831"/>
+            <a:off x="2582177" y="1424331"/>
             <a:ext cx="1871413" cy="646331"/>
           </a:xfrm>
           <a:prstGeom prst="rect">
@@ -7267,7 +7298,7 @@
         </p:nvSpPr>
         <p:spPr>
           <a:xfrm>
-            <a:off x="4720146" y="471831"/>
+            <a:off x="5383086" y="1424331"/>
             <a:ext cx="1871413" cy="646331"/>
           </a:xfrm>
           <a:prstGeom prst="rect">
@@ -7305,7 +7336,7 @@
         </p:nvSpPr>
         <p:spPr>
           <a:xfrm>
-            <a:off x="4003312" y="699247"/>
+            <a:off x="4666252" y="1651747"/>
             <a:ext cx="504172" cy="191498"/>
           </a:xfrm>
           <a:prstGeom prst="rightArrow">
@@ -7334,6 +7365,36 @@
           <a:p>
             <a:pPr algn="ctr"/>
             <a:endParaRPr lang="en-US"/>
+          </a:p>
+        </p:txBody>
+      </p:sp>
+      <p:sp>
+        <p:nvSpPr>
+          <p:cNvPr id="57" name="TextBox 56"/>
+          <p:cNvSpPr txBox="1"/>
+          <p:nvPr/>
+        </p:nvSpPr>
+        <p:spPr>
+          <a:xfrm>
+            <a:off x="231335" y="227849"/>
+            <a:ext cx="7479227" cy="646331"/>
+          </a:xfrm>
+          <a:prstGeom prst="rect">
+            <a:avLst/>
+          </a:prstGeom>
+          <a:noFill/>
+        </p:spPr>
+        <p:txBody>
+          <a:bodyPr wrap="none" rtlCol="0">
+            <a:spAutoFit/>
+          </a:bodyPr>
+          <a:lstStyle/>
+          <a:p>
+            <a:r>
+              <a:rPr lang="en-US" sz="3600" dirty="0" smtClean="0"/>
+              <a:t>Interpretation of Hidden Layer Weights</a:t>
+            </a:r>
+            <a:endParaRPr lang="en-US" sz="3600" dirty="0"/>
           </a:p>
         </p:txBody>
       </p:sp>
@@ -7376,7 +7437,7 @@
         <p:spPr>
           <a:xfrm>
             <a:off x="3582804" y="2743200"/>
-            <a:ext cx="1477108" cy="176213"/>
+            <a:ext cx="843940" cy="173831"/>
           </a:xfrm>
           <a:prstGeom prst="rect">
             <a:avLst/>
@@ -7460,7 +7521,7 @@
             <p:spPr>
               <a:xfrm>
                 <a:off x="1990725" y="2218758"/>
-                <a:ext cx="4995919" cy="853054"/>
+                <a:ext cx="3785652" cy="849271"/>
               </a:xfrm>
               <a:prstGeom prst="rect">
                 <a:avLst/>
@@ -7473,6 +7534,7 @@
               </a:bodyPr>
               <a:lstStyle/>
               <a:p>
+                <a:pPr/>
                 <a14:m>
                   <m:oMathPara xmlns:m="http://schemas.openxmlformats.org/officeDocument/2006/math">
                     <m:oMathParaPr>
@@ -7590,13 +7652,13 @@
                               <m:mcs>
                                 <m:mc>
                                   <m:mcPr>
-                                    <m:count m:val="5"/>
+                                    <m:count m:val="3"/>
                                     <m:mcJc m:val="center"/>
                                   </m:mcPr>
                                 </m:mc>
                               </m:mcs>
                               <m:ctrlPr>
-                                <a:rPr lang="en-US" sz="1200" i="1">
+                                <a:rPr lang="en-US" sz="1200" b="0" i="1">
                                   <a:latin typeface="Cambria Math" panose="02040503050406030204" pitchFamily="18" charset="0"/>
                                 </a:rPr>
                               </m:ctrlPr>
@@ -7610,7 +7672,13 @@
                                   <a:rPr lang="en-US" sz="1200" b="0" i="1" smtClean="0">
                                     <a:latin typeface="Cambria Math" panose="02040503050406030204" pitchFamily="18" charset="0"/>
                                   </a:rPr>
-                                  <m:t>17</m:t>
+                                  <m:t>1</m:t>
+                                </m:r>
+                                <m:r>
+                                  <a:rPr lang="en-US" sz="1200" b="0" i="1" smtClean="0">
+                                    <a:latin typeface="Cambria Math" panose="02040503050406030204" pitchFamily="18" charset="0"/>
+                                  </a:rPr>
+                                  <m:t>7</m:t>
                                 </m:r>
                               </m:e>
                               <m:e>
@@ -7627,22 +7695,6 @@
                                     <a:latin typeface="Cambria Math" panose="02040503050406030204" pitchFamily="18" charset="0"/>
                                   </a:rPr>
                                   <m:t>1</m:t>
-                                </m:r>
-                              </m:e>
-                              <m:e>
-                                <m:r>
-                                  <a:rPr lang="en-US" sz="1200" b="0" i="1" smtClean="0">
-                                    <a:latin typeface="Cambria Math" panose="02040503050406030204" pitchFamily="18" charset="0"/>
-                                  </a:rPr>
-                                  <m:t>8</m:t>
-                                </m:r>
-                              </m:e>
-                              <m:e>
-                                <m:r>
-                                  <a:rPr lang="en-US" sz="1200" b="0" i="1" smtClean="0">
-                                    <a:latin typeface="Cambria Math" panose="02040503050406030204" pitchFamily="18" charset="0"/>
-                                  </a:rPr>
-                                  <m:t>15</m:t>
                                 </m:r>
                               </m:e>
                             </m:mr>
@@ -7671,22 +7723,6 @@
                                   <m:t>7</m:t>
                                 </m:r>
                               </m:e>
-                              <m:e>
-                                <m:r>
-                                  <a:rPr lang="en-US" sz="1200" b="0" i="1" smtClean="0">
-                                    <a:latin typeface="Cambria Math" panose="02040503050406030204" pitchFamily="18" charset="0"/>
-                                  </a:rPr>
-                                  <m:t>14</m:t>
-                                </m:r>
-                              </m:e>
-                              <m:e>
-                                <m:r>
-                                  <a:rPr lang="en-US" sz="1200" b="0" i="1" smtClean="0">
-                                    <a:latin typeface="Cambria Math" panose="02040503050406030204" pitchFamily="18" charset="0"/>
-                                  </a:rPr>
-                                  <m:t>16</m:t>
-                                </m:r>
-                              </m:e>
                             </m:mr>
                             <m:mr>
                               <m:e>
@@ -7711,22 +7747,6 @@
                                     <a:latin typeface="Cambria Math" panose="02040503050406030204" pitchFamily="18" charset="0"/>
                                   </a:rPr>
                                   <m:t>13</m:t>
-                                </m:r>
-                              </m:e>
-                              <m:e>
-                                <m:r>
-                                  <a:rPr lang="en-US" sz="1200" b="0" i="1" smtClean="0">
-                                    <a:latin typeface="Cambria Math" panose="02040503050406030204" pitchFamily="18" charset="0"/>
-                                  </a:rPr>
-                                  <m:t>20</m:t>
-                                </m:r>
-                              </m:e>
-                              <m:e>
-                                <m:r>
-                                  <a:rPr lang="en-US" sz="1200" b="0" i="1" smtClean="0">
-                                    <a:latin typeface="Cambria Math" panose="02040503050406030204" pitchFamily="18" charset="0"/>
-                                  </a:rPr>
-                                  <m:t>22</m:t>
                                 </m:r>
                               </m:e>
                             </m:mr>
@@ -7755,22 +7775,6 @@
                                   <m:t>19</m:t>
                                 </m:r>
                               </m:e>
-                              <m:e>
-                                <m:r>
-                                  <a:rPr lang="en-US" sz="1200" b="0" i="1" smtClean="0">
-                                    <a:latin typeface="Cambria Math" panose="02040503050406030204" pitchFamily="18" charset="0"/>
-                                  </a:rPr>
-                                  <m:t>21</m:t>
-                                </m:r>
-                              </m:e>
-                              <m:e>
-                                <m:r>
-                                  <a:rPr lang="en-US" sz="1200" b="0" i="1" smtClean="0">
-                                    <a:latin typeface="Cambria Math" panose="02040503050406030204" pitchFamily="18" charset="0"/>
-                                  </a:rPr>
-                                  <m:t>3</m:t>
-                                </m:r>
-                              </m:e>
                             </m:mr>
                             <m:mr>
                               <m:e>
@@ -7795,22 +7799,6 @@
                                     <a:latin typeface="Cambria Math" panose="02040503050406030204" pitchFamily="18" charset="0"/>
                                   </a:rPr>
                                   <m:t>25</m:t>
-                                </m:r>
-                              </m:e>
-                              <m:e>
-                                <m:r>
-                                  <a:rPr lang="en-US" sz="1200" b="0" i="1" smtClean="0">
-                                    <a:latin typeface="Cambria Math" panose="02040503050406030204" pitchFamily="18" charset="0"/>
-                                  </a:rPr>
-                                  <m:t>2</m:t>
-                                </m:r>
-                              </m:e>
-                              <m:e>
-                                <m:r>
-                                  <a:rPr lang="en-US" sz="1200" b="0" i="1" smtClean="0">
-                                    <a:latin typeface="Cambria Math" panose="02040503050406030204" pitchFamily="18" charset="0"/>
-                                  </a:rPr>
-                                  <m:t>9</m:t>
                                 </m:r>
                               </m:e>
                             </m:mr>
@@ -7846,13 +7834,13 @@
                               <m:mcs>
                                 <m:mc>
                                   <m:mcPr>
-                                    <m:count m:val="5"/>
+                                    <m:count m:val="3"/>
                                     <m:mcJc m:val="center"/>
                                   </m:mcPr>
                                 </m:mc>
                               </m:mcs>
                               <m:ctrlPr>
-                                <a:rPr lang="en-US" sz="1200" i="1">
+                                <a:rPr lang="en-US" sz="1200" b="0" i="1">
                                   <a:latin typeface="Cambria Math" panose="02040503050406030204" pitchFamily="18" charset="0"/>
                                 </a:rPr>
                               </m:ctrlPr>
@@ -7891,28 +7879,6 @@
                                   <m:t>19</m:t>
                                 </m:r>
                               </m:e>
-                              <m:e>
-                                <m:r>
-                                  <a:rPr lang="en-US" sz="1200" b="0" i="1" smtClean="0">
-                                    <a:latin typeface="Cambria Math" panose="02040503050406030204" pitchFamily="18" charset="0"/>
-                                  </a:rPr>
-                                  <m:t>2</m:t>
-                                </m:r>
-                                <m:r>
-                                  <a:rPr lang="en-US" sz="1200" i="1">
-                                    <a:latin typeface="Cambria Math" panose="02040503050406030204" pitchFamily="18" charset="0"/>
-                                  </a:rPr>
-                                  <m:t>1</m:t>
-                                </m:r>
-                              </m:e>
-                              <m:e>
-                                <m:r>
-                                  <a:rPr lang="en-US" sz="1200" b="0" i="1" smtClean="0">
-                                    <a:latin typeface="Cambria Math" panose="02040503050406030204" pitchFamily="18" charset="0"/>
-                                  </a:rPr>
-                                  <m:t>3</m:t>
-                                </m:r>
-                              </m:e>
                             </m:mr>
                           </m:m>
                         </m:e>
@@ -7937,7 +7903,7 @@
             <p:spPr>
               <a:xfrm>
                 <a:off x="1990725" y="2218758"/>
-                <a:ext cx="4995919" cy="853054"/>
+                <a:ext cx="3785652" cy="849271"/>
               </a:xfrm>
               <a:prstGeom prst="rect">
                 <a:avLst/>
@@ -7964,10 +7930,742 @@
           </p:sp>
         </mc:Fallback>
       </mc:AlternateContent>
+      <p:sp>
+        <p:nvSpPr>
+          <p:cNvPr id="2" name="TextBox 1"/>
+          <p:cNvSpPr txBox="1"/>
+          <p:nvPr/>
+        </p:nvSpPr>
+        <p:spPr>
+          <a:xfrm>
+            <a:off x="426720" y="289560"/>
+            <a:ext cx="8277651" cy="646331"/>
+          </a:xfrm>
+          <a:prstGeom prst="rect">
+            <a:avLst/>
+          </a:prstGeom>
+          <a:noFill/>
+        </p:spPr>
+        <p:txBody>
+          <a:bodyPr wrap="none" rtlCol="0">
+            <a:spAutoFit/>
+          </a:bodyPr>
+          <a:lstStyle/>
+          <a:p>
+            <a:r>
+              <a:rPr lang="en-US" sz="3600" dirty="0" smtClean="0"/>
+              <a:t>Matrix Multiplication with a one-hot vector</a:t>
+            </a:r>
+            <a:endParaRPr lang="en-US" sz="3600" dirty="0"/>
+          </a:p>
+        </p:txBody>
+      </p:sp>
     </p:spTree>
     <p:extLst>
       <p:ext uri="{BB962C8B-B14F-4D97-AF65-F5344CB8AC3E}">
         <p14:creationId xmlns:p14="http://schemas.microsoft.com/office/powerpoint/2010/main" val="3144906536"/>
+      </p:ext>
+    </p:extLst>
+  </p:cSld>
+  <p:clrMapOvr>
+    <a:masterClrMapping/>
+  </p:clrMapOvr>
+</p:sld>
+</file>
+
+<file path=ppt/slides/slide4.xml><?xml version="1.0" encoding="utf-8"?>
+<p:sld xmlns:a="http://schemas.openxmlformats.org/drawingml/2006/main" xmlns:r="http://schemas.openxmlformats.org/officeDocument/2006/relationships" xmlns:p="http://schemas.openxmlformats.org/presentationml/2006/main">
+  <p:cSld>
+    <p:spTree>
+      <p:nvGrpSpPr>
+        <p:cNvPr id="1" name=""/>
+        <p:cNvGrpSpPr/>
+        <p:nvPr/>
+      </p:nvGrpSpPr>
+      <p:grpSpPr>
+        <a:xfrm>
+          <a:off x="0" y="0"/>
+          <a:ext cx="0" cy="0"/>
+          <a:chOff x="0" y="0"/>
+          <a:chExt cx="0" cy="0"/>
+        </a:xfrm>
+      </p:grpSpPr>
+      <p:sp>
+        <p:nvSpPr>
+          <p:cNvPr id="3" name="Rectangle 2"/>
+          <p:cNvSpPr/>
+          <p:nvPr/>
+        </p:nvSpPr>
+        <p:spPr>
+          <a:xfrm>
+            <a:off x="1390649" y="3054352"/>
+            <a:ext cx="1304925" cy="158750"/>
+          </a:xfrm>
+          <a:prstGeom prst="rect">
+            <a:avLst/>
+          </a:prstGeom>
+        </p:spPr>
+        <p:style>
+          <a:lnRef idx="2">
+            <a:schemeClr val="accent1">
+              <a:shade val="50000"/>
+            </a:schemeClr>
+          </a:lnRef>
+          <a:fillRef idx="1">
+            <a:schemeClr val="accent1"/>
+          </a:fillRef>
+          <a:effectRef idx="0">
+            <a:schemeClr val="accent1"/>
+          </a:effectRef>
+          <a:fontRef idx="minor">
+            <a:schemeClr val="lt1"/>
+          </a:fontRef>
+        </p:style>
+        <p:txBody>
+          <a:bodyPr rtlCol="0" anchor="ctr"/>
+          <a:lstStyle/>
+          <a:p>
+            <a:pPr algn="ctr"/>
+            <a:endParaRPr lang="en-US"/>
+          </a:p>
+        </p:txBody>
+      </p:sp>
+      <p:sp>
+        <p:nvSpPr>
+          <p:cNvPr id="4" name="TextBox 3"/>
+          <p:cNvSpPr txBox="1"/>
+          <p:nvPr/>
+        </p:nvSpPr>
+        <p:spPr>
+          <a:xfrm>
+            <a:off x="1233486" y="2729728"/>
+            <a:ext cx="1619250" cy="276999"/>
+          </a:xfrm>
+          <a:prstGeom prst="rect">
+            <a:avLst/>
+          </a:prstGeom>
+          <a:noFill/>
+        </p:spPr>
+        <p:txBody>
+          <a:bodyPr wrap="square" rtlCol="0">
+            <a:spAutoFit/>
+          </a:bodyPr>
+          <a:lstStyle/>
+          <a:p>
+            <a:pPr algn="ctr"/>
+            <a:r>
+              <a:rPr lang="en-US" sz="1200" dirty="0" smtClean="0"/>
+              <a:t>Word vector for “ants”</a:t>
+            </a:r>
+            <a:endParaRPr lang="en-US" sz="1200" dirty="0"/>
+          </a:p>
+        </p:txBody>
+      </p:sp>
+      <p:sp>
+        <p:nvSpPr>
+          <p:cNvPr id="5" name="TextBox 4"/>
+          <p:cNvSpPr txBox="1"/>
+          <p:nvPr/>
+        </p:nvSpPr>
+        <p:spPr>
+          <a:xfrm>
+            <a:off x="1623765" y="3260727"/>
+            <a:ext cx="838691" cy="246221"/>
+          </a:xfrm>
+          <a:prstGeom prst="rect">
+            <a:avLst/>
+          </a:prstGeom>
+          <a:noFill/>
+        </p:spPr>
+        <p:txBody>
+          <a:bodyPr wrap="none" rtlCol="0">
+            <a:spAutoFit/>
+          </a:bodyPr>
+          <a:lstStyle/>
+          <a:p>
+            <a:r>
+              <a:rPr lang="en-US" sz="1000" i="1" dirty="0" smtClean="0"/>
+              <a:t>300 features</a:t>
+            </a:r>
+            <a:endParaRPr lang="en-US" sz="1000" i="1" dirty="0"/>
+          </a:p>
+        </p:txBody>
+      </p:sp>
+      <p:sp>
+        <p:nvSpPr>
+          <p:cNvPr id="7" name="Rectangle 6"/>
+          <p:cNvSpPr/>
+          <p:nvPr/>
+        </p:nvSpPr>
+        <p:spPr>
+          <a:xfrm rot="5400000">
+            <a:off x="4434222" y="1718014"/>
+            <a:ext cx="1304925" cy="2844131"/>
+          </a:xfrm>
+          <a:prstGeom prst="rect">
+            <a:avLst/>
+          </a:prstGeom>
+        </p:spPr>
+        <p:style>
+          <a:lnRef idx="2">
+            <a:schemeClr val="accent3">
+              <a:shade val="50000"/>
+            </a:schemeClr>
+          </a:lnRef>
+          <a:fillRef idx="1">
+            <a:schemeClr val="accent3"/>
+          </a:fillRef>
+          <a:effectRef idx="0">
+            <a:schemeClr val="accent3"/>
+          </a:effectRef>
+          <a:fontRef idx="minor">
+            <a:schemeClr val="lt1"/>
+          </a:fontRef>
+        </p:style>
+        <p:txBody>
+          <a:bodyPr rtlCol="0" anchor="ctr"/>
+          <a:lstStyle/>
+          <a:p>
+            <a:pPr algn="ctr"/>
+            <a:endParaRPr lang="en-US"/>
+          </a:p>
+        </p:txBody>
+      </p:sp>
+      <p:sp>
+        <p:nvSpPr>
+          <p:cNvPr id="8" name="Rectangle 7"/>
+          <p:cNvSpPr/>
+          <p:nvPr/>
+        </p:nvSpPr>
+        <p:spPr>
+          <a:xfrm>
+            <a:off x="3924300" y="2487615"/>
+            <a:ext cx="152400" cy="1304926"/>
+          </a:xfrm>
+          <a:prstGeom prst="rect">
+            <a:avLst/>
+          </a:prstGeom>
+          <a:solidFill>
+            <a:srgbClr val="E17B7B"/>
+          </a:solidFill>
+        </p:spPr>
+        <p:style>
+          <a:lnRef idx="2">
+            <a:schemeClr val="accent2">
+              <a:shade val="50000"/>
+            </a:schemeClr>
+          </a:lnRef>
+          <a:fillRef idx="1">
+            <a:schemeClr val="accent2"/>
+          </a:fillRef>
+          <a:effectRef idx="0">
+            <a:schemeClr val="accent2"/>
+          </a:effectRef>
+          <a:fontRef idx="minor">
+            <a:schemeClr val="lt1"/>
+          </a:fontRef>
+        </p:style>
+        <p:txBody>
+          <a:bodyPr rtlCol="0" anchor="ctr"/>
+          <a:lstStyle/>
+          <a:p>
+            <a:pPr algn="ctr"/>
+            <a:endParaRPr lang="en-US"/>
+          </a:p>
+        </p:txBody>
+      </p:sp>
+      <p:sp>
+        <p:nvSpPr>
+          <p:cNvPr id="9" name="TextBox 8"/>
+          <p:cNvSpPr txBox="1"/>
+          <p:nvPr/>
+        </p:nvSpPr>
+        <p:spPr>
+          <a:xfrm>
+            <a:off x="3285597" y="2044703"/>
+            <a:ext cx="2473853" cy="276999"/>
+          </a:xfrm>
+          <a:prstGeom prst="rect">
+            <a:avLst/>
+          </a:prstGeom>
+          <a:noFill/>
+        </p:spPr>
+        <p:txBody>
+          <a:bodyPr wrap="square" rtlCol="0">
+            <a:spAutoFit/>
+          </a:bodyPr>
+          <a:lstStyle/>
+          <a:p>
+            <a:r>
+              <a:rPr lang="en-US" sz="1200" dirty="0" smtClean="0"/>
+              <a:t>Output weights for “car”</a:t>
+            </a:r>
+            <a:endParaRPr lang="en-US" sz="1200" dirty="0"/>
+          </a:p>
+        </p:txBody>
+      </p:sp>
+      <p:cxnSp>
+        <p:nvCxnSpPr>
+          <p:cNvPr id="11" name="Straight Arrow Connector 10"/>
+          <p:cNvCxnSpPr/>
+          <p:nvPr/>
+        </p:nvCxnSpPr>
+        <p:spPr>
+          <a:xfrm>
+            <a:off x="3990975" y="2277252"/>
+            <a:ext cx="0" cy="165913"/>
+          </a:xfrm>
+          <a:prstGeom prst="straightConnector1">
+            <a:avLst/>
+          </a:prstGeom>
+          <a:ln>
+            <a:solidFill>
+              <a:srgbClr val="E17B7B"/>
+            </a:solidFill>
+            <a:tailEnd type="triangle"/>
+          </a:ln>
+        </p:spPr>
+        <p:style>
+          <a:lnRef idx="3">
+            <a:schemeClr val="accent2"/>
+          </a:lnRef>
+          <a:fillRef idx="0">
+            <a:schemeClr val="accent2"/>
+          </a:fillRef>
+          <a:effectRef idx="2">
+            <a:schemeClr val="accent2"/>
+          </a:effectRef>
+          <a:fontRef idx="minor">
+            <a:schemeClr val="tx1"/>
+          </a:fontRef>
+        </p:style>
+      </p:cxnSp>
+      <p:sp>
+        <p:nvSpPr>
+          <p:cNvPr id="13" name="TextBox 12"/>
+          <p:cNvSpPr txBox="1"/>
+          <p:nvPr/>
+        </p:nvSpPr>
+        <p:spPr>
+          <a:xfrm>
+            <a:off x="4641690" y="3792541"/>
+            <a:ext cx="889987" cy="246221"/>
+          </a:xfrm>
+          <a:prstGeom prst="rect">
+            <a:avLst/>
+          </a:prstGeom>
+          <a:noFill/>
+        </p:spPr>
+        <p:txBody>
+          <a:bodyPr wrap="none" rtlCol="0">
+            <a:spAutoFit/>
+          </a:bodyPr>
+          <a:lstStyle/>
+          <a:p>
+            <a:r>
+              <a:rPr lang="en-US" sz="1000" i="1" dirty="0" smtClean="0"/>
+              <a:t>10,000 words</a:t>
+            </a:r>
+            <a:endParaRPr lang="en-US" sz="1000" i="1" dirty="0"/>
+          </a:p>
+        </p:txBody>
+      </p:sp>
+      <p:sp>
+        <p:nvSpPr>
+          <p:cNvPr id="14" name="TextBox 13"/>
+          <p:cNvSpPr txBox="1"/>
+          <p:nvPr/>
+        </p:nvSpPr>
+        <p:spPr>
+          <a:xfrm rot="16200000">
+            <a:off x="3097837" y="3016967"/>
+            <a:ext cx="838691" cy="246221"/>
+          </a:xfrm>
+          <a:prstGeom prst="rect">
+            <a:avLst/>
+          </a:prstGeom>
+          <a:noFill/>
+        </p:spPr>
+        <p:txBody>
+          <a:bodyPr wrap="none" rtlCol="0">
+            <a:spAutoFit/>
+          </a:bodyPr>
+          <a:lstStyle/>
+          <a:p>
+            <a:r>
+              <a:rPr lang="en-US" sz="1000" i="1" dirty="0" smtClean="0"/>
+              <a:t>300 features</a:t>
+            </a:r>
+            <a:endParaRPr lang="en-US" sz="1000" i="1" dirty="0"/>
+          </a:p>
+        </p:txBody>
+      </p:sp>
+      <mc:AlternateContent xmlns:mc="http://schemas.openxmlformats.org/markup-compatibility/2006">
+        <mc:Choice xmlns:a14="http://schemas.microsoft.com/office/drawing/2010/main" Requires="a14">
+          <p:sp>
+            <p:nvSpPr>
+              <p:cNvPr id="16" name="TextBox 15"/>
+              <p:cNvSpPr txBox="1"/>
+              <p:nvPr/>
+            </p:nvSpPr>
+            <p:spPr>
+              <a:xfrm>
+                <a:off x="2983977" y="2983728"/>
+                <a:ext cx="218008" cy="276999"/>
+              </a:xfrm>
+              <a:prstGeom prst="rect">
+                <a:avLst/>
+              </a:prstGeom>
+              <a:noFill/>
+            </p:spPr>
+            <p:txBody>
+              <a:bodyPr wrap="none" lIns="0" tIns="0" rIns="0" bIns="0" rtlCol="0">
+                <a:spAutoFit/>
+              </a:bodyPr>
+              <a:lstStyle/>
+              <a:p>
+                <a14:m>
+                  <m:oMathPara xmlns:m="http://schemas.openxmlformats.org/officeDocument/2006/math">
+                    <m:oMathParaPr>
+                      <m:jc m:val="centerGroup"/>
+                    </m:oMathParaPr>
+                    <m:oMath xmlns:m="http://schemas.openxmlformats.org/officeDocument/2006/math">
+                      <m:r>
+                        <a:rPr lang="en-US" i="1" smtClean="0">
+                          <a:latin typeface="Cambria Math" panose="02040503050406030204" pitchFamily="18" charset="0"/>
+                          <a:ea typeface="Cambria Math" panose="02040503050406030204" pitchFamily="18" charset="0"/>
+                        </a:rPr>
+                        <m:t>×</m:t>
+                      </m:r>
+                    </m:oMath>
+                  </m:oMathPara>
+                </a14:m>
+                <a:endParaRPr lang="en-US" dirty="0"/>
+              </a:p>
+            </p:txBody>
+          </p:sp>
+        </mc:Choice>
+        <mc:Fallback>
+          <p:sp>
+            <p:nvSpPr>
+              <p:cNvPr id="16" name="TextBox 15"/>
+              <p:cNvSpPr txBox="1">
+                <a:spLocks noRot="1" noChangeAspect="1" noMove="1" noResize="1" noEditPoints="1" noAdjustHandles="1" noChangeArrowheads="1" noChangeShapeType="1" noTextEdit="1"/>
+              </p:cNvSpPr>
+              <p:nvPr/>
+            </p:nvSpPr>
+            <p:spPr>
+              <a:xfrm>
+                <a:off x="2983977" y="2983728"/>
+                <a:ext cx="218008" cy="276999"/>
+              </a:xfrm>
+              <a:prstGeom prst="rect">
+                <a:avLst/>
+              </a:prstGeom>
+              <a:blipFill rotWithShape="0">
+                <a:blip r:embed="rId2"/>
+                <a:stretch>
+                  <a:fillRect l="-19444" r="-16667"/>
+                </a:stretch>
+              </a:blipFill>
+            </p:spPr>
+            <p:txBody>
+              <a:bodyPr/>
+              <a:lstStyle/>
+              <a:p>
+                <a:r>
+                  <a:rPr lang="en-US">
+                    <a:noFill/>
+                  </a:rPr>
+                  <a:t> </a:t>
+                </a:r>
+              </a:p>
+            </p:txBody>
+          </p:sp>
+        </mc:Fallback>
+      </mc:AlternateContent>
+      <p:sp>
+        <p:nvSpPr>
+          <p:cNvPr id="17" name="TextBox 16"/>
+          <p:cNvSpPr txBox="1"/>
+          <p:nvPr/>
+        </p:nvSpPr>
+        <p:spPr>
+          <a:xfrm>
+            <a:off x="6768431" y="2936103"/>
+            <a:ext cx="115416" cy="276999"/>
+          </a:xfrm>
+          <a:prstGeom prst="rect">
+            <a:avLst/>
+          </a:prstGeom>
+          <a:noFill/>
+        </p:spPr>
+        <p:txBody>
+          <a:bodyPr wrap="none" lIns="0" tIns="0" rIns="0" bIns="0" rtlCol="0">
+            <a:spAutoFit/>
+          </a:bodyPr>
+          <a:lstStyle/>
+          <a:p>
+            <a:r>
+              <a:rPr lang="en-US" dirty="0" smtClean="0"/>
+              <a:t>=</a:t>
+            </a:r>
+            <a:endParaRPr lang="en-US" dirty="0"/>
+          </a:p>
+        </p:txBody>
+      </p:sp>
+      <p:sp>
+        <p:nvSpPr>
+          <p:cNvPr id="20" name="Rectangle 19"/>
+          <p:cNvSpPr/>
+          <p:nvPr/>
+        </p:nvSpPr>
+        <p:spPr>
+          <a:xfrm rot="5400000">
+            <a:off x="8494117" y="1653598"/>
+            <a:ext cx="153113" cy="2844131"/>
+          </a:xfrm>
+          <a:prstGeom prst="rect">
+            <a:avLst/>
+          </a:prstGeom>
+        </p:spPr>
+        <p:style>
+          <a:lnRef idx="2">
+            <a:schemeClr val="accent3">
+              <a:shade val="50000"/>
+            </a:schemeClr>
+          </a:lnRef>
+          <a:fillRef idx="1">
+            <a:schemeClr val="accent3"/>
+          </a:fillRef>
+          <a:effectRef idx="0">
+            <a:schemeClr val="accent3"/>
+          </a:effectRef>
+          <a:fontRef idx="minor">
+            <a:schemeClr val="lt1"/>
+          </a:fontRef>
+        </p:style>
+        <p:txBody>
+          <a:bodyPr rtlCol="0" anchor="ctr"/>
+          <a:lstStyle/>
+          <a:p>
+            <a:pPr algn="ctr"/>
+            <a:endParaRPr lang="en-US"/>
+          </a:p>
+        </p:txBody>
+      </p:sp>
+      <p:sp>
+        <p:nvSpPr>
+          <p:cNvPr id="21" name="Rectangle 20"/>
+          <p:cNvSpPr/>
+          <p:nvPr/>
+        </p:nvSpPr>
+        <p:spPr>
+          <a:xfrm>
+            <a:off x="7468040" y="2999107"/>
+            <a:ext cx="146880" cy="153113"/>
+          </a:xfrm>
+          <a:prstGeom prst="rect">
+            <a:avLst/>
+          </a:prstGeom>
+          <a:solidFill>
+            <a:srgbClr val="E17B7B"/>
+          </a:solidFill>
+        </p:spPr>
+        <p:style>
+          <a:lnRef idx="2">
+            <a:schemeClr val="accent2">
+              <a:shade val="50000"/>
+            </a:schemeClr>
+          </a:lnRef>
+          <a:fillRef idx="1">
+            <a:schemeClr val="accent2"/>
+          </a:fillRef>
+          <a:effectRef idx="0">
+            <a:schemeClr val="accent2"/>
+          </a:effectRef>
+          <a:fontRef idx="minor">
+            <a:schemeClr val="lt1"/>
+          </a:fontRef>
+        </p:style>
+        <p:txBody>
+          <a:bodyPr rtlCol="0" anchor="ctr"/>
+          <a:lstStyle/>
+          <a:p>
+            <a:pPr algn="ctr"/>
+            <a:endParaRPr lang="en-US" sz="800" dirty="0"/>
+          </a:p>
+        </p:txBody>
+      </p:sp>
+      <p:sp>
+        <p:nvSpPr>
+          <p:cNvPr id="22" name="TextBox 21"/>
+          <p:cNvSpPr txBox="1"/>
+          <p:nvPr/>
+        </p:nvSpPr>
+        <p:spPr>
+          <a:xfrm>
+            <a:off x="8125679" y="3152220"/>
+            <a:ext cx="889987" cy="246221"/>
+          </a:xfrm>
+          <a:prstGeom prst="rect">
+            <a:avLst/>
+          </a:prstGeom>
+          <a:noFill/>
+        </p:spPr>
+        <p:txBody>
+          <a:bodyPr wrap="none" rtlCol="0">
+            <a:spAutoFit/>
+          </a:bodyPr>
+          <a:lstStyle/>
+          <a:p>
+            <a:r>
+              <a:rPr lang="en-US" sz="1000" i="1" dirty="0" smtClean="0"/>
+              <a:t>10,000 words</a:t>
+            </a:r>
+            <a:endParaRPr lang="en-US" sz="1000" i="1" dirty="0"/>
+          </a:p>
+        </p:txBody>
+      </p:sp>
+      <p:sp>
+        <p:nvSpPr>
+          <p:cNvPr id="27" name="TextBox 26"/>
+          <p:cNvSpPr txBox="1"/>
+          <p:nvPr/>
+        </p:nvSpPr>
+        <p:spPr>
+          <a:xfrm>
+            <a:off x="7064788" y="2330734"/>
+            <a:ext cx="1885950" cy="461665"/>
+          </a:xfrm>
+          <a:prstGeom prst="rect">
+            <a:avLst/>
+          </a:prstGeom>
+          <a:noFill/>
+        </p:spPr>
+        <p:txBody>
+          <a:bodyPr wrap="square" rtlCol="0">
+            <a:spAutoFit/>
+          </a:bodyPr>
+          <a:lstStyle/>
+          <a:p>
+            <a:r>
+              <a:rPr lang="en-US" sz="1200" dirty="0" smtClean="0"/>
+              <a:t>Probability that “car” shows up at position -2</a:t>
+            </a:r>
+            <a:endParaRPr lang="en-US" sz="1200" dirty="0"/>
+          </a:p>
+        </p:txBody>
+      </p:sp>
+      <p:cxnSp>
+        <p:nvCxnSpPr>
+          <p:cNvPr id="28" name="Straight Arrow Connector 27"/>
+          <p:cNvCxnSpPr/>
+          <p:nvPr/>
+        </p:nvCxnSpPr>
+        <p:spPr>
+          <a:xfrm>
+            <a:off x="7556720" y="2777650"/>
+            <a:ext cx="0" cy="165913"/>
+          </a:xfrm>
+          <a:prstGeom prst="straightConnector1">
+            <a:avLst/>
+          </a:prstGeom>
+          <a:ln>
+            <a:solidFill>
+              <a:srgbClr val="E17B7B"/>
+            </a:solidFill>
+            <a:tailEnd type="triangle"/>
+          </a:ln>
+        </p:spPr>
+        <p:style>
+          <a:lnRef idx="3">
+            <a:schemeClr val="accent2"/>
+          </a:lnRef>
+          <a:fillRef idx="0">
+            <a:schemeClr val="accent2"/>
+          </a:fillRef>
+          <a:effectRef idx="2">
+            <a:schemeClr val="accent2"/>
+          </a:effectRef>
+          <a:fontRef idx="minor">
+            <a:schemeClr val="tx1"/>
+          </a:fontRef>
+        </p:style>
+      </p:cxnSp>
+      <p:sp>
+        <p:nvSpPr>
+          <p:cNvPr id="29" name="TextBox 28"/>
+          <p:cNvSpPr txBox="1"/>
+          <p:nvPr/>
+        </p:nvSpPr>
+        <p:spPr>
+          <a:xfrm>
+            <a:off x="4249955" y="2868227"/>
+            <a:ext cx="1676180" cy="461665"/>
+          </a:xfrm>
+          <a:prstGeom prst="rect">
+            <a:avLst/>
+          </a:prstGeom>
+          <a:noFill/>
+        </p:spPr>
+        <p:txBody>
+          <a:bodyPr wrap="square" rtlCol="0">
+            <a:spAutoFit/>
+          </a:bodyPr>
+          <a:lstStyle/>
+          <a:p>
+            <a:pPr algn="ctr"/>
+            <a:r>
+              <a:rPr lang="en-US" sz="1200" dirty="0" smtClean="0">
+                <a:solidFill>
+                  <a:schemeClr val="bg1"/>
+                </a:solidFill>
+              </a:rPr>
+              <a:t>Weight Matrix for Output Neuron -2</a:t>
+            </a:r>
+            <a:endParaRPr lang="en-US" sz="1200" dirty="0">
+              <a:solidFill>
+                <a:schemeClr val="bg1"/>
+              </a:solidFill>
+            </a:endParaRPr>
+          </a:p>
+        </p:txBody>
+      </p:sp>
+      <p:sp>
+        <p:nvSpPr>
+          <p:cNvPr id="30" name="TextBox 29"/>
+          <p:cNvSpPr txBox="1"/>
+          <p:nvPr/>
+        </p:nvSpPr>
+        <p:spPr>
+          <a:xfrm>
+            <a:off x="556260" y="190500"/>
+            <a:ext cx="6286500" cy="646331"/>
+          </a:xfrm>
+          <a:prstGeom prst="rect">
+            <a:avLst/>
+          </a:prstGeom>
+          <a:noFill/>
+        </p:spPr>
+        <p:txBody>
+          <a:bodyPr wrap="square" rtlCol="0">
+            <a:spAutoFit/>
+          </a:bodyPr>
+          <a:lstStyle/>
+          <a:p>
+            <a:r>
+              <a:rPr lang="en-US" sz="3600" dirty="0" smtClean="0"/>
+              <a:t>Behavior of the output neuron</a:t>
+            </a:r>
+            <a:endParaRPr lang="en-US" sz="3600" dirty="0"/>
+          </a:p>
+        </p:txBody>
+      </p:sp>
+    </p:spTree>
+    <p:extLst>
+      <p:ext uri="{BB962C8B-B14F-4D97-AF65-F5344CB8AC3E}">
+        <p14:creationId xmlns:p14="http://schemas.microsoft.com/office/powerpoint/2010/main" val="3574223014"/>
       </p:ext>
     </p:extLst>
   </p:cSld>

</xml_diff>

<commit_message>
Took down Word2Vec post temporarily, fixing details about output.
</commit_message>
<xml_diff>
--- a/assets/word2vec/Word2Vec_Illustrations.pptx
+++ b/assets/word2vec/Word2Vec_Illustrations.pptx
@@ -6,9 +6,10 @@
   </p:sldMasterIdLst>
   <p:sldIdLst>
     <p:sldId id="256" r:id="rId2"/>
-    <p:sldId id="257" r:id="rId3"/>
-    <p:sldId id="258" r:id="rId4"/>
-    <p:sldId id="259" r:id="rId5"/>
+    <p:sldId id="260" r:id="rId3"/>
+    <p:sldId id="257" r:id="rId4"/>
+    <p:sldId id="258" r:id="rId5"/>
+    <p:sldId id="259" r:id="rId6"/>
   </p:sldIdLst>
   <p:sldSz cx="12192000" cy="6858000"/>
   <p:notesSz cx="6858000" cy="9144000"/>
@@ -3693,7 +3694,7 @@
         </p:nvSpPr>
         <p:spPr>
           <a:xfrm>
-            <a:off x="4768149" y="3264877"/>
+            <a:off x="4768149" y="3270804"/>
             <a:ext cx="825572" cy="825572"/>
           </a:xfrm>
           <a:prstGeom prst="ellipse">
@@ -3963,8 +3964,8 @@
         </p:nvSpPr>
         <p:spPr>
           <a:xfrm>
-            <a:off x="4418935" y="1345483"/>
-            <a:ext cx="1524000" cy="646331"/>
+            <a:off x="4334586" y="1357527"/>
+            <a:ext cx="1692696" cy="646331"/>
           </a:xfrm>
           <a:prstGeom prst="rect">
             <a:avLst/>
@@ -3980,7 +3981,11 @@
             <a:pPr algn="ctr"/>
             <a:r>
               <a:rPr lang="en-US" dirty="0" smtClean="0"/>
-              <a:t>Hidden Layer Neurons</a:t>
+              <a:t>Hidden Layer </a:t>
+            </a:r>
+            <a:r>
+              <a:rPr lang="en-US" dirty="0" smtClean="0"/>
+              <a:t>Linear Neurons</a:t>
             </a:r>
             <a:endParaRPr lang="en-US" dirty="0"/>
           </a:p>
@@ -4124,7 +4129,7 @@
         </p:nvSpPr>
         <p:spPr>
           <a:xfrm>
-            <a:off x="7446074" y="2622277"/>
+            <a:off x="7348696" y="3270804"/>
             <a:ext cx="825572" cy="825572"/>
           </a:xfrm>
           <a:prstGeom prst="ellipse">
@@ -4170,7 +4175,7 @@
         </p:nvSpPr>
         <p:spPr>
           <a:xfrm>
-            <a:off x="7639890" y="2706076"/>
+            <a:off x="7542512" y="3360530"/>
             <a:ext cx="437940" cy="646331"/>
           </a:xfrm>
           <a:prstGeom prst="rect">
@@ -4195,39 +4200,6 @@
           </a:p>
         </p:txBody>
       </p:sp>
-      <p:cxnSp>
-        <p:nvCxnSpPr>
-          <p:cNvPr id="54" name="Straight Connector 53"/>
-          <p:cNvCxnSpPr/>
-          <p:nvPr/>
-        </p:nvCxnSpPr>
-        <p:spPr>
-          <a:xfrm>
-            <a:off x="7858860" y="3620476"/>
-            <a:ext cx="0" cy="486000"/>
-          </a:xfrm>
-          <a:prstGeom prst="line">
-            <a:avLst/>
-          </a:prstGeom>
-          <a:ln>
-            <a:prstDash val="dash"/>
-          </a:ln>
-        </p:spPr>
-        <p:style>
-          <a:lnRef idx="1">
-            <a:schemeClr val="accent1"/>
-          </a:lnRef>
-          <a:fillRef idx="0">
-            <a:schemeClr val="accent1"/>
-          </a:fillRef>
-          <a:effectRef idx="0">
-            <a:schemeClr val="accent1"/>
-          </a:effectRef>
-          <a:fontRef idx="minor">
-            <a:schemeClr val="tx1"/>
-          </a:fontRef>
-        </p:style>
-      </p:cxnSp>
       <p:cxnSp>
         <p:nvCxnSpPr>
           <p:cNvPr id="55" name="Straight Arrow Connector 54"/>
@@ -4240,43 +4212,7 @@
         <p:spPr>
           <a:xfrm>
             <a:off x="5593721" y="2541568"/>
-            <a:ext cx="1852353" cy="493495"/>
-          </a:xfrm>
-          <a:prstGeom prst="straightConnector1">
-            <a:avLst/>
-          </a:prstGeom>
-          <a:ln>
-            <a:tailEnd type="arrow"/>
-          </a:ln>
-        </p:spPr>
-        <p:style>
-          <a:lnRef idx="1">
-            <a:schemeClr val="accent1"/>
-          </a:lnRef>
-          <a:fillRef idx="0">
-            <a:schemeClr val="accent1"/>
-          </a:fillRef>
-          <a:effectRef idx="0">
-            <a:schemeClr val="accent1"/>
-          </a:effectRef>
-          <a:fontRef idx="minor">
-            <a:schemeClr val="tx1"/>
-          </a:fontRef>
-        </p:style>
-      </p:cxnSp>
-      <p:cxnSp>
-        <p:nvCxnSpPr>
-          <p:cNvPr id="56" name="Straight Arrow Connector 55"/>
-          <p:cNvCxnSpPr>
-            <a:stCxn id="34" idx="6"/>
-            <a:endCxn id="62" idx="2"/>
-          </p:cNvCxnSpPr>
-          <p:nvPr/>
-        </p:nvCxnSpPr>
-        <p:spPr>
-          <a:xfrm>
-            <a:off x="5593721" y="2541568"/>
-            <a:ext cx="1852353" cy="2107711"/>
+            <a:ext cx="1754975" cy="1142022"/>
           </a:xfrm>
           <a:prstGeom prst="straightConnector1">
             <a:avLst/>
@@ -4310,9 +4246,9 @@
           <p:nvPr/>
         </p:nvCxnSpPr>
         <p:spPr>
-          <a:xfrm flipV="1">
-            <a:off x="5593721" y="3035063"/>
-            <a:ext cx="1852353" cy="642600"/>
+          <a:xfrm>
+            <a:off x="5593721" y="3683590"/>
+            <a:ext cx="1754975" cy="0"/>
           </a:xfrm>
           <a:prstGeom prst="straightConnector1">
             <a:avLst/>
@@ -4347,44 +4283,8 @@
         </p:nvCxnSpPr>
         <p:spPr>
           <a:xfrm flipV="1">
-            <a:off x="5593721" y="3035063"/>
-            <a:ext cx="1852353" cy="2256816"/>
-          </a:xfrm>
-          <a:prstGeom prst="straightConnector1">
-            <a:avLst/>
-          </a:prstGeom>
-          <a:ln>
-            <a:tailEnd type="arrow"/>
-          </a:ln>
-        </p:spPr>
-        <p:style>
-          <a:lnRef idx="1">
-            <a:schemeClr val="accent1"/>
-          </a:lnRef>
-          <a:fillRef idx="0">
-            <a:schemeClr val="accent1"/>
-          </a:fillRef>
-          <a:effectRef idx="0">
-            <a:schemeClr val="accent1"/>
-          </a:effectRef>
-          <a:fontRef idx="minor">
-            <a:schemeClr val="tx1"/>
-          </a:fontRef>
-        </p:style>
-      </p:cxnSp>
-      <p:cxnSp>
-        <p:nvCxnSpPr>
-          <p:cNvPr id="59" name="Straight Arrow Connector 58"/>
-          <p:cNvCxnSpPr>
-            <a:stCxn id="32" idx="6"/>
-            <a:endCxn id="62" idx="2"/>
-          </p:cNvCxnSpPr>
-          <p:nvPr/>
-        </p:nvCxnSpPr>
-        <p:spPr>
-          <a:xfrm flipV="1">
-            <a:off x="5593721" y="4649279"/>
-            <a:ext cx="1852353" cy="642600"/>
+            <a:off x="5593721" y="3683590"/>
+            <a:ext cx="1754975" cy="1608289"/>
           </a:xfrm>
           <a:prstGeom prst="straightConnector1">
             <a:avLst/>
@@ -4416,7 +4316,7 @@
         </p:nvCxnSpPr>
         <p:spPr>
           <a:xfrm>
-            <a:off x="8395680" y="3035063"/>
+            <a:off x="8327784" y="3714998"/>
             <a:ext cx="304800" cy="0"/>
           </a:xfrm>
           <a:prstGeom prst="straightConnector1">
@@ -4441,88 +4341,6 @@
           </a:fontRef>
         </p:style>
       </p:cxnSp>
-      <p:cxnSp>
-        <p:nvCxnSpPr>
-          <p:cNvPr id="61" name="Straight Arrow Connector 60"/>
-          <p:cNvCxnSpPr>
-            <a:stCxn id="29" idx="6"/>
-            <a:endCxn id="62" idx="2"/>
-          </p:cNvCxnSpPr>
-          <p:nvPr/>
-        </p:nvCxnSpPr>
-        <p:spPr>
-          <a:xfrm>
-            <a:off x="5593721" y="3677663"/>
-            <a:ext cx="1852353" cy="971616"/>
-          </a:xfrm>
-          <a:prstGeom prst="straightConnector1">
-            <a:avLst/>
-          </a:prstGeom>
-          <a:ln>
-            <a:tailEnd type="arrow"/>
-          </a:ln>
-        </p:spPr>
-        <p:style>
-          <a:lnRef idx="1">
-            <a:schemeClr val="accent1"/>
-          </a:lnRef>
-          <a:fillRef idx="0">
-            <a:schemeClr val="accent1"/>
-          </a:fillRef>
-          <a:effectRef idx="0">
-            <a:schemeClr val="accent1"/>
-          </a:effectRef>
-          <a:fontRef idx="minor">
-            <a:schemeClr val="tx1"/>
-          </a:fontRef>
-        </p:style>
-      </p:cxnSp>
-      <p:sp>
-        <p:nvSpPr>
-          <p:cNvPr id="62" name="Oval 61"/>
-          <p:cNvSpPr/>
-          <p:nvPr/>
-        </p:nvSpPr>
-        <p:spPr>
-          <a:xfrm>
-            <a:off x="7446074" y="4236493"/>
-            <a:ext cx="825572" cy="825572"/>
-          </a:xfrm>
-          <a:prstGeom prst="ellipse">
-            <a:avLst/>
-          </a:prstGeom>
-          <a:noFill/>
-          <a:ln>
-            <a:solidFill>
-              <a:srgbClr val="FF0000"/>
-            </a:solidFill>
-          </a:ln>
-        </p:spPr>
-        <p:style>
-          <a:lnRef idx="2">
-            <a:schemeClr val="accent1">
-              <a:shade val="50000"/>
-            </a:schemeClr>
-          </a:lnRef>
-          <a:fillRef idx="1">
-            <a:schemeClr val="accent1"/>
-          </a:fillRef>
-          <a:effectRef idx="0">
-            <a:schemeClr val="accent1"/>
-          </a:effectRef>
-          <a:fontRef idx="minor">
-            <a:schemeClr val="lt1"/>
-          </a:fontRef>
-        </p:style>
-        <p:txBody>
-          <a:bodyPr rtlCol="0" anchor="ctr"/>
-          <a:lstStyle/>
-          <a:p>
-            <a:pPr algn="ctr"/>
-            <a:endParaRPr lang="en-US"/>
-          </a:p>
-        </p:txBody>
-      </p:sp>
       <p:sp>
         <p:nvSpPr>
           <p:cNvPr id="63" name="TextBox 62"/>
@@ -4531,8 +4349,8 @@
         </p:nvSpPr>
         <p:spPr>
           <a:xfrm>
-            <a:off x="7230210" y="1879544"/>
-            <a:ext cx="1257300" cy="646331"/>
+            <a:off x="7132832" y="2291721"/>
+            <a:ext cx="1257300" cy="923330"/>
           </a:xfrm>
           <a:prstGeom prst="rect">
             <a:avLst/>
@@ -4548,42 +4366,25 @@
             <a:pPr algn="ctr"/>
             <a:r>
               <a:rPr lang="en-US" dirty="0" smtClean="0"/>
-              <a:t>Output Neurons</a:t>
+              <a:t>Output </a:t>
+            </a:r>
+            <a:endParaRPr lang="en-US" dirty="0" smtClean="0"/>
+          </a:p>
+          <a:p>
+            <a:pPr algn="ctr"/>
+            <a:r>
+              <a:rPr lang="en-US" dirty="0" err="1" smtClean="0"/>
+              <a:t>Softmax</a:t>
+            </a:r>
+            <a:r>
+              <a:rPr lang="en-US" dirty="0" smtClean="0"/>
+              <a:t> </a:t>
+            </a:r>
+            <a:r>
+              <a:rPr lang="en-US" dirty="0" smtClean="0"/>
+              <a:t>Neuron</a:t>
             </a:r>
             <a:endParaRPr lang="en-US" dirty="0"/>
-          </a:p>
-        </p:txBody>
-      </p:sp>
-      <p:sp>
-        <p:nvSpPr>
-          <p:cNvPr id="71" name="TextBox 70"/>
-          <p:cNvSpPr txBox="1"/>
-          <p:nvPr/>
-        </p:nvSpPr>
-        <p:spPr>
-          <a:xfrm>
-            <a:off x="7639890" y="4330115"/>
-            <a:ext cx="437940" cy="646331"/>
-          </a:xfrm>
-          <a:prstGeom prst="rect">
-            <a:avLst/>
-          </a:prstGeom>
-          <a:noFill/>
-        </p:spPr>
-        <p:txBody>
-          <a:bodyPr wrap="none" rtlCol="0">
-            <a:spAutoFit/>
-          </a:bodyPr>
-          <a:lstStyle/>
-          <a:p>
-            <a:r>
-              <a:rPr lang="el-GR" sz="3600" dirty="0" smtClean="0">
-                <a:latin typeface="Cambria Math" pitchFamily="18" charset="0"/>
-                <a:ea typeface="Cambria Math" pitchFamily="18" charset="0"/>
-              </a:rPr>
-              <a:t>Σ</a:t>
-            </a:r>
-            <a:endParaRPr lang="en-US" sz="1400" dirty="0"/>
           </a:p>
         </p:txBody>
       </p:sp>
@@ -4595,8 +4396,8 @@
         </p:nvSpPr>
         <p:spPr>
           <a:xfrm>
-            <a:off x="9872567" y="2622535"/>
-            <a:ext cx="1462631" cy="461665"/>
+            <a:off x="9886936" y="3384581"/>
+            <a:ext cx="1694134" cy="830997"/>
           </a:xfrm>
           <a:prstGeom prst="rect">
             <a:avLst/>
@@ -4611,49 +4412,16 @@
           <a:p>
             <a:r>
               <a:rPr lang="en-US" sz="1200" dirty="0" smtClean="0"/>
-              <a:t>Word probabilities for position </a:t>
-            </a:r>
-            <a:r>
-              <a:rPr lang="en-US" sz="1200" b="1" dirty="0" smtClean="0"/>
-              <a:t>-2</a:t>
+              <a:t>Probability, for each word in the vocabulary, of appearing near</a:t>
+            </a:r>
+            <a:r>
+              <a:rPr lang="en-US" sz="1200" dirty="0" smtClean="0"/>
+              <a:t> the input word.</a:t>
             </a:r>
             <a:endParaRPr lang="en-US" sz="1200" b="1" dirty="0"/>
           </a:p>
         </p:txBody>
       </p:sp>
-      <p:cxnSp>
-        <p:nvCxnSpPr>
-          <p:cNvPr id="73" name="Straight Arrow Connector 72"/>
-          <p:cNvCxnSpPr/>
-          <p:nvPr/>
-        </p:nvCxnSpPr>
-        <p:spPr>
-          <a:xfrm>
-            <a:off x="8411310" y="4649279"/>
-            <a:ext cx="304800" cy="0"/>
-          </a:xfrm>
-          <a:prstGeom prst="straightConnector1">
-            <a:avLst/>
-          </a:prstGeom>
-          <a:ln>
-            <a:tailEnd type="arrow"/>
-          </a:ln>
-        </p:spPr>
-        <p:style>
-          <a:lnRef idx="1">
-            <a:schemeClr val="accent1"/>
-          </a:lnRef>
-          <a:fillRef idx="0">
-            <a:schemeClr val="accent1"/>
-          </a:fillRef>
-          <a:effectRef idx="0">
-            <a:schemeClr val="accent1"/>
-          </a:effectRef>
-          <a:fontRef idx="minor">
-            <a:schemeClr val="tx1"/>
-          </a:fontRef>
-        </p:style>
-      </p:cxnSp>
       <p:sp>
         <p:nvSpPr>
           <p:cNvPr id="82" name="Rectangle 81"/>
@@ -4662,7 +4430,7 @@
         </p:nvSpPr>
         <p:spPr>
           <a:xfrm>
-            <a:off x="8925666" y="2116078"/>
+            <a:off x="8963413" y="2954354"/>
             <a:ext cx="583222" cy="228600"/>
           </a:xfrm>
           <a:prstGeom prst="rect">
@@ -4715,7 +4483,7 @@
         </p:nvSpPr>
         <p:spPr>
           <a:xfrm>
-            <a:off x="8748353" y="3671181"/>
+            <a:off x="8786100" y="4509457"/>
             <a:ext cx="937847" cy="415498"/>
           </a:xfrm>
           <a:prstGeom prst="rect">
@@ -4753,7 +4521,7 @@
         </p:nvSpPr>
         <p:spPr>
           <a:xfrm>
-            <a:off x="8925666" y="2342172"/>
+            <a:off x="8963413" y="3180448"/>
             <a:ext cx="583222" cy="228600"/>
           </a:xfrm>
           <a:prstGeom prst="rect">
@@ -4806,7 +4574,7 @@
         </p:nvSpPr>
         <p:spPr>
           <a:xfrm>
-            <a:off x="8925666" y="2568266"/>
+            <a:off x="8963413" y="3406542"/>
             <a:ext cx="583222" cy="228600"/>
           </a:xfrm>
           <a:prstGeom prst="rect">
@@ -4859,7 +4627,7 @@
         </p:nvSpPr>
         <p:spPr>
           <a:xfrm>
-            <a:off x="8925666" y="2794359"/>
+            <a:off x="8963413" y="3632635"/>
             <a:ext cx="583222" cy="228600"/>
           </a:xfrm>
           <a:prstGeom prst="rect">
@@ -4912,7 +4680,7 @@
         </p:nvSpPr>
         <p:spPr>
           <a:xfrm>
-            <a:off x="8930408" y="3408398"/>
+            <a:off x="8968155" y="4246674"/>
             <a:ext cx="583222" cy="228600"/>
           </a:xfrm>
           <a:prstGeom prst="rect">
@@ -4965,7 +4733,7 @@
         </p:nvCxnSpPr>
         <p:spPr>
           <a:xfrm>
-            <a:off x="9219578" y="3083424"/>
+            <a:off x="9257325" y="3921700"/>
             <a:ext cx="1" cy="266700"/>
           </a:xfrm>
           <a:prstGeom prst="line">
@@ -4998,7 +4766,7 @@
         </p:nvSpPr>
         <p:spPr>
           <a:xfrm>
-            <a:off x="7389937" y="5216785"/>
+            <a:off x="7292559" y="4175810"/>
             <a:ext cx="937847" cy="253916"/>
           </a:xfrm>
           <a:prstGeom prst="rect">
@@ -5015,11 +4783,11 @@
             <a:pPr algn="ctr"/>
             <a:r>
               <a:rPr lang="en-US" sz="1050" i="1" dirty="0"/>
-              <a:t>4</a:t>
+              <a:t>1</a:t>
             </a:r>
             <a:r>
               <a:rPr lang="en-US" sz="1050" i="1" dirty="0" smtClean="0"/>
-              <a:t> neurons</a:t>
+              <a:t> neuron</a:t>
             </a:r>
             <a:endParaRPr lang="en-US" sz="1050" i="1" dirty="0"/>
           </a:p>
@@ -5033,418 +4801,7 @@
         </p:nvSpPr>
         <p:spPr>
           <a:xfrm>
-            <a:off x="9619719" y="2095416"/>
-            <a:ext cx="176875" cy="1548110"/>
-          </a:xfrm>
-          <a:prstGeom prst="rightBrace">
-            <a:avLst>
-              <a:gd name="adj1" fmla="val 49816"/>
-              <a:gd name="adj2" fmla="val 50000"/>
-            </a:avLst>
-          </a:prstGeom>
-        </p:spPr>
-        <p:style>
-          <a:lnRef idx="1">
-            <a:schemeClr val="accent1"/>
-          </a:lnRef>
-          <a:fillRef idx="0">
-            <a:schemeClr val="accent1"/>
-          </a:fillRef>
-          <a:effectRef idx="0">
-            <a:schemeClr val="accent1"/>
-          </a:effectRef>
-          <a:fontRef idx="minor">
-            <a:schemeClr val="tx1"/>
-          </a:fontRef>
-        </p:style>
-        <p:txBody>
-          <a:bodyPr rtlCol="0" anchor="ctr"/>
-          <a:lstStyle/>
-          <a:p>
-            <a:pPr algn="ctr"/>
-            <a:endParaRPr lang="en-US"/>
-          </a:p>
-        </p:txBody>
-      </p:sp>
-      <p:sp>
-        <p:nvSpPr>
-          <p:cNvPr id="103" name="TextBox 102"/>
-          <p:cNvSpPr txBox="1"/>
-          <p:nvPr/>
-        </p:nvSpPr>
-        <p:spPr>
-          <a:xfrm>
-            <a:off x="9888197" y="4879810"/>
-            <a:ext cx="1395996" cy="461665"/>
-          </a:xfrm>
-          <a:prstGeom prst="rect">
-            <a:avLst/>
-          </a:prstGeom>
-          <a:noFill/>
-        </p:spPr>
-        <p:txBody>
-          <a:bodyPr wrap="square" rtlCol="0">
-            <a:spAutoFit/>
-          </a:bodyPr>
-          <a:lstStyle/>
-          <a:p>
-            <a:r>
-              <a:rPr lang="en-US" sz="1200" dirty="0" smtClean="0"/>
-              <a:t>Word probabilities for position </a:t>
-            </a:r>
-            <a:r>
-              <a:rPr lang="en-US" sz="1200" b="1" dirty="0" smtClean="0"/>
-              <a:t>+2</a:t>
-            </a:r>
-            <a:endParaRPr lang="en-US" sz="1200" b="1" dirty="0"/>
-          </a:p>
-        </p:txBody>
-      </p:sp>
-      <p:sp>
-        <p:nvSpPr>
-          <p:cNvPr id="104" name="Rectangle 103"/>
-          <p:cNvSpPr/>
-          <p:nvPr/>
-        </p:nvSpPr>
-        <p:spPr>
-          <a:xfrm>
-            <a:off x="8941296" y="4373353"/>
-            <a:ext cx="583222" cy="228600"/>
-          </a:xfrm>
-          <a:prstGeom prst="rect">
-            <a:avLst/>
-          </a:prstGeom>
-          <a:noFill/>
-        </p:spPr>
-        <p:style>
-          <a:lnRef idx="2">
-            <a:schemeClr val="accent1">
-              <a:shade val="50000"/>
-            </a:schemeClr>
-          </a:lnRef>
-          <a:fillRef idx="1">
-            <a:schemeClr val="accent1"/>
-          </a:fillRef>
-          <a:effectRef idx="0">
-            <a:schemeClr val="accent1"/>
-          </a:effectRef>
-          <a:fontRef idx="minor">
-            <a:schemeClr val="lt1"/>
-          </a:fontRef>
-        </p:style>
-        <p:txBody>
-          <a:bodyPr rtlCol="0" anchor="ctr"/>
-          <a:lstStyle/>
-          <a:p>
-            <a:pPr algn="ctr"/>
-            <a:r>
-              <a:rPr lang="en-US" sz="1050" dirty="0" smtClean="0">
-                <a:solidFill>
-                  <a:schemeClr val="tx1"/>
-                </a:solidFill>
-              </a:rPr>
-              <a:t>0.0048</a:t>
-            </a:r>
-            <a:endParaRPr lang="en-US" sz="1050" dirty="0">
-              <a:solidFill>
-                <a:schemeClr val="tx1"/>
-              </a:solidFill>
-            </a:endParaRPr>
-          </a:p>
-        </p:txBody>
-      </p:sp>
-      <p:sp>
-        <p:nvSpPr>
-          <p:cNvPr id="105" name="TextBox 104"/>
-          <p:cNvSpPr txBox="1"/>
-          <p:nvPr/>
-        </p:nvSpPr>
-        <p:spPr>
-          <a:xfrm>
-            <a:off x="8763983" y="5928456"/>
-            <a:ext cx="937847" cy="415498"/>
-          </a:xfrm>
-          <a:prstGeom prst="rect">
-            <a:avLst/>
-          </a:prstGeom>
-          <a:noFill/>
-        </p:spPr>
-        <p:txBody>
-          <a:bodyPr wrap="square" rtlCol="0">
-            <a:spAutoFit/>
-          </a:bodyPr>
-          <a:lstStyle/>
-          <a:p>
-            <a:pPr algn="ctr"/>
-            <a:r>
-              <a:rPr lang="en-US" sz="1050" i="1" dirty="0" smtClean="0"/>
-              <a:t>10,000</a:t>
-            </a:r>
-          </a:p>
-          <a:p>
-            <a:pPr algn="ctr"/>
-            <a:r>
-              <a:rPr lang="en-US" sz="1050" i="1" dirty="0" smtClean="0"/>
-              <a:t>positions</a:t>
-            </a:r>
-            <a:endParaRPr lang="en-US" sz="1050" i="1" dirty="0"/>
-          </a:p>
-        </p:txBody>
-      </p:sp>
-      <p:sp>
-        <p:nvSpPr>
-          <p:cNvPr id="106" name="Rectangle 105"/>
-          <p:cNvSpPr/>
-          <p:nvPr/>
-        </p:nvSpPr>
-        <p:spPr>
-          <a:xfrm>
-            <a:off x="8941296" y="4599447"/>
-            <a:ext cx="583222" cy="228600"/>
-          </a:xfrm>
-          <a:prstGeom prst="rect">
-            <a:avLst/>
-          </a:prstGeom>
-          <a:noFill/>
-        </p:spPr>
-        <p:style>
-          <a:lnRef idx="2">
-            <a:schemeClr val="accent1">
-              <a:shade val="50000"/>
-            </a:schemeClr>
-          </a:lnRef>
-          <a:fillRef idx="1">
-            <a:schemeClr val="accent1"/>
-          </a:fillRef>
-          <a:effectRef idx="0">
-            <a:schemeClr val="accent1"/>
-          </a:effectRef>
-          <a:fontRef idx="minor">
-            <a:schemeClr val="lt1"/>
-          </a:fontRef>
-        </p:style>
-        <p:txBody>
-          <a:bodyPr rtlCol="0" anchor="ctr"/>
-          <a:lstStyle/>
-          <a:p>
-            <a:pPr algn="ctr"/>
-            <a:r>
-              <a:rPr lang="en-US" sz="1050" dirty="0" smtClean="0">
-                <a:solidFill>
-                  <a:schemeClr val="tx1"/>
-                </a:solidFill>
-              </a:rPr>
-              <a:t>0.0139</a:t>
-            </a:r>
-            <a:endParaRPr lang="en-US" sz="1050" dirty="0">
-              <a:solidFill>
-                <a:schemeClr val="tx1"/>
-              </a:solidFill>
-            </a:endParaRPr>
-          </a:p>
-        </p:txBody>
-      </p:sp>
-      <p:sp>
-        <p:nvSpPr>
-          <p:cNvPr id="107" name="Rectangle 106"/>
-          <p:cNvSpPr/>
-          <p:nvPr/>
-        </p:nvSpPr>
-        <p:spPr>
-          <a:xfrm>
-            <a:off x="8941296" y="4825541"/>
-            <a:ext cx="583222" cy="228600"/>
-          </a:xfrm>
-          <a:prstGeom prst="rect">
-            <a:avLst/>
-          </a:prstGeom>
-          <a:noFill/>
-        </p:spPr>
-        <p:style>
-          <a:lnRef idx="2">
-            <a:schemeClr val="accent1">
-              <a:shade val="50000"/>
-            </a:schemeClr>
-          </a:lnRef>
-          <a:fillRef idx="1">
-            <a:schemeClr val="accent1"/>
-          </a:fillRef>
-          <a:effectRef idx="0">
-            <a:schemeClr val="accent1"/>
-          </a:effectRef>
-          <a:fontRef idx="minor">
-            <a:schemeClr val="lt1"/>
-          </a:fontRef>
-        </p:style>
-        <p:txBody>
-          <a:bodyPr rtlCol="0" anchor="ctr"/>
-          <a:lstStyle/>
-          <a:p>
-            <a:pPr algn="ctr"/>
-            <a:r>
-              <a:rPr lang="en-US" sz="1050" dirty="0" smtClean="0">
-                <a:solidFill>
-                  <a:schemeClr val="tx1"/>
-                </a:solidFill>
-              </a:rPr>
-              <a:t>0.0001</a:t>
-            </a:r>
-            <a:endParaRPr lang="en-US" sz="1050" dirty="0">
-              <a:solidFill>
-                <a:schemeClr val="tx1"/>
-              </a:solidFill>
-            </a:endParaRPr>
-          </a:p>
-        </p:txBody>
-      </p:sp>
-      <p:sp>
-        <p:nvSpPr>
-          <p:cNvPr id="108" name="Rectangle 107"/>
-          <p:cNvSpPr/>
-          <p:nvPr/>
-        </p:nvSpPr>
-        <p:spPr>
-          <a:xfrm>
-            <a:off x="8941296" y="5051634"/>
-            <a:ext cx="583222" cy="228600"/>
-          </a:xfrm>
-          <a:prstGeom prst="rect">
-            <a:avLst/>
-          </a:prstGeom>
-          <a:noFill/>
-        </p:spPr>
-        <p:style>
-          <a:lnRef idx="2">
-            <a:schemeClr val="accent1">
-              <a:shade val="50000"/>
-            </a:schemeClr>
-          </a:lnRef>
-          <a:fillRef idx="1">
-            <a:schemeClr val="accent1"/>
-          </a:fillRef>
-          <a:effectRef idx="0">
-            <a:schemeClr val="accent1"/>
-          </a:effectRef>
-          <a:fontRef idx="minor">
-            <a:schemeClr val="lt1"/>
-          </a:fontRef>
-        </p:style>
-        <p:txBody>
-          <a:bodyPr rtlCol="0" anchor="ctr"/>
-          <a:lstStyle/>
-          <a:p>
-            <a:pPr algn="ctr"/>
-            <a:r>
-              <a:rPr lang="en-US" sz="1050" dirty="0" smtClean="0">
-                <a:solidFill>
-                  <a:schemeClr val="tx1"/>
-                </a:solidFill>
-              </a:rPr>
-              <a:t>0.0076</a:t>
-            </a:r>
-            <a:endParaRPr lang="en-US" sz="1050" dirty="0">
-              <a:solidFill>
-                <a:schemeClr val="tx1"/>
-              </a:solidFill>
-            </a:endParaRPr>
-          </a:p>
-        </p:txBody>
-      </p:sp>
-      <p:sp>
-        <p:nvSpPr>
-          <p:cNvPr id="109" name="Rectangle 108"/>
-          <p:cNvSpPr/>
-          <p:nvPr/>
-        </p:nvSpPr>
-        <p:spPr>
-          <a:xfrm>
-            <a:off x="8946038" y="5665673"/>
-            <a:ext cx="583222" cy="228600"/>
-          </a:xfrm>
-          <a:prstGeom prst="rect">
-            <a:avLst/>
-          </a:prstGeom>
-          <a:noFill/>
-        </p:spPr>
-        <p:style>
-          <a:lnRef idx="2">
-            <a:schemeClr val="accent1">
-              <a:shade val="50000"/>
-            </a:schemeClr>
-          </a:lnRef>
-          <a:fillRef idx="1">
-            <a:schemeClr val="accent1"/>
-          </a:fillRef>
-          <a:effectRef idx="0">
-            <a:schemeClr val="accent1"/>
-          </a:effectRef>
-          <a:fontRef idx="minor">
-            <a:schemeClr val="lt1"/>
-          </a:fontRef>
-        </p:style>
-        <p:txBody>
-          <a:bodyPr rtlCol="0" anchor="ctr"/>
-          <a:lstStyle/>
-          <a:p>
-            <a:pPr algn="ctr"/>
-            <a:r>
-              <a:rPr lang="en-US" sz="1050" dirty="0" smtClean="0">
-                <a:solidFill>
-                  <a:schemeClr val="tx1"/>
-                </a:solidFill>
-              </a:rPr>
-              <a:t>0.0482</a:t>
-            </a:r>
-            <a:endParaRPr lang="en-US" sz="1050" dirty="0">
-              <a:solidFill>
-                <a:schemeClr val="tx1"/>
-              </a:solidFill>
-            </a:endParaRPr>
-          </a:p>
-        </p:txBody>
-      </p:sp>
-      <p:cxnSp>
-        <p:nvCxnSpPr>
-          <p:cNvPr id="110" name="Straight Connector 109"/>
-          <p:cNvCxnSpPr/>
-          <p:nvPr/>
-        </p:nvCxnSpPr>
-        <p:spPr>
-          <a:xfrm>
-            <a:off x="9235208" y="5340699"/>
-            <a:ext cx="1" cy="266700"/>
-          </a:xfrm>
-          <a:prstGeom prst="line">
-            <a:avLst/>
-          </a:prstGeom>
-          <a:ln>
-            <a:prstDash val="dash"/>
-          </a:ln>
-        </p:spPr>
-        <p:style>
-          <a:lnRef idx="1">
-            <a:schemeClr val="accent1"/>
-          </a:lnRef>
-          <a:fillRef idx="0">
-            <a:schemeClr val="accent1"/>
-          </a:fillRef>
-          <a:effectRef idx="0">
-            <a:schemeClr val="accent1"/>
-          </a:effectRef>
-          <a:fontRef idx="minor">
-            <a:schemeClr val="tx1"/>
-          </a:fontRef>
-        </p:style>
-      </p:cxnSp>
-      <p:sp>
-        <p:nvSpPr>
-          <p:cNvPr id="111" name="Right Brace 110"/>
-          <p:cNvSpPr/>
-          <p:nvPr/>
-        </p:nvSpPr>
-        <p:spPr>
-          <a:xfrm>
-            <a:off x="9635349" y="4352691"/>
+            <a:off x="9657466" y="2933692"/>
             <a:ext cx="176875" cy="1548110"/>
           </a:xfrm>
           <a:prstGeom prst="rightBrace">
@@ -5572,6 +4929,2620 @@
       </p:grpSpPr>
       <p:sp>
         <p:nvSpPr>
+          <p:cNvPr id="3" name="Rectangle 2"/>
+          <p:cNvSpPr/>
+          <p:nvPr/>
+        </p:nvSpPr>
+        <p:spPr>
+          <a:xfrm>
+            <a:off x="2606421" y="2471609"/>
+            <a:ext cx="228600" cy="228600"/>
+          </a:xfrm>
+          <a:prstGeom prst="rect">
+            <a:avLst/>
+          </a:prstGeom>
+          <a:noFill/>
+        </p:spPr>
+        <p:style>
+          <a:lnRef idx="2">
+            <a:schemeClr val="accent1">
+              <a:shade val="50000"/>
+            </a:schemeClr>
+          </a:lnRef>
+          <a:fillRef idx="1">
+            <a:schemeClr val="accent1"/>
+          </a:fillRef>
+          <a:effectRef idx="0">
+            <a:schemeClr val="accent1"/>
+          </a:effectRef>
+          <a:fontRef idx="minor">
+            <a:schemeClr val="lt1"/>
+          </a:fontRef>
+        </p:style>
+        <p:txBody>
+          <a:bodyPr rtlCol="0" anchor="ctr"/>
+          <a:lstStyle/>
+          <a:p>
+            <a:pPr algn="ctr"/>
+            <a:r>
+              <a:rPr lang="en-US" sz="1400" dirty="0" smtClean="0">
+                <a:solidFill>
+                  <a:schemeClr val="tx1"/>
+                </a:solidFill>
+              </a:rPr>
+              <a:t>0</a:t>
+            </a:r>
+            <a:endParaRPr lang="en-US" sz="1400" dirty="0">
+              <a:solidFill>
+                <a:schemeClr val="tx1"/>
+              </a:solidFill>
+            </a:endParaRPr>
+          </a:p>
+        </p:txBody>
+      </p:sp>
+      <p:sp>
+        <p:nvSpPr>
+          <p:cNvPr id="4" name="Rectangle 3"/>
+          <p:cNvSpPr/>
+          <p:nvPr/>
+        </p:nvSpPr>
+        <p:spPr>
+          <a:xfrm>
+            <a:off x="2606421" y="2700209"/>
+            <a:ext cx="228600" cy="228600"/>
+          </a:xfrm>
+          <a:prstGeom prst="rect">
+            <a:avLst/>
+          </a:prstGeom>
+          <a:noFill/>
+        </p:spPr>
+        <p:style>
+          <a:lnRef idx="2">
+            <a:schemeClr val="accent1">
+              <a:shade val="50000"/>
+            </a:schemeClr>
+          </a:lnRef>
+          <a:fillRef idx="1">
+            <a:schemeClr val="accent1"/>
+          </a:fillRef>
+          <a:effectRef idx="0">
+            <a:schemeClr val="accent1"/>
+          </a:effectRef>
+          <a:fontRef idx="minor">
+            <a:schemeClr val="lt1"/>
+          </a:fontRef>
+        </p:style>
+        <p:txBody>
+          <a:bodyPr rtlCol="0" anchor="ctr"/>
+          <a:lstStyle/>
+          <a:p>
+            <a:pPr algn="ctr"/>
+            <a:r>
+              <a:rPr lang="en-US" sz="1400" dirty="0" smtClean="0">
+                <a:solidFill>
+                  <a:schemeClr val="tx1"/>
+                </a:solidFill>
+              </a:rPr>
+              <a:t>0</a:t>
+            </a:r>
+            <a:endParaRPr lang="en-US" sz="1400" dirty="0">
+              <a:solidFill>
+                <a:schemeClr val="tx1"/>
+              </a:solidFill>
+            </a:endParaRPr>
+          </a:p>
+        </p:txBody>
+      </p:sp>
+      <p:sp>
+        <p:nvSpPr>
+          <p:cNvPr id="5" name="Rectangle 4"/>
+          <p:cNvSpPr/>
+          <p:nvPr/>
+        </p:nvSpPr>
+        <p:spPr>
+          <a:xfrm>
+            <a:off x="2606421" y="2928809"/>
+            <a:ext cx="228600" cy="228600"/>
+          </a:xfrm>
+          <a:prstGeom prst="rect">
+            <a:avLst/>
+          </a:prstGeom>
+          <a:noFill/>
+        </p:spPr>
+        <p:style>
+          <a:lnRef idx="2">
+            <a:schemeClr val="accent1">
+              <a:shade val="50000"/>
+            </a:schemeClr>
+          </a:lnRef>
+          <a:fillRef idx="1">
+            <a:schemeClr val="accent1"/>
+          </a:fillRef>
+          <a:effectRef idx="0">
+            <a:schemeClr val="accent1"/>
+          </a:effectRef>
+          <a:fontRef idx="minor">
+            <a:schemeClr val="lt1"/>
+          </a:fontRef>
+        </p:style>
+        <p:txBody>
+          <a:bodyPr rtlCol="0" anchor="ctr"/>
+          <a:lstStyle/>
+          <a:p>
+            <a:pPr algn="ctr"/>
+            <a:r>
+              <a:rPr lang="en-US" sz="1400" dirty="0" smtClean="0">
+                <a:solidFill>
+                  <a:schemeClr val="tx1"/>
+                </a:solidFill>
+              </a:rPr>
+              <a:t>0</a:t>
+            </a:r>
+            <a:endParaRPr lang="en-US" sz="1400" dirty="0">
+              <a:solidFill>
+                <a:schemeClr val="tx1"/>
+              </a:solidFill>
+            </a:endParaRPr>
+          </a:p>
+        </p:txBody>
+      </p:sp>
+      <p:sp>
+        <p:nvSpPr>
+          <p:cNvPr id="6" name="Rectangle 5"/>
+          <p:cNvSpPr/>
+          <p:nvPr/>
+        </p:nvSpPr>
+        <p:spPr>
+          <a:xfrm>
+            <a:off x="2606421" y="3157409"/>
+            <a:ext cx="228600" cy="228600"/>
+          </a:xfrm>
+          <a:prstGeom prst="rect">
+            <a:avLst/>
+          </a:prstGeom>
+          <a:noFill/>
+        </p:spPr>
+        <p:style>
+          <a:lnRef idx="2">
+            <a:schemeClr val="accent1">
+              <a:shade val="50000"/>
+            </a:schemeClr>
+          </a:lnRef>
+          <a:fillRef idx="1">
+            <a:schemeClr val="accent1"/>
+          </a:fillRef>
+          <a:effectRef idx="0">
+            <a:schemeClr val="accent1"/>
+          </a:effectRef>
+          <a:fontRef idx="minor">
+            <a:schemeClr val="lt1"/>
+          </a:fontRef>
+        </p:style>
+        <p:txBody>
+          <a:bodyPr rtlCol="0" anchor="ctr"/>
+          <a:lstStyle/>
+          <a:p>
+            <a:pPr algn="ctr"/>
+            <a:r>
+              <a:rPr lang="en-US" sz="1400" smtClean="0">
+                <a:solidFill>
+                  <a:schemeClr val="tx1"/>
+                </a:solidFill>
+              </a:rPr>
+              <a:t>0</a:t>
+            </a:r>
+            <a:endParaRPr lang="en-US" sz="1400" dirty="0">
+              <a:solidFill>
+                <a:schemeClr val="tx1"/>
+              </a:solidFill>
+            </a:endParaRPr>
+          </a:p>
+        </p:txBody>
+      </p:sp>
+      <p:sp>
+        <p:nvSpPr>
+          <p:cNvPr id="7" name="Rectangle 6"/>
+          <p:cNvSpPr/>
+          <p:nvPr/>
+        </p:nvSpPr>
+        <p:spPr>
+          <a:xfrm>
+            <a:off x="2606421" y="3386009"/>
+            <a:ext cx="228600" cy="228600"/>
+          </a:xfrm>
+          <a:prstGeom prst="rect">
+            <a:avLst/>
+          </a:prstGeom>
+          <a:noFill/>
+        </p:spPr>
+        <p:style>
+          <a:lnRef idx="2">
+            <a:schemeClr val="accent1">
+              <a:shade val="50000"/>
+            </a:schemeClr>
+          </a:lnRef>
+          <a:fillRef idx="1">
+            <a:schemeClr val="accent1"/>
+          </a:fillRef>
+          <a:effectRef idx="0">
+            <a:schemeClr val="accent1"/>
+          </a:effectRef>
+          <a:fontRef idx="minor">
+            <a:schemeClr val="lt1"/>
+          </a:fontRef>
+        </p:style>
+        <p:txBody>
+          <a:bodyPr rtlCol="0" anchor="ctr"/>
+          <a:lstStyle/>
+          <a:p>
+            <a:pPr algn="ctr"/>
+            <a:r>
+              <a:rPr lang="en-US" sz="1400" smtClean="0">
+                <a:solidFill>
+                  <a:schemeClr val="tx1"/>
+                </a:solidFill>
+              </a:rPr>
+              <a:t>0</a:t>
+            </a:r>
+            <a:endParaRPr lang="en-US" sz="1400" dirty="0">
+              <a:solidFill>
+                <a:schemeClr val="tx1"/>
+              </a:solidFill>
+            </a:endParaRPr>
+          </a:p>
+        </p:txBody>
+      </p:sp>
+      <p:sp>
+        <p:nvSpPr>
+          <p:cNvPr id="8" name="Rectangle 7"/>
+          <p:cNvSpPr/>
+          <p:nvPr/>
+        </p:nvSpPr>
+        <p:spPr>
+          <a:xfrm>
+            <a:off x="2606421" y="3614609"/>
+            <a:ext cx="228600" cy="228600"/>
+          </a:xfrm>
+          <a:prstGeom prst="rect">
+            <a:avLst/>
+          </a:prstGeom>
+          <a:noFill/>
+        </p:spPr>
+        <p:style>
+          <a:lnRef idx="2">
+            <a:schemeClr val="accent1">
+              <a:shade val="50000"/>
+            </a:schemeClr>
+          </a:lnRef>
+          <a:fillRef idx="1">
+            <a:schemeClr val="accent1"/>
+          </a:fillRef>
+          <a:effectRef idx="0">
+            <a:schemeClr val="accent1"/>
+          </a:effectRef>
+          <a:fontRef idx="minor">
+            <a:schemeClr val="lt1"/>
+          </a:fontRef>
+        </p:style>
+        <p:txBody>
+          <a:bodyPr rtlCol="0" anchor="ctr"/>
+          <a:lstStyle/>
+          <a:p>
+            <a:pPr algn="ctr"/>
+            <a:r>
+              <a:rPr lang="en-US" sz="1400" smtClean="0">
+                <a:solidFill>
+                  <a:schemeClr val="tx1"/>
+                </a:solidFill>
+              </a:rPr>
+              <a:t>0</a:t>
+            </a:r>
+            <a:endParaRPr lang="en-US" sz="1400" dirty="0">
+              <a:solidFill>
+                <a:schemeClr val="tx1"/>
+              </a:solidFill>
+            </a:endParaRPr>
+          </a:p>
+        </p:txBody>
+      </p:sp>
+      <p:sp>
+        <p:nvSpPr>
+          <p:cNvPr id="9" name="Rectangle 8"/>
+          <p:cNvSpPr/>
+          <p:nvPr/>
+        </p:nvSpPr>
+        <p:spPr>
+          <a:xfrm>
+            <a:off x="2606421" y="3843209"/>
+            <a:ext cx="228600" cy="228600"/>
+          </a:xfrm>
+          <a:prstGeom prst="rect">
+            <a:avLst/>
+          </a:prstGeom>
+          <a:noFill/>
+        </p:spPr>
+        <p:style>
+          <a:lnRef idx="2">
+            <a:schemeClr val="accent1">
+              <a:shade val="50000"/>
+            </a:schemeClr>
+          </a:lnRef>
+          <a:fillRef idx="1">
+            <a:schemeClr val="accent1"/>
+          </a:fillRef>
+          <a:effectRef idx="0">
+            <a:schemeClr val="accent1"/>
+          </a:effectRef>
+          <a:fontRef idx="minor">
+            <a:schemeClr val="lt1"/>
+          </a:fontRef>
+        </p:style>
+        <p:txBody>
+          <a:bodyPr rtlCol="0" anchor="ctr"/>
+          <a:lstStyle/>
+          <a:p>
+            <a:pPr algn="ctr"/>
+            <a:r>
+              <a:rPr lang="en-US" sz="1400" smtClean="0">
+                <a:solidFill>
+                  <a:schemeClr val="tx1"/>
+                </a:solidFill>
+              </a:rPr>
+              <a:t>0</a:t>
+            </a:r>
+            <a:endParaRPr lang="en-US" sz="1400" dirty="0">
+              <a:solidFill>
+                <a:schemeClr val="tx1"/>
+              </a:solidFill>
+            </a:endParaRPr>
+          </a:p>
+        </p:txBody>
+      </p:sp>
+      <p:sp>
+        <p:nvSpPr>
+          <p:cNvPr id="10" name="Rectangle 9"/>
+          <p:cNvSpPr/>
+          <p:nvPr/>
+        </p:nvSpPr>
+        <p:spPr>
+          <a:xfrm>
+            <a:off x="2606421" y="4071809"/>
+            <a:ext cx="228600" cy="228600"/>
+          </a:xfrm>
+          <a:prstGeom prst="rect">
+            <a:avLst/>
+          </a:prstGeom>
+        </p:spPr>
+        <p:style>
+          <a:lnRef idx="2">
+            <a:schemeClr val="accent1">
+              <a:shade val="50000"/>
+            </a:schemeClr>
+          </a:lnRef>
+          <a:fillRef idx="1">
+            <a:schemeClr val="accent1"/>
+          </a:fillRef>
+          <a:effectRef idx="0">
+            <a:schemeClr val="accent1"/>
+          </a:effectRef>
+          <a:fontRef idx="minor">
+            <a:schemeClr val="lt1"/>
+          </a:fontRef>
+        </p:style>
+        <p:txBody>
+          <a:bodyPr rtlCol="0" anchor="ctr"/>
+          <a:lstStyle/>
+          <a:p>
+            <a:pPr algn="ctr"/>
+            <a:r>
+              <a:rPr lang="en-US" sz="1400" dirty="0" smtClean="0">
+                <a:solidFill>
+                  <a:schemeClr val="bg1"/>
+                </a:solidFill>
+              </a:rPr>
+              <a:t>1</a:t>
+            </a:r>
+            <a:endParaRPr lang="en-US" sz="1400" dirty="0">
+              <a:solidFill>
+                <a:schemeClr val="bg1"/>
+              </a:solidFill>
+            </a:endParaRPr>
+          </a:p>
+        </p:txBody>
+      </p:sp>
+      <p:sp>
+        <p:nvSpPr>
+          <p:cNvPr id="11" name="Rectangle 10"/>
+          <p:cNvSpPr/>
+          <p:nvPr/>
+        </p:nvSpPr>
+        <p:spPr>
+          <a:xfrm>
+            <a:off x="2606421" y="4300409"/>
+            <a:ext cx="228600" cy="228600"/>
+          </a:xfrm>
+          <a:prstGeom prst="rect">
+            <a:avLst/>
+          </a:prstGeom>
+          <a:noFill/>
+        </p:spPr>
+        <p:style>
+          <a:lnRef idx="2">
+            <a:schemeClr val="accent1">
+              <a:shade val="50000"/>
+            </a:schemeClr>
+          </a:lnRef>
+          <a:fillRef idx="1">
+            <a:schemeClr val="accent1"/>
+          </a:fillRef>
+          <a:effectRef idx="0">
+            <a:schemeClr val="accent1"/>
+          </a:effectRef>
+          <a:fontRef idx="minor">
+            <a:schemeClr val="lt1"/>
+          </a:fontRef>
+        </p:style>
+        <p:txBody>
+          <a:bodyPr rtlCol="0" anchor="ctr"/>
+          <a:lstStyle/>
+          <a:p>
+            <a:pPr algn="ctr"/>
+            <a:r>
+              <a:rPr lang="en-US" sz="1400" smtClean="0">
+                <a:solidFill>
+                  <a:schemeClr val="tx1"/>
+                </a:solidFill>
+              </a:rPr>
+              <a:t>0</a:t>
+            </a:r>
+            <a:endParaRPr lang="en-US" sz="1400" dirty="0">
+              <a:solidFill>
+                <a:schemeClr val="tx1"/>
+              </a:solidFill>
+            </a:endParaRPr>
+          </a:p>
+        </p:txBody>
+      </p:sp>
+      <p:sp>
+        <p:nvSpPr>
+          <p:cNvPr id="12" name="Rectangle 11"/>
+          <p:cNvSpPr/>
+          <p:nvPr/>
+        </p:nvSpPr>
+        <p:spPr>
+          <a:xfrm>
+            <a:off x="2606421" y="4529009"/>
+            <a:ext cx="228600" cy="228600"/>
+          </a:xfrm>
+          <a:prstGeom prst="rect">
+            <a:avLst/>
+          </a:prstGeom>
+          <a:noFill/>
+        </p:spPr>
+        <p:style>
+          <a:lnRef idx="2">
+            <a:schemeClr val="accent1">
+              <a:shade val="50000"/>
+            </a:schemeClr>
+          </a:lnRef>
+          <a:fillRef idx="1">
+            <a:schemeClr val="accent1"/>
+          </a:fillRef>
+          <a:effectRef idx="0">
+            <a:schemeClr val="accent1"/>
+          </a:effectRef>
+          <a:fontRef idx="minor">
+            <a:schemeClr val="lt1"/>
+          </a:fontRef>
+        </p:style>
+        <p:txBody>
+          <a:bodyPr rtlCol="0" anchor="ctr"/>
+          <a:lstStyle/>
+          <a:p>
+            <a:pPr algn="ctr"/>
+            <a:r>
+              <a:rPr lang="en-US" sz="1400" smtClean="0">
+                <a:solidFill>
+                  <a:schemeClr val="tx1"/>
+                </a:solidFill>
+              </a:rPr>
+              <a:t>0</a:t>
+            </a:r>
+            <a:endParaRPr lang="en-US" sz="1400" dirty="0">
+              <a:solidFill>
+                <a:schemeClr val="tx1"/>
+              </a:solidFill>
+            </a:endParaRPr>
+          </a:p>
+        </p:txBody>
+      </p:sp>
+      <p:sp>
+        <p:nvSpPr>
+          <p:cNvPr id="13" name="Rectangle 12"/>
+          <p:cNvSpPr/>
+          <p:nvPr/>
+        </p:nvSpPr>
+        <p:spPr>
+          <a:xfrm>
+            <a:off x="2606421" y="5138609"/>
+            <a:ext cx="228600" cy="228600"/>
+          </a:xfrm>
+          <a:prstGeom prst="rect">
+            <a:avLst/>
+          </a:prstGeom>
+          <a:noFill/>
+        </p:spPr>
+        <p:style>
+          <a:lnRef idx="2">
+            <a:schemeClr val="accent1">
+              <a:shade val="50000"/>
+            </a:schemeClr>
+          </a:lnRef>
+          <a:fillRef idx="1">
+            <a:schemeClr val="accent1"/>
+          </a:fillRef>
+          <a:effectRef idx="0">
+            <a:schemeClr val="accent1"/>
+          </a:effectRef>
+          <a:fontRef idx="minor">
+            <a:schemeClr val="lt1"/>
+          </a:fontRef>
+        </p:style>
+        <p:txBody>
+          <a:bodyPr rtlCol="0" anchor="ctr"/>
+          <a:lstStyle/>
+          <a:p>
+            <a:pPr algn="ctr"/>
+            <a:r>
+              <a:rPr lang="en-US" sz="1400" smtClean="0">
+                <a:solidFill>
+                  <a:schemeClr val="tx1"/>
+                </a:solidFill>
+              </a:rPr>
+              <a:t>0</a:t>
+            </a:r>
+            <a:endParaRPr lang="en-US" sz="1400" dirty="0">
+              <a:solidFill>
+                <a:schemeClr val="tx1"/>
+              </a:solidFill>
+            </a:endParaRPr>
+          </a:p>
+        </p:txBody>
+      </p:sp>
+      <p:cxnSp>
+        <p:nvCxnSpPr>
+          <p:cNvPr id="14" name="Straight Connector 13"/>
+          <p:cNvCxnSpPr/>
+          <p:nvPr/>
+        </p:nvCxnSpPr>
+        <p:spPr>
+          <a:xfrm>
+            <a:off x="2720720" y="4825994"/>
+            <a:ext cx="1" cy="266700"/>
+          </a:xfrm>
+          <a:prstGeom prst="line">
+            <a:avLst/>
+          </a:prstGeom>
+          <a:ln>
+            <a:prstDash val="dash"/>
+          </a:ln>
+        </p:spPr>
+        <p:style>
+          <a:lnRef idx="1">
+            <a:schemeClr val="accent1"/>
+          </a:lnRef>
+          <a:fillRef idx="0">
+            <a:schemeClr val="accent1"/>
+          </a:fillRef>
+          <a:effectRef idx="0">
+            <a:schemeClr val="accent1"/>
+          </a:effectRef>
+          <a:fontRef idx="minor">
+            <a:schemeClr val="tx1"/>
+          </a:fontRef>
+        </p:style>
+      </p:cxnSp>
+      <p:sp>
+        <p:nvSpPr>
+          <p:cNvPr id="15" name="TextBox 14"/>
+          <p:cNvSpPr txBox="1"/>
+          <p:nvPr/>
+        </p:nvSpPr>
+        <p:spPr>
+          <a:xfrm>
+            <a:off x="2073021" y="1949877"/>
+            <a:ext cx="1524000" cy="369332"/>
+          </a:xfrm>
+          <a:prstGeom prst="rect">
+            <a:avLst/>
+          </a:prstGeom>
+          <a:noFill/>
+        </p:spPr>
+        <p:txBody>
+          <a:bodyPr wrap="square" rtlCol="0">
+            <a:spAutoFit/>
+          </a:bodyPr>
+          <a:lstStyle/>
+          <a:p>
+            <a:r>
+              <a:rPr lang="en-US" dirty="0" smtClean="0"/>
+              <a:t>Input Vector</a:t>
+            </a:r>
+            <a:endParaRPr lang="en-US" dirty="0"/>
+          </a:p>
+        </p:txBody>
+      </p:sp>
+      <p:sp>
+        <p:nvSpPr>
+          <p:cNvPr id="16" name="TextBox 15"/>
+          <p:cNvSpPr txBox="1"/>
+          <p:nvPr/>
+        </p:nvSpPr>
+        <p:spPr>
+          <a:xfrm>
+            <a:off x="2251796" y="5484440"/>
+            <a:ext cx="937847" cy="415498"/>
+          </a:xfrm>
+          <a:prstGeom prst="rect">
+            <a:avLst/>
+          </a:prstGeom>
+          <a:noFill/>
+        </p:spPr>
+        <p:txBody>
+          <a:bodyPr wrap="square" rtlCol="0">
+            <a:spAutoFit/>
+          </a:bodyPr>
+          <a:lstStyle/>
+          <a:p>
+            <a:pPr algn="ctr"/>
+            <a:r>
+              <a:rPr lang="en-US" sz="1050" i="1" dirty="0" smtClean="0"/>
+              <a:t>10,000</a:t>
+            </a:r>
+          </a:p>
+          <a:p>
+            <a:pPr algn="ctr"/>
+            <a:r>
+              <a:rPr lang="en-US" sz="1050" i="1" dirty="0" smtClean="0"/>
+              <a:t>positions</a:t>
+            </a:r>
+            <a:endParaRPr lang="en-US" sz="1050" i="1" dirty="0"/>
+          </a:p>
+        </p:txBody>
+      </p:sp>
+      <p:sp>
+        <p:nvSpPr>
+          <p:cNvPr id="18" name="TextBox 17"/>
+          <p:cNvSpPr txBox="1"/>
+          <p:nvPr/>
+        </p:nvSpPr>
+        <p:spPr>
+          <a:xfrm>
+            <a:off x="1029669" y="3919772"/>
+            <a:ext cx="1352061" cy="553998"/>
+          </a:xfrm>
+          <a:prstGeom prst="rect">
+            <a:avLst/>
+          </a:prstGeom>
+          <a:noFill/>
+        </p:spPr>
+        <p:txBody>
+          <a:bodyPr wrap="square" rtlCol="0">
+            <a:spAutoFit/>
+          </a:bodyPr>
+          <a:lstStyle/>
+          <a:p>
+            <a:r>
+              <a:rPr lang="en-US" sz="1000" dirty="0" smtClean="0"/>
+              <a:t>A ‘1’ in the position corresponding to the word “ants”</a:t>
+            </a:r>
+            <a:endParaRPr lang="en-US" sz="1000" dirty="0"/>
+          </a:p>
+        </p:txBody>
+      </p:sp>
+      <p:sp>
+        <p:nvSpPr>
+          <p:cNvPr id="29" name="Oval 28"/>
+          <p:cNvSpPr/>
+          <p:nvPr/>
+        </p:nvSpPr>
+        <p:spPr>
+          <a:xfrm>
+            <a:off x="4768149" y="3264877"/>
+            <a:ext cx="825572" cy="825572"/>
+          </a:xfrm>
+          <a:prstGeom prst="ellipse">
+            <a:avLst/>
+          </a:prstGeom>
+          <a:noFill/>
+          <a:ln>
+            <a:solidFill>
+              <a:schemeClr val="accent2"/>
+            </a:solidFill>
+          </a:ln>
+        </p:spPr>
+        <p:style>
+          <a:lnRef idx="2">
+            <a:schemeClr val="accent1">
+              <a:shade val="50000"/>
+            </a:schemeClr>
+          </a:lnRef>
+          <a:fillRef idx="1">
+            <a:schemeClr val="accent1"/>
+          </a:fillRef>
+          <a:effectRef idx="0">
+            <a:schemeClr val="accent1"/>
+          </a:effectRef>
+          <a:fontRef idx="minor">
+            <a:schemeClr val="lt1"/>
+          </a:fontRef>
+        </p:style>
+        <p:txBody>
+          <a:bodyPr rtlCol="0" anchor="ctr"/>
+          <a:lstStyle/>
+          <a:p>
+            <a:pPr algn="ctr"/>
+            <a:endParaRPr lang="en-US"/>
+          </a:p>
+        </p:txBody>
+      </p:sp>
+      <p:sp>
+        <p:nvSpPr>
+          <p:cNvPr id="30" name="TextBox 29"/>
+          <p:cNvSpPr txBox="1"/>
+          <p:nvPr/>
+        </p:nvSpPr>
+        <p:spPr>
+          <a:xfrm>
+            <a:off x="4961965" y="3348676"/>
+            <a:ext cx="437940" cy="646331"/>
+          </a:xfrm>
+          <a:prstGeom prst="rect">
+            <a:avLst/>
+          </a:prstGeom>
+          <a:noFill/>
+        </p:spPr>
+        <p:txBody>
+          <a:bodyPr wrap="none" rtlCol="0">
+            <a:spAutoFit/>
+          </a:bodyPr>
+          <a:lstStyle/>
+          <a:p>
+            <a:r>
+              <a:rPr lang="el-GR" sz="3600" dirty="0" smtClean="0">
+                <a:latin typeface="Cambria Math" pitchFamily="18" charset="0"/>
+                <a:ea typeface="Cambria Math" pitchFamily="18" charset="0"/>
+              </a:rPr>
+              <a:t>Σ</a:t>
+            </a:r>
+            <a:endParaRPr lang="en-US" sz="1400" dirty="0"/>
+          </a:p>
+        </p:txBody>
+      </p:sp>
+      <p:cxnSp>
+        <p:nvCxnSpPr>
+          <p:cNvPr id="31" name="Straight Connector 30"/>
+          <p:cNvCxnSpPr/>
+          <p:nvPr/>
+        </p:nvCxnSpPr>
+        <p:spPr>
+          <a:xfrm>
+            <a:off x="5180935" y="4263076"/>
+            <a:ext cx="0" cy="486000"/>
+          </a:xfrm>
+          <a:prstGeom prst="line">
+            <a:avLst/>
+          </a:prstGeom>
+          <a:ln>
+            <a:prstDash val="dash"/>
+          </a:ln>
+        </p:spPr>
+        <p:style>
+          <a:lnRef idx="1">
+            <a:schemeClr val="accent1"/>
+          </a:lnRef>
+          <a:fillRef idx="0">
+            <a:schemeClr val="accent1"/>
+          </a:fillRef>
+          <a:effectRef idx="0">
+            <a:schemeClr val="accent1"/>
+          </a:effectRef>
+          <a:fontRef idx="minor">
+            <a:schemeClr val="tx1"/>
+          </a:fontRef>
+        </p:style>
+      </p:cxnSp>
+      <p:sp>
+        <p:nvSpPr>
+          <p:cNvPr id="32" name="Oval 31"/>
+          <p:cNvSpPr/>
+          <p:nvPr/>
+        </p:nvSpPr>
+        <p:spPr>
+          <a:xfrm>
+            <a:off x="4768149" y="4879093"/>
+            <a:ext cx="825572" cy="825572"/>
+          </a:xfrm>
+          <a:prstGeom prst="ellipse">
+            <a:avLst/>
+          </a:prstGeom>
+          <a:noFill/>
+          <a:ln>
+            <a:solidFill>
+              <a:schemeClr val="accent2"/>
+            </a:solidFill>
+          </a:ln>
+        </p:spPr>
+        <p:style>
+          <a:lnRef idx="2">
+            <a:schemeClr val="accent1">
+              <a:shade val="50000"/>
+            </a:schemeClr>
+          </a:lnRef>
+          <a:fillRef idx="1">
+            <a:schemeClr val="accent1"/>
+          </a:fillRef>
+          <a:effectRef idx="0">
+            <a:schemeClr val="accent1"/>
+          </a:effectRef>
+          <a:fontRef idx="minor">
+            <a:schemeClr val="lt1"/>
+          </a:fontRef>
+        </p:style>
+        <p:txBody>
+          <a:bodyPr rtlCol="0" anchor="ctr"/>
+          <a:lstStyle/>
+          <a:p>
+            <a:pPr algn="ctr"/>
+            <a:endParaRPr lang="en-US"/>
+          </a:p>
+        </p:txBody>
+      </p:sp>
+      <p:sp>
+        <p:nvSpPr>
+          <p:cNvPr id="33" name="TextBox 32"/>
+          <p:cNvSpPr txBox="1"/>
+          <p:nvPr/>
+        </p:nvSpPr>
+        <p:spPr>
+          <a:xfrm>
+            <a:off x="4961965" y="4988345"/>
+            <a:ext cx="437940" cy="646331"/>
+          </a:xfrm>
+          <a:prstGeom prst="rect">
+            <a:avLst/>
+          </a:prstGeom>
+          <a:noFill/>
+        </p:spPr>
+        <p:txBody>
+          <a:bodyPr wrap="none" rtlCol="0">
+            <a:spAutoFit/>
+          </a:bodyPr>
+          <a:lstStyle/>
+          <a:p>
+            <a:r>
+              <a:rPr lang="el-GR" sz="3600" dirty="0" smtClean="0">
+                <a:latin typeface="Cambria Math" pitchFamily="18" charset="0"/>
+                <a:ea typeface="Cambria Math" pitchFamily="18" charset="0"/>
+              </a:rPr>
+              <a:t>Σ</a:t>
+            </a:r>
+            <a:endParaRPr lang="en-US" sz="1400" dirty="0"/>
+          </a:p>
+        </p:txBody>
+      </p:sp>
+      <p:sp>
+        <p:nvSpPr>
+          <p:cNvPr id="34" name="Oval 33"/>
+          <p:cNvSpPr/>
+          <p:nvPr/>
+        </p:nvSpPr>
+        <p:spPr>
+          <a:xfrm>
+            <a:off x="4768149" y="2128782"/>
+            <a:ext cx="825572" cy="825572"/>
+          </a:xfrm>
+          <a:prstGeom prst="ellipse">
+            <a:avLst/>
+          </a:prstGeom>
+          <a:noFill/>
+          <a:ln>
+            <a:solidFill>
+              <a:schemeClr val="accent2"/>
+            </a:solidFill>
+          </a:ln>
+        </p:spPr>
+        <p:style>
+          <a:lnRef idx="2">
+            <a:schemeClr val="accent1">
+              <a:shade val="50000"/>
+            </a:schemeClr>
+          </a:lnRef>
+          <a:fillRef idx="1">
+            <a:schemeClr val="accent1"/>
+          </a:fillRef>
+          <a:effectRef idx="0">
+            <a:schemeClr val="accent1"/>
+          </a:effectRef>
+          <a:fontRef idx="minor">
+            <a:schemeClr val="lt1"/>
+          </a:fontRef>
+        </p:style>
+        <p:txBody>
+          <a:bodyPr rtlCol="0" anchor="ctr"/>
+          <a:lstStyle/>
+          <a:p>
+            <a:pPr algn="ctr"/>
+            <a:endParaRPr lang="en-US"/>
+          </a:p>
+        </p:txBody>
+      </p:sp>
+      <p:sp>
+        <p:nvSpPr>
+          <p:cNvPr id="35" name="TextBox 34"/>
+          <p:cNvSpPr txBox="1"/>
+          <p:nvPr/>
+        </p:nvSpPr>
+        <p:spPr>
+          <a:xfrm>
+            <a:off x="4961965" y="2212581"/>
+            <a:ext cx="437940" cy="646331"/>
+          </a:xfrm>
+          <a:prstGeom prst="rect">
+            <a:avLst/>
+          </a:prstGeom>
+          <a:noFill/>
+        </p:spPr>
+        <p:txBody>
+          <a:bodyPr wrap="none" rtlCol="0">
+            <a:spAutoFit/>
+          </a:bodyPr>
+          <a:lstStyle/>
+          <a:p>
+            <a:r>
+              <a:rPr lang="el-GR" sz="3600" dirty="0" smtClean="0">
+                <a:latin typeface="Cambria Math" pitchFamily="18" charset="0"/>
+                <a:ea typeface="Cambria Math" pitchFamily="18" charset="0"/>
+              </a:rPr>
+              <a:t>Σ</a:t>
+            </a:r>
+            <a:endParaRPr lang="en-US" sz="1400" dirty="0"/>
+          </a:p>
+        </p:txBody>
+      </p:sp>
+      <p:sp>
+        <p:nvSpPr>
+          <p:cNvPr id="36" name="TextBox 35"/>
+          <p:cNvSpPr txBox="1"/>
+          <p:nvPr/>
+        </p:nvSpPr>
+        <p:spPr>
+          <a:xfrm>
+            <a:off x="4418935" y="1345483"/>
+            <a:ext cx="1524000" cy="646331"/>
+          </a:xfrm>
+          <a:prstGeom prst="rect">
+            <a:avLst/>
+          </a:prstGeom>
+          <a:noFill/>
+        </p:spPr>
+        <p:txBody>
+          <a:bodyPr wrap="square" rtlCol="0">
+            <a:spAutoFit/>
+          </a:bodyPr>
+          <a:lstStyle/>
+          <a:p>
+            <a:pPr algn="ctr"/>
+            <a:r>
+              <a:rPr lang="en-US" dirty="0" smtClean="0"/>
+              <a:t>Hidden Layer Neurons</a:t>
+            </a:r>
+            <a:endParaRPr lang="en-US" dirty="0"/>
+          </a:p>
+        </p:txBody>
+      </p:sp>
+      <p:sp>
+        <p:nvSpPr>
+          <p:cNvPr id="37" name="TextBox 36"/>
+          <p:cNvSpPr txBox="1"/>
+          <p:nvPr/>
+        </p:nvSpPr>
+        <p:spPr>
+          <a:xfrm>
+            <a:off x="4712011" y="5840459"/>
+            <a:ext cx="937847" cy="253916"/>
+          </a:xfrm>
+          <a:prstGeom prst="rect">
+            <a:avLst/>
+          </a:prstGeom>
+          <a:noFill/>
+        </p:spPr>
+        <p:txBody>
+          <a:bodyPr wrap="square" rtlCol="0">
+            <a:spAutoFit/>
+          </a:bodyPr>
+          <a:lstStyle/>
+          <a:p>
+            <a:pPr algn="ctr"/>
+            <a:r>
+              <a:rPr lang="en-US" sz="1050" i="1" dirty="0" smtClean="0"/>
+              <a:t>300 neurons</a:t>
+            </a:r>
+            <a:endParaRPr lang="en-US" sz="1050" i="1" dirty="0"/>
+          </a:p>
+        </p:txBody>
+      </p:sp>
+      <p:cxnSp>
+        <p:nvCxnSpPr>
+          <p:cNvPr id="41" name="Straight Arrow Connector 40"/>
+          <p:cNvCxnSpPr/>
+          <p:nvPr/>
+        </p:nvCxnSpPr>
+        <p:spPr>
+          <a:xfrm flipV="1">
+            <a:off x="2978630" y="2654725"/>
+            <a:ext cx="1663701" cy="954589"/>
+          </a:xfrm>
+          <a:prstGeom prst="straightConnector1">
+            <a:avLst/>
+          </a:prstGeom>
+          <a:ln>
+            <a:tailEnd type="triangle"/>
+          </a:ln>
+        </p:spPr>
+        <p:style>
+          <a:lnRef idx="1">
+            <a:schemeClr val="accent1"/>
+          </a:lnRef>
+          <a:fillRef idx="0">
+            <a:schemeClr val="accent1"/>
+          </a:fillRef>
+          <a:effectRef idx="0">
+            <a:schemeClr val="accent1"/>
+          </a:effectRef>
+          <a:fontRef idx="minor">
+            <a:schemeClr val="tx1"/>
+          </a:fontRef>
+        </p:style>
+      </p:cxnSp>
+      <p:cxnSp>
+        <p:nvCxnSpPr>
+          <p:cNvPr id="42" name="Straight Arrow Connector 41"/>
+          <p:cNvCxnSpPr/>
+          <p:nvPr/>
+        </p:nvCxnSpPr>
+        <p:spPr>
+          <a:xfrm>
+            <a:off x="2978630" y="3836789"/>
+            <a:ext cx="1663701" cy="1104488"/>
+          </a:xfrm>
+          <a:prstGeom prst="straightConnector1">
+            <a:avLst/>
+          </a:prstGeom>
+          <a:ln>
+            <a:tailEnd type="triangle"/>
+          </a:ln>
+        </p:spPr>
+        <p:style>
+          <a:lnRef idx="1">
+            <a:schemeClr val="accent1"/>
+          </a:lnRef>
+          <a:fillRef idx="0">
+            <a:schemeClr val="accent1"/>
+          </a:fillRef>
+          <a:effectRef idx="0">
+            <a:schemeClr val="accent1"/>
+          </a:effectRef>
+          <a:fontRef idx="minor">
+            <a:schemeClr val="tx1"/>
+          </a:fontRef>
+        </p:style>
+      </p:cxnSp>
+      <p:cxnSp>
+        <p:nvCxnSpPr>
+          <p:cNvPr id="44" name="Straight Arrow Connector 43"/>
+          <p:cNvCxnSpPr/>
+          <p:nvPr/>
+        </p:nvCxnSpPr>
+        <p:spPr>
+          <a:xfrm>
+            <a:off x="2978630" y="3712304"/>
+            <a:ext cx="1663701" cy="0"/>
+          </a:xfrm>
+          <a:prstGeom prst="straightConnector1">
+            <a:avLst/>
+          </a:prstGeom>
+          <a:ln>
+            <a:tailEnd type="triangle"/>
+          </a:ln>
+        </p:spPr>
+        <p:style>
+          <a:lnRef idx="1">
+            <a:schemeClr val="accent1"/>
+          </a:lnRef>
+          <a:fillRef idx="0">
+            <a:schemeClr val="accent1"/>
+          </a:fillRef>
+          <a:effectRef idx="0">
+            <a:schemeClr val="accent1"/>
+          </a:effectRef>
+          <a:fontRef idx="minor">
+            <a:schemeClr val="tx1"/>
+          </a:fontRef>
+        </p:style>
+      </p:cxnSp>
+      <p:sp>
+        <p:nvSpPr>
+          <p:cNvPr id="52" name="Oval 51"/>
+          <p:cNvSpPr/>
+          <p:nvPr/>
+        </p:nvSpPr>
+        <p:spPr>
+          <a:xfrm>
+            <a:off x="7446074" y="2622277"/>
+            <a:ext cx="825572" cy="825572"/>
+          </a:xfrm>
+          <a:prstGeom prst="ellipse">
+            <a:avLst/>
+          </a:prstGeom>
+          <a:noFill/>
+          <a:ln>
+            <a:solidFill>
+              <a:srgbClr val="FF0000"/>
+            </a:solidFill>
+          </a:ln>
+        </p:spPr>
+        <p:style>
+          <a:lnRef idx="2">
+            <a:schemeClr val="accent1">
+              <a:shade val="50000"/>
+            </a:schemeClr>
+          </a:lnRef>
+          <a:fillRef idx="1">
+            <a:schemeClr val="accent1"/>
+          </a:fillRef>
+          <a:effectRef idx="0">
+            <a:schemeClr val="accent1"/>
+          </a:effectRef>
+          <a:fontRef idx="minor">
+            <a:schemeClr val="lt1"/>
+          </a:fontRef>
+        </p:style>
+        <p:txBody>
+          <a:bodyPr rtlCol="0" anchor="ctr"/>
+          <a:lstStyle/>
+          <a:p>
+            <a:pPr algn="ctr"/>
+            <a:endParaRPr lang="en-US"/>
+          </a:p>
+        </p:txBody>
+      </p:sp>
+      <p:sp>
+        <p:nvSpPr>
+          <p:cNvPr id="53" name="TextBox 52"/>
+          <p:cNvSpPr txBox="1"/>
+          <p:nvPr/>
+        </p:nvSpPr>
+        <p:spPr>
+          <a:xfrm>
+            <a:off x="7639890" y="2706076"/>
+            <a:ext cx="437940" cy="646331"/>
+          </a:xfrm>
+          <a:prstGeom prst="rect">
+            <a:avLst/>
+          </a:prstGeom>
+          <a:noFill/>
+        </p:spPr>
+        <p:txBody>
+          <a:bodyPr wrap="none" rtlCol="0">
+            <a:spAutoFit/>
+          </a:bodyPr>
+          <a:lstStyle/>
+          <a:p>
+            <a:r>
+              <a:rPr lang="el-GR" sz="3600" dirty="0" smtClean="0">
+                <a:latin typeface="Cambria Math" pitchFamily="18" charset="0"/>
+                <a:ea typeface="Cambria Math" pitchFamily="18" charset="0"/>
+              </a:rPr>
+              <a:t>Σ</a:t>
+            </a:r>
+            <a:endParaRPr lang="en-US" sz="1400" dirty="0"/>
+          </a:p>
+        </p:txBody>
+      </p:sp>
+      <p:cxnSp>
+        <p:nvCxnSpPr>
+          <p:cNvPr id="54" name="Straight Connector 53"/>
+          <p:cNvCxnSpPr/>
+          <p:nvPr/>
+        </p:nvCxnSpPr>
+        <p:spPr>
+          <a:xfrm>
+            <a:off x="7858860" y="3620476"/>
+            <a:ext cx="0" cy="486000"/>
+          </a:xfrm>
+          <a:prstGeom prst="line">
+            <a:avLst/>
+          </a:prstGeom>
+          <a:ln>
+            <a:prstDash val="dash"/>
+          </a:ln>
+        </p:spPr>
+        <p:style>
+          <a:lnRef idx="1">
+            <a:schemeClr val="accent1"/>
+          </a:lnRef>
+          <a:fillRef idx="0">
+            <a:schemeClr val="accent1"/>
+          </a:fillRef>
+          <a:effectRef idx="0">
+            <a:schemeClr val="accent1"/>
+          </a:effectRef>
+          <a:fontRef idx="minor">
+            <a:schemeClr val="tx1"/>
+          </a:fontRef>
+        </p:style>
+      </p:cxnSp>
+      <p:cxnSp>
+        <p:nvCxnSpPr>
+          <p:cNvPr id="55" name="Straight Arrow Connector 54"/>
+          <p:cNvCxnSpPr>
+            <a:stCxn id="34" idx="6"/>
+            <a:endCxn id="52" idx="2"/>
+          </p:cNvCxnSpPr>
+          <p:nvPr/>
+        </p:nvCxnSpPr>
+        <p:spPr>
+          <a:xfrm>
+            <a:off x="5593721" y="2541568"/>
+            <a:ext cx="1852353" cy="493495"/>
+          </a:xfrm>
+          <a:prstGeom prst="straightConnector1">
+            <a:avLst/>
+          </a:prstGeom>
+          <a:ln>
+            <a:tailEnd type="arrow"/>
+          </a:ln>
+        </p:spPr>
+        <p:style>
+          <a:lnRef idx="1">
+            <a:schemeClr val="accent1"/>
+          </a:lnRef>
+          <a:fillRef idx="0">
+            <a:schemeClr val="accent1"/>
+          </a:fillRef>
+          <a:effectRef idx="0">
+            <a:schemeClr val="accent1"/>
+          </a:effectRef>
+          <a:fontRef idx="minor">
+            <a:schemeClr val="tx1"/>
+          </a:fontRef>
+        </p:style>
+      </p:cxnSp>
+      <p:cxnSp>
+        <p:nvCxnSpPr>
+          <p:cNvPr id="56" name="Straight Arrow Connector 55"/>
+          <p:cNvCxnSpPr>
+            <a:stCxn id="34" idx="6"/>
+            <a:endCxn id="62" idx="2"/>
+          </p:cNvCxnSpPr>
+          <p:nvPr/>
+        </p:nvCxnSpPr>
+        <p:spPr>
+          <a:xfrm>
+            <a:off x="5593721" y="2541568"/>
+            <a:ext cx="1852353" cy="2107711"/>
+          </a:xfrm>
+          <a:prstGeom prst="straightConnector1">
+            <a:avLst/>
+          </a:prstGeom>
+          <a:ln>
+            <a:tailEnd type="arrow"/>
+          </a:ln>
+        </p:spPr>
+        <p:style>
+          <a:lnRef idx="1">
+            <a:schemeClr val="accent1"/>
+          </a:lnRef>
+          <a:fillRef idx="0">
+            <a:schemeClr val="accent1"/>
+          </a:fillRef>
+          <a:effectRef idx="0">
+            <a:schemeClr val="accent1"/>
+          </a:effectRef>
+          <a:fontRef idx="minor">
+            <a:schemeClr val="tx1"/>
+          </a:fontRef>
+        </p:style>
+      </p:cxnSp>
+      <p:cxnSp>
+        <p:nvCxnSpPr>
+          <p:cNvPr id="57" name="Straight Arrow Connector 56"/>
+          <p:cNvCxnSpPr>
+            <a:stCxn id="29" idx="6"/>
+            <a:endCxn id="52" idx="2"/>
+          </p:cNvCxnSpPr>
+          <p:nvPr/>
+        </p:nvCxnSpPr>
+        <p:spPr>
+          <a:xfrm flipV="1">
+            <a:off x="5593721" y="3035063"/>
+            <a:ext cx="1852353" cy="642600"/>
+          </a:xfrm>
+          <a:prstGeom prst="straightConnector1">
+            <a:avLst/>
+          </a:prstGeom>
+          <a:ln>
+            <a:tailEnd type="arrow"/>
+          </a:ln>
+        </p:spPr>
+        <p:style>
+          <a:lnRef idx="1">
+            <a:schemeClr val="accent1"/>
+          </a:lnRef>
+          <a:fillRef idx="0">
+            <a:schemeClr val="accent1"/>
+          </a:fillRef>
+          <a:effectRef idx="0">
+            <a:schemeClr val="accent1"/>
+          </a:effectRef>
+          <a:fontRef idx="minor">
+            <a:schemeClr val="tx1"/>
+          </a:fontRef>
+        </p:style>
+      </p:cxnSp>
+      <p:cxnSp>
+        <p:nvCxnSpPr>
+          <p:cNvPr id="58" name="Straight Arrow Connector 57"/>
+          <p:cNvCxnSpPr>
+            <a:stCxn id="32" idx="6"/>
+            <a:endCxn id="52" idx="2"/>
+          </p:cNvCxnSpPr>
+          <p:nvPr/>
+        </p:nvCxnSpPr>
+        <p:spPr>
+          <a:xfrm flipV="1">
+            <a:off x="5593721" y="3035063"/>
+            <a:ext cx="1852353" cy="2256816"/>
+          </a:xfrm>
+          <a:prstGeom prst="straightConnector1">
+            <a:avLst/>
+          </a:prstGeom>
+          <a:ln>
+            <a:tailEnd type="arrow"/>
+          </a:ln>
+        </p:spPr>
+        <p:style>
+          <a:lnRef idx="1">
+            <a:schemeClr val="accent1"/>
+          </a:lnRef>
+          <a:fillRef idx="0">
+            <a:schemeClr val="accent1"/>
+          </a:fillRef>
+          <a:effectRef idx="0">
+            <a:schemeClr val="accent1"/>
+          </a:effectRef>
+          <a:fontRef idx="minor">
+            <a:schemeClr val="tx1"/>
+          </a:fontRef>
+        </p:style>
+      </p:cxnSp>
+      <p:cxnSp>
+        <p:nvCxnSpPr>
+          <p:cNvPr id="59" name="Straight Arrow Connector 58"/>
+          <p:cNvCxnSpPr>
+            <a:stCxn id="32" idx="6"/>
+            <a:endCxn id="62" idx="2"/>
+          </p:cNvCxnSpPr>
+          <p:nvPr/>
+        </p:nvCxnSpPr>
+        <p:spPr>
+          <a:xfrm flipV="1">
+            <a:off x="5593721" y="4649279"/>
+            <a:ext cx="1852353" cy="642600"/>
+          </a:xfrm>
+          <a:prstGeom prst="straightConnector1">
+            <a:avLst/>
+          </a:prstGeom>
+          <a:ln>
+            <a:tailEnd type="arrow"/>
+          </a:ln>
+        </p:spPr>
+        <p:style>
+          <a:lnRef idx="1">
+            <a:schemeClr val="accent1"/>
+          </a:lnRef>
+          <a:fillRef idx="0">
+            <a:schemeClr val="accent1"/>
+          </a:fillRef>
+          <a:effectRef idx="0">
+            <a:schemeClr val="accent1"/>
+          </a:effectRef>
+          <a:fontRef idx="minor">
+            <a:schemeClr val="tx1"/>
+          </a:fontRef>
+        </p:style>
+      </p:cxnSp>
+      <p:cxnSp>
+        <p:nvCxnSpPr>
+          <p:cNvPr id="60" name="Straight Arrow Connector 59"/>
+          <p:cNvCxnSpPr/>
+          <p:nvPr/>
+        </p:nvCxnSpPr>
+        <p:spPr>
+          <a:xfrm>
+            <a:off x="8395680" y="3035063"/>
+            <a:ext cx="304800" cy="0"/>
+          </a:xfrm>
+          <a:prstGeom prst="straightConnector1">
+            <a:avLst/>
+          </a:prstGeom>
+          <a:ln>
+            <a:tailEnd type="arrow"/>
+          </a:ln>
+        </p:spPr>
+        <p:style>
+          <a:lnRef idx="1">
+            <a:schemeClr val="accent1"/>
+          </a:lnRef>
+          <a:fillRef idx="0">
+            <a:schemeClr val="accent1"/>
+          </a:fillRef>
+          <a:effectRef idx="0">
+            <a:schemeClr val="accent1"/>
+          </a:effectRef>
+          <a:fontRef idx="minor">
+            <a:schemeClr val="tx1"/>
+          </a:fontRef>
+        </p:style>
+      </p:cxnSp>
+      <p:cxnSp>
+        <p:nvCxnSpPr>
+          <p:cNvPr id="61" name="Straight Arrow Connector 60"/>
+          <p:cNvCxnSpPr>
+            <a:stCxn id="29" idx="6"/>
+            <a:endCxn id="62" idx="2"/>
+          </p:cNvCxnSpPr>
+          <p:nvPr/>
+        </p:nvCxnSpPr>
+        <p:spPr>
+          <a:xfrm>
+            <a:off x="5593721" y="3677663"/>
+            <a:ext cx="1852353" cy="971616"/>
+          </a:xfrm>
+          <a:prstGeom prst="straightConnector1">
+            <a:avLst/>
+          </a:prstGeom>
+          <a:ln>
+            <a:tailEnd type="arrow"/>
+          </a:ln>
+        </p:spPr>
+        <p:style>
+          <a:lnRef idx="1">
+            <a:schemeClr val="accent1"/>
+          </a:lnRef>
+          <a:fillRef idx="0">
+            <a:schemeClr val="accent1"/>
+          </a:fillRef>
+          <a:effectRef idx="0">
+            <a:schemeClr val="accent1"/>
+          </a:effectRef>
+          <a:fontRef idx="minor">
+            <a:schemeClr val="tx1"/>
+          </a:fontRef>
+        </p:style>
+      </p:cxnSp>
+      <p:sp>
+        <p:nvSpPr>
+          <p:cNvPr id="62" name="Oval 61"/>
+          <p:cNvSpPr/>
+          <p:nvPr/>
+        </p:nvSpPr>
+        <p:spPr>
+          <a:xfrm>
+            <a:off x="7446074" y="4236493"/>
+            <a:ext cx="825572" cy="825572"/>
+          </a:xfrm>
+          <a:prstGeom prst="ellipse">
+            <a:avLst/>
+          </a:prstGeom>
+          <a:noFill/>
+          <a:ln>
+            <a:solidFill>
+              <a:srgbClr val="FF0000"/>
+            </a:solidFill>
+          </a:ln>
+        </p:spPr>
+        <p:style>
+          <a:lnRef idx="2">
+            <a:schemeClr val="accent1">
+              <a:shade val="50000"/>
+            </a:schemeClr>
+          </a:lnRef>
+          <a:fillRef idx="1">
+            <a:schemeClr val="accent1"/>
+          </a:fillRef>
+          <a:effectRef idx="0">
+            <a:schemeClr val="accent1"/>
+          </a:effectRef>
+          <a:fontRef idx="minor">
+            <a:schemeClr val="lt1"/>
+          </a:fontRef>
+        </p:style>
+        <p:txBody>
+          <a:bodyPr rtlCol="0" anchor="ctr"/>
+          <a:lstStyle/>
+          <a:p>
+            <a:pPr algn="ctr"/>
+            <a:endParaRPr lang="en-US"/>
+          </a:p>
+        </p:txBody>
+      </p:sp>
+      <p:sp>
+        <p:nvSpPr>
+          <p:cNvPr id="63" name="TextBox 62"/>
+          <p:cNvSpPr txBox="1"/>
+          <p:nvPr/>
+        </p:nvSpPr>
+        <p:spPr>
+          <a:xfrm>
+            <a:off x="7230210" y="1879544"/>
+            <a:ext cx="1257300" cy="646331"/>
+          </a:xfrm>
+          <a:prstGeom prst="rect">
+            <a:avLst/>
+          </a:prstGeom>
+          <a:noFill/>
+        </p:spPr>
+        <p:txBody>
+          <a:bodyPr wrap="square" rtlCol="0">
+            <a:spAutoFit/>
+          </a:bodyPr>
+          <a:lstStyle/>
+          <a:p>
+            <a:pPr algn="ctr"/>
+            <a:r>
+              <a:rPr lang="en-US" dirty="0" smtClean="0"/>
+              <a:t>Output </a:t>
+            </a:r>
+            <a:r>
+              <a:rPr lang="en-US" dirty="0" smtClean="0"/>
+              <a:t>Neurons</a:t>
+            </a:r>
+            <a:endParaRPr lang="en-US" dirty="0"/>
+          </a:p>
+        </p:txBody>
+      </p:sp>
+      <p:sp>
+        <p:nvSpPr>
+          <p:cNvPr id="71" name="TextBox 70"/>
+          <p:cNvSpPr txBox="1"/>
+          <p:nvPr/>
+        </p:nvSpPr>
+        <p:spPr>
+          <a:xfrm>
+            <a:off x="7639890" y="4330115"/>
+            <a:ext cx="437940" cy="646331"/>
+          </a:xfrm>
+          <a:prstGeom prst="rect">
+            <a:avLst/>
+          </a:prstGeom>
+          <a:noFill/>
+        </p:spPr>
+        <p:txBody>
+          <a:bodyPr wrap="none" rtlCol="0">
+            <a:spAutoFit/>
+          </a:bodyPr>
+          <a:lstStyle/>
+          <a:p>
+            <a:r>
+              <a:rPr lang="el-GR" sz="3600" dirty="0" smtClean="0">
+                <a:latin typeface="Cambria Math" pitchFamily="18" charset="0"/>
+                <a:ea typeface="Cambria Math" pitchFamily="18" charset="0"/>
+              </a:rPr>
+              <a:t>Σ</a:t>
+            </a:r>
+            <a:endParaRPr lang="en-US" sz="1400" dirty="0"/>
+          </a:p>
+        </p:txBody>
+      </p:sp>
+      <p:sp>
+        <p:nvSpPr>
+          <p:cNvPr id="72" name="TextBox 71"/>
+          <p:cNvSpPr txBox="1"/>
+          <p:nvPr/>
+        </p:nvSpPr>
+        <p:spPr>
+          <a:xfrm>
+            <a:off x="9872567" y="2622535"/>
+            <a:ext cx="1462631" cy="461665"/>
+          </a:xfrm>
+          <a:prstGeom prst="rect">
+            <a:avLst/>
+          </a:prstGeom>
+          <a:noFill/>
+        </p:spPr>
+        <p:txBody>
+          <a:bodyPr wrap="square" rtlCol="0">
+            <a:spAutoFit/>
+          </a:bodyPr>
+          <a:lstStyle/>
+          <a:p>
+            <a:r>
+              <a:rPr lang="en-US" sz="1200" dirty="0" smtClean="0"/>
+              <a:t>Word probabilities for position </a:t>
+            </a:r>
+            <a:r>
+              <a:rPr lang="en-US" sz="1200" b="1" dirty="0" smtClean="0"/>
+              <a:t>-2</a:t>
+            </a:r>
+            <a:endParaRPr lang="en-US" sz="1200" b="1" dirty="0"/>
+          </a:p>
+        </p:txBody>
+      </p:sp>
+      <p:cxnSp>
+        <p:nvCxnSpPr>
+          <p:cNvPr id="73" name="Straight Arrow Connector 72"/>
+          <p:cNvCxnSpPr/>
+          <p:nvPr/>
+        </p:nvCxnSpPr>
+        <p:spPr>
+          <a:xfrm>
+            <a:off x="8411310" y="4649279"/>
+            <a:ext cx="304800" cy="0"/>
+          </a:xfrm>
+          <a:prstGeom prst="straightConnector1">
+            <a:avLst/>
+          </a:prstGeom>
+          <a:ln>
+            <a:tailEnd type="arrow"/>
+          </a:ln>
+        </p:spPr>
+        <p:style>
+          <a:lnRef idx="1">
+            <a:schemeClr val="accent1"/>
+          </a:lnRef>
+          <a:fillRef idx="0">
+            <a:schemeClr val="accent1"/>
+          </a:fillRef>
+          <a:effectRef idx="0">
+            <a:schemeClr val="accent1"/>
+          </a:effectRef>
+          <a:fontRef idx="minor">
+            <a:schemeClr val="tx1"/>
+          </a:fontRef>
+        </p:style>
+      </p:cxnSp>
+      <p:sp>
+        <p:nvSpPr>
+          <p:cNvPr id="82" name="Rectangle 81"/>
+          <p:cNvSpPr/>
+          <p:nvPr/>
+        </p:nvSpPr>
+        <p:spPr>
+          <a:xfrm>
+            <a:off x="8925666" y="2116078"/>
+            <a:ext cx="583222" cy="228600"/>
+          </a:xfrm>
+          <a:prstGeom prst="rect">
+            <a:avLst/>
+          </a:prstGeom>
+          <a:noFill/>
+        </p:spPr>
+        <p:style>
+          <a:lnRef idx="2">
+            <a:schemeClr val="accent1">
+              <a:shade val="50000"/>
+            </a:schemeClr>
+          </a:lnRef>
+          <a:fillRef idx="1">
+            <a:schemeClr val="accent1"/>
+          </a:fillRef>
+          <a:effectRef idx="0">
+            <a:schemeClr val="accent1"/>
+          </a:effectRef>
+          <a:fontRef idx="minor">
+            <a:schemeClr val="lt1"/>
+          </a:fontRef>
+        </p:style>
+        <p:txBody>
+          <a:bodyPr rtlCol="0" anchor="ctr"/>
+          <a:lstStyle/>
+          <a:p>
+            <a:pPr algn="ctr"/>
+            <a:r>
+              <a:rPr lang="en-US" sz="1050" dirty="0" smtClean="0">
+                <a:solidFill>
+                  <a:schemeClr val="tx1"/>
+                </a:solidFill>
+              </a:rPr>
+              <a:t>0.0021</a:t>
+            </a:r>
+            <a:endParaRPr lang="en-US" sz="1050" dirty="0">
+              <a:solidFill>
+                <a:schemeClr val="tx1"/>
+              </a:solidFill>
+            </a:endParaRPr>
+          </a:p>
+        </p:txBody>
+      </p:sp>
+      <p:sp>
+        <p:nvSpPr>
+          <p:cNvPr id="94" name="TextBox 93"/>
+          <p:cNvSpPr txBox="1"/>
+          <p:nvPr/>
+        </p:nvSpPr>
+        <p:spPr>
+          <a:xfrm>
+            <a:off x="8748353" y="3671181"/>
+            <a:ext cx="937847" cy="415498"/>
+          </a:xfrm>
+          <a:prstGeom prst="rect">
+            <a:avLst/>
+          </a:prstGeom>
+          <a:noFill/>
+        </p:spPr>
+        <p:txBody>
+          <a:bodyPr wrap="square" rtlCol="0">
+            <a:spAutoFit/>
+          </a:bodyPr>
+          <a:lstStyle/>
+          <a:p>
+            <a:pPr algn="ctr"/>
+            <a:r>
+              <a:rPr lang="en-US" sz="1050" i="1" dirty="0" smtClean="0"/>
+              <a:t>10,000</a:t>
+            </a:r>
+          </a:p>
+          <a:p>
+            <a:pPr algn="ctr"/>
+            <a:r>
+              <a:rPr lang="en-US" sz="1050" i="1" dirty="0" smtClean="0"/>
+              <a:t>positions</a:t>
+            </a:r>
+            <a:endParaRPr lang="en-US" sz="1050" i="1" dirty="0"/>
+          </a:p>
+        </p:txBody>
+      </p:sp>
+      <p:sp>
+        <p:nvSpPr>
+          <p:cNvPr id="96" name="Rectangle 95"/>
+          <p:cNvSpPr/>
+          <p:nvPr/>
+        </p:nvSpPr>
+        <p:spPr>
+          <a:xfrm>
+            <a:off x="8925666" y="2342172"/>
+            <a:ext cx="583222" cy="228600"/>
+          </a:xfrm>
+          <a:prstGeom prst="rect">
+            <a:avLst/>
+          </a:prstGeom>
+          <a:noFill/>
+        </p:spPr>
+        <p:style>
+          <a:lnRef idx="2">
+            <a:schemeClr val="accent1">
+              <a:shade val="50000"/>
+            </a:schemeClr>
+          </a:lnRef>
+          <a:fillRef idx="1">
+            <a:schemeClr val="accent1"/>
+          </a:fillRef>
+          <a:effectRef idx="0">
+            <a:schemeClr val="accent1"/>
+          </a:effectRef>
+          <a:fontRef idx="minor">
+            <a:schemeClr val="lt1"/>
+          </a:fontRef>
+        </p:style>
+        <p:txBody>
+          <a:bodyPr rtlCol="0" anchor="ctr"/>
+          <a:lstStyle/>
+          <a:p>
+            <a:pPr algn="ctr"/>
+            <a:r>
+              <a:rPr lang="en-US" sz="1050" dirty="0" smtClean="0">
+                <a:solidFill>
+                  <a:schemeClr val="tx1"/>
+                </a:solidFill>
+              </a:rPr>
+              <a:t>0.0471</a:t>
+            </a:r>
+            <a:endParaRPr lang="en-US" sz="1050" dirty="0">
+              <a:solidFill>
+                <a:schemeClr val="tx1"/>
+              </a:solidFill>
+            </a:endParaRPr>
+          </a:p>
+        </p:txBody>
+      </p:sp>
+      <p:sp>
+        <p:nvSpPr>
+          <p:cNvPr id="97" name="Rectangle 96"/>
+          <p:cNvSpPr/>
+          <p:nvPr/>
+        </p:nvSpPr>
+        <p:spPr>
+          <a:xfrm>
+            <a:off x="8925666" y="2568266"/>
+            <a:ext cx="583222" cy="228600"/>
+          </a:xfrm>
+          <a:prstGeom prst="rect">
+            <a:avLst/>
+          </a:prstGeom>
+          <a:noFill/>
+        </p:spPr>
+        <p:style>
+          <a:lnRef idx="2">
+            <a:schemeClr val="accent1">
+              <a:shade val="50000"/>
+            </a:schemeClr>
+          </a:lnRef>
+          <a:fillRef idx="1">
+            <a:schemeClr val="accent1"/>
+          </a:fillRef>
+          <a:effectRef idx="0">
+            <a:schemeClr val="accent1"/>
+          </a:effectRef>
+          <a:fontRef idx="minor">
+            <a:schemeClr val="lt1"/>
+          </a:fontRef>
+        </p:style>
+        <p:txBody>
+          <a:bodyPr rtlCol="0" anchor="ctr"/>
+          <a:lstStyle/>
+          <a:p>
+            <a:pPr algn="ctr"/>
+            <a:r>
+              <a:rPr lang="en-US" sz="1050" dirty="0" smtClean="0">
+                <a:solidFill>
+                  <a:schemeClr val="tx1"/>
+                </a:solidFill>
+              </a:rPr>
+              <a:t>0.0063</a:t>
+            </a:r>
+            <a:endParaRPr lang="en-US" sz="1050" dirty="0">
+              <a:solidFill>
+                <a:schemeClr val="tx1"/>
+              </a:solidFill>
+            </a:endParaRPr>
+          </a:p>
+        </p:txBody>
+      </p:sp>
+      <p:sp>
+        <p:nvSpPr>
+          <p:cNvPr id="98" name="Rectangle 97"/>
+          <p:cNvSpPr/>
+          <p:nvPr/>
+        </p:nvSpPr>
+        <p:spPr>
+          <a:xfrm>
+            <a:off x="8925666" y="2794359"/>
+            <a:ext cx="583222" cy="228600"/>
+          </a:xfrm>
+          <a:prstGeom prst="rect">
+            <a:avLst/>
+          </a:prstGeom>
+          <a:noFill/>
+        </p:spPr>
+        <p:style>
+          <a:lnRef idx="2">
+            <a:schemeClr val="accent1">
+              <a:shade val="50000"/>
+            </a:schemeClr>
+          </a:lnRef>
+          <a:fillRef idx="1">
+            <a:schemeClr val="accent1"/>
+          </a:fillRef>
+          <a:effectRef idx="0">
+            <a:schemeClr val="accent1"/>
+          </a:effectRef>
+          <a:fontRef idx="minor">
+            <a:schemeClr val="lt1"/>
+          </a:fontRef>
+        </p:style>
+        <p:txBody>
+          <a:bodyPr rtlCol="0" anchor="ctr"/>
+          <a:lstStyle/>
+          <a:p>
+            <a:pPr algn="ctr"/>
+            <a:r>
+              <a:rPr lang="en-US" sz="1050" dirty="0" smtClean="0">
+                <a:solidFill>
+                  <a:schemeClr val="tx1"/>
+                </a:solidFill>
+              </a:rPr>
+              <a:t>0.0005</a:t>
+            </a:r>
+            <a:endParaRPr lang="en-US" sz="1050" dirty="0">
+              <a:solidFill>
+                <a:schemeClr val="tx1"/>
+              </a:solidFill>
+            </a:endParaRPr>
+          </a:p>
+        </p:txBody>
+      </p:sp>
+      <p:sp>
+        <p:nvSpPr>
+          <p:cNvPr id="99" name="Rectangle 98"/>
+          <p:cNvSpPr/>
+          <p:nvPr/>
+        </p:nvSpPr>
+        <p:spPr>
+          <a:xfrm>
+            <a:off x="8930408" y="3408398"/>
+            <a:ext cx="583222" cy="228600"/>
+          </a:xfrm>
+          <a:prstGeom prst="rect">
+            <a:avLst/>
+          </a:prstGeom>
+          <a:noFill/>
+        </p:spPr>
+        <p:style>
+          <a:lnRef idx="2">
+            <a:schemeClr val="accent1">
+              <a:shade val="50000"/>
+            </a:schemeClr>
+          </a:lnRef>
+          <a:fillRef idx="1">
+            <a:schemeClr val="accent1"/>
+          </a:fillRef>
+          <a:effectRef idx="0">
+            <a:schemeClr val="accent1"/>
+          </a:effectRef>
+          <a:fontRef idx="minor">
+            <a:schemeClr val="lt1"/>
+          </a:fontRef>
+        </p:style>
+        <p:txBody>
+          <a:bodyPr rtlCol="0" anchor="ctr"/>
+          <a:lstStyle/>
+          <a:p>
+            <a:pPr algn="ctr"/>
+            <a:r>
+              <a:rPr lang="en-US" sz="1050" dirty="0" smtClean="0">
+                <a:solidFill>
+                  <a:schemeClr val="tx1"/>
+                </a:solidFill>
+              </a:rPr>
+              <a:t>0.0316</a:t>
+            </a:r>
+            <a:endParaRPr lang="en-US" sz="1050" dirty="0">
+              <a:solidFill>
+                <a:schemeClr val="tx1"/>
+              </a:solidFill>
+            </a:endParaRPr>
+          </a:p>
+        </p:txBody>
+      </p:sp>
+      <p:cxnSp>
+        <p:nvCxnSpPr>
+          <p:cNvPr id="100" name="Straight Connector 99"/>
+          <p:cNvCxnSpPr/>
+          <p:nvPr/>
+        </p:nvCxnSpPr>
+        <p:spPr>
+          <a:xfrm>
+            <a:off x="9219578" y="3083424"/>
+            <a:ext cx="1" cy="266700"/>
+          </a:xfrm>
+          <a:prstGeom prst="line">
+            <a:avLst/>
+          </a:prstGeom>
+          <a:ln>
+            <a:prstDash val="dash"/>
+          </a:ln>
+        </p:spPr>
+        <p:style>
+          <a:lnRef idx="1">
+            <a:schemeClr val="accent1"/>
+          </a:lnRef>
+          <a:fillRef idx="0">
+            <a:schemeClr val="accent1"/>
+          </a:fillRef>
+          <a:effectRef idx="0">
+            <a:schemeClr val="accent1"/>
+          </a:effectRef>
+          <a:fontRef idx="minor">
+            <a:schemeClr val="tx1"/>
+          </a:fontRef>
+        </p:style>
+      </p:cxnSp>
+      <p:sp>
+        <p:nvSpPr>
+          <p:cNvPr id="101" name="TextBox 100"/>
+          <p:cNvSpPr txBox="1"/>
+          <p:nvPr/>
+        </p:nvSpPr>
+        <p:spPr>
+          <a:xfrm>
+            <a:off x="7389937" y="5216785"/>
+            <a:ext cx="937847" cy="253916"/>
+          </a:xfrm>
+          <a:prstGeom prst="rect">
+            <a:avLst/>
+          </a:prstGeom>
+          <a:noFill/>
+        </p:spPr>
+        <p:txBody>
+          <a:bodyPr wrap="square" rtlCol="0">
+            <a:spAutoFit/>
+          </a:bodyPr>
+          <a:lstStyle/>
+          <a:p>
+            <a:pPr algn="ctr"/>
+            <a:r>
+              <a:rPr lang="en-US" sz="1050" i="1" dirty="0"/>
+              <a:t>4</a:t>
+            </a:r>
+            <a:r>
+              <a:rPr lang="en-US" sz="1050" i="1" dirty="0" smtClean="0"/>
+              <a:t> neurons</a:t>
+            </a:r>
+            <a:endParaRPr lang="en-US" sz="1050" i="1" dirty="0"/>
+          </a:p>
+        </p:txBody>
+      </p:sp>
+      <p:sp>
+        <p:nvSpPr>
+          <p:cNvPr id="102" name="Right Brace 101"/>
+          <p:cNvSpPr/>
+          <p:nvPr/>
+        </p:nvSpPr>
+        <p:spPr>
+          <a:xfrm>
+            <a:off x="9619719" y="2095416"/>
+            <a:ext cx="176875" cy="1548110"/>
+          </a:xfrm>
+          <a:prstGeom prst="rightBrace">
+            <a:avLst>
+              <a:gd name="adj1" fmla="val 49816"/>
+              <a:gd name="adj2" fmla="val 50000"/>
+            </a:avLst>
+          </a:prstGeom>
+        </p:spPr>
+        <p:style>
+          <a:lnRef idx="1">
+            <a:schemeClr val="accent1"/>
+          </a:lnRef>
+          <a:fillRef idx="0">
+            <a:schemeClr val="accent1"/>
+          </a:fillRef>
+          <a:effectRef idx="0">
+            <a:schemeClr val="accent1"/>
+          </a:effectRef>
+          <a:fontRef idx="minor">
+            <a:schemeClr val="tx1"/>
+          </a:fontRef>
+        </p:style>
+        <p:txBody>
+          <a:bodyPr rtlCol="0" anchor="ctr"/>
+          <a:lstStyle/>
+          <a:p>
+            <a:pPr algn="ctr"/>
+            <a:endParaRPr lang="en-US"/>
+          </a:p>
+        </p:txBody>
+      </p:sp>
+      <p:sp>
+        <p:nvSpPr>
+          <p:cNvPr id="103" name="TextBox 102"/>
+          <p:cNvSpPr txBox="1"/>
+          <p:nvPr/>
+        </p:nvSpPr>
+        <p:spPr>
+          <a:xfrm>
+            <a:off x="9888197" y="4879810"/>
+            <a:ext cx="1395996" cy="461665"/>
+          </a:xfrm>
+          <a:prstGeom prst="rect">
+            <a:avLst/>
+          </a:prstGeom>
+          <a:noFill/>
+        </p:spPr>
+        <p:txBody>
+          <a:bodyPr wrap="square" rtlCol="0">
+            <a:spAutoFit/>
+          </a:bodyPr>
+          <a:lstStyle/>
+          <a:p>
+            <a:r>
+              <a:rPr lang="en-US" sz="1200" dirty="0" smtClean="0"/>
+              <a:t>Word probabilities for position </a:t>
+            </a:r>
+            <a:r>
+              <a:rPr lang="en-US" sz="1200" b="1" dirty="0" smtClean="0"/>
+              <a:t>+2</a:t>
+            </a:r>
+            <a:endParaRPr lang="en-US" sz="1200" b="1" dirty="0"/>
+          </a:p>
+        </p:txBody>
+      </p:sp>
+      <p:sp>
+        <p:nvSpPr>
+          <p:cNvPr id="104" name="Rectangle 103"/>
+          <p:cNvSpPr/>
+          <p:nvPr/>
+        </p:nvSpPr>
+        <p:spPr>
+          <a:xfrm>
+            <a:off x="8941296" y="4373353"/>
+            <a:ext cx="583222" cy="228600"/>
+          </a:xfrm>
+          <a:prstGeom prst="rect">
+            <a:avLst/>
+          </a:prstGeom>
+          <a:noFill/>
+        </p:spPr>
+        <p:style>
+          <a:lnRef idx="2">
+            <a:schemeClr val="accent1">
+              <a:shade val="50000"/>
+            </a:schemeClr>
+          </a:lnRef>
+          <a:fillRef idx="1">
+            <a:schemeClr val="accent1"/>
+          </a:fillRef>
+          <a:effectRef idx="0">
+            <a:schemeClr val="accent1"/>
+          </a:effectRef>
+          <a:fontRef idx="minor">
+            <a:schemeClr val="lt1"/>
+          </a:fontRef>
+        </p:style>
+        <p:txBody>
+          <a:bodyPr rtlCol="0" anchor="ctr"/>
+          <a:lstStyle/>
+          <a:p>
+            <a:pPr algn="ctr"/>
+            <a:r>
+              <a:rPr lang="en-US" sz="1050" dirty="0" smtClean="0">
+                <a:solidFill>
+                  <a:schemeClr val="tx1"/>
+                </a:solidFill>
+              </a:rPr>
+              <a:t>0.0048</a:t>
+            </a:r>
+            <a:endParaRPr lang="en-US" sz="1050" dirty="0">
+              <a:solidFill>
+                <a:schemeClr val="tx1"/>
+              </a:solidFill>
+            </a:endParaRPr>
+          </a:p>
+        </p:txBody>
+      </p:sp>
+      <p:sp>
+        <p:nvSpPr>
+          <p:cNvPr id="105" name="TextBox 104"/>
+          <p:cNvSpPr txBox="1"/>
+          <p:nvPr/>
+        </p:nvSpPr>
+        <p:spPr>
+          <a:xfrm>
+            <a:off x="8763983" y="5928456"/>
+            <a:ext cx="937847" cy="415498"/>
+          </a:xfrm>
+          <a:prstGeom prst="rect">
+            <a:avLst/>
+          </a:prstGeom>
+          <a:noFill/>
+        </p:spPr>
+        <p:txBody>
+          <a:bodyPr wrap="square" rtlCol="0">
+            <a:spAutoFit/>
+          </a:bodyPr>
+          <a:lstStyle/>
+          <a:p>
+            <a:pPr algn="ctr"/>
+            <a:r>
+              <a:rPr lang="en-US" sz="1050" i="1" dirty="0" smtClean="0"/>
+              <a:t>10,000</a:t>
+            </a:r>
+          </a:p>
+          <a:p>
+            <a:pPr algn="ctr"/>
+            <a:r>
+              <a:rPr lang="en-US" sz="1050" i="1" dirty="0" smtClean="0"/>
+              <a:t>positions</a:t>
+            </a:r>
+            <a:endParaRPr lang="en-US" sz="1050" i="1" dirty="0"/>
+          </a:p>
+        </p:txBody>
+      </p:sp>
+      <p:sp>
+        <p:nvSpPr>
+          <p:cNvPr id="106" name="Rectangle 105"/>
+          <p:cNvSpPr/>
+          <p:nvPr/>
+        </p:nvSpPr>
+        <p:spPr>
+          <a:xfrm>
+            <a:off x="8941296" y="4599447"/>
+            <a:ext cx="583222" cy="228600"/>
+          </a:xfrm>
+          <a:prstGeom prst="rect">
+            <a:avLst/>
+          </a:prstGeom>
+          <a:noFill/>
+        </p:spPr>
+        <p:style>
+          <a:lnRef idx="2">
+            <a:schemeClr val="accent1">
+              <a:shade val="50000"/>
+            </a:schemeClr>
+          </a:lnRef>
+          <a:fillRef idx="1">
+            <a:schemeClr val="accent1"/>
+          </a:fillRef>
+          <a:effectRef idx="0">
+            <a:schemeClr val="accent1"/>
+          </a:effectRef>
+          <a:fontRef idx="minor">
+            <a:schemeClr val="lt1"/>
+          </a:fontRef>
+        </p:style>
+        <p:txBody>
+          <a:bodyPr rtlCol="0" anchor="ctr"/>
+          <a:lstStyle/>
+          <a:p>
+            <a:pPr algn="ctr"/>
+            <a:r>
+              <a:rPr lang="en-US" sz="1050" dirty="0" smtClean="0">
+                <a:solidFill>
+                  <a:schemeClr val="tx1"/>
+                </a:solidFill>
+              </a:rPr>
+              <a:t>0.0139</a:t>
+            </a:r>
+            <a:endParaRPr lang="en-US" sz="1050" dirty="0">
+              <a:solidFill>
+                <a:schemeClr val="tx1"/>
+              </a:solidFill>
+            </a:endParaRPr>
+          </a:p>
+        </p:txBody>
+      </p:sp>
+      <p:sp>
+        <p:nvSpPr>
+          <p:cNvPr id="107" name="Rectangle 106"/>
+          <p:cNvSpPr/>
+          <p:nvPr/>
+        </p:nvSpPr>
+        <p:spPr>
+          <a:xfrm>
+            <a:off x="8941296" y="4825541"/>
+            <a:ext cx="583222" cy="228600"/>
+          </a:xfrm>
+          <a:prstGeom prst="rect">
+            <a:avLst/>
+          </a:prstGeom>
+          <a:noFill/>
+        </p:spPr>
+        <p:style>
+          <a:lnRef idx="2">
+            <a:schemeClr val="accent1">
+              <a:shade val="50000"/>
+            </a:schemeClr>
+          </a:lnRef>
+          <a:fillRef idx="1">
+            <a:schemeClr val="accent1"/>
+          </a:fillRef>
+          <a:effectRef idx="0">
+            <a:schemeClr val="accent1"/>
+          </a:effectRef>
+          <a:fontRef idx="minor">
+            <a:schemeClr val="lt1"/>
+          </a:fontRef>
+        </p:style>
+        <p:txBody>
+          <a:bodyPr rtlCol="0" anchor="ctr"/>
+          <a:lstStyle/>
+          <a:p>
+            <a:pPr algn="ctr"/>
+            <a:r>
+              <a:rPr lang="en-US" sz="1050" dirty="0" smtClean="0">
+                <a:solidFill>
+                  <a:schemeClr val="tx1"/>
+                </a:solidFill>
+              </a:rPr>
+              <a:t>0.0001</a:t>
+            </a:r>
+            <a:endParaRPr lang="en-US" sz="1050" dirty="0">
+              <a:solidFill>
+                <a:schemeClr val="tx1"/>
+              </a:solidFill>
+            </a:endParaRPr>
+          </a:p>
+        </p:txBody>
+      </p:sp>
+      <p:sp>
+        <p:nvSpPr>
+          <p:cNvPr id="108" name="Rectangle 107"/>
+          <p:cNvSpPr/>
+          <p:nvPr/>
+        </p:nvSpPr>
+        <p:spPr>
+          <a:xfrm>
+            <a:off x="8941296" y="5051634"/>
+            <a:ext cx="583222" cy="228600"/>
+          </a:xfrm>
+          <a:prstGeom prst="rect">
+            <a:avLst/>
+          </a:prstGeom>
+          <a:noFill/>
+        </p:spPr>
+        <p:style>
+          <a:lnRef idx="2">
+            <a:schemeClr val="accent1">
+              <a:shade val="50000"/>
+            </a:schemeClr>
+          </a:lnRef>
+          <a:fillRef idx="1">
+            <a:schemeClr val="accent1"/>
+          </a:fillRef>
+          <a:effectRef idx="0">
+            <a:schemeClr val="accent1"/>
+          </a:effectRef>
+          <a:fontRef idx="minor">
+            <a:schemeClr val="lt1"/>
+          </a:fontRef>
+        </p:style>
+        <p:txBody>
+          <a:bodyPr rtlCol="0" anchor="ctr"/>
+          <a:lstStyle/>
+          <a:p>
+            <a:pPr algn="ctr"/>
+            <a:r>
+              <a:rPr lang="en-US" sz="1050" dirty="0" smtClean="0">
+                <a:solidFill>
+                  <a:schemeClr val="tx1"/>
+                </a:solidFill>
+              </a:rPr>
+              <a:t>0.0076</a:t>
+            </a:r>
+            <a:endParaRPr lang="en-US" sz="1050" dirty="0">
+              <a:solidFill>
+                <a:schemeClr val="tx1"/>
+              </a:solidFill>
+            </a:endParaRPr>
+          </a:p>
+        </p:txBody>
+      </p:sp>
+      <p:sp>
+        <p:nvSpPr>
+          <p:cNvPr id="109" name="Rectangle 108"/>
+          <p:cNvSpPr/>
+          <p:nvPr/>
+        </p:nvSpPr>
+        <p:spPr>
+          <a:xfrm>
+            <a:off x="8946038" y="5665673"/>
+            <a:ext cx="583222" cy="228600"/>
+          </a:xfrm>
+          <a:prstGeom prst="rect">
+            <a:avLst/>
+          </a:prstGeom>
+          <a:noFill/>
+        </p:spPr>
+        <p:style>
+          <a:lnRef idx="2">
+            <a:schemeClr val="accent1">
+              <a:shade val="50000"/>
+            </a:schemeClr>
+          </a:lnRef>
+          <a:fillRef idx="1">
+            <a:schemeClr val="accent1"/>
+          </a:fillRef>
+          <a:effectRef idx="0">
+            <a:schemeClr val="accent1"/>
+          </a:effectRef>
+          <a:fontRef idx="minor">
+            <a:schemeClr val="lt1"/>
+          </a:fontRef>
+        </p:style>
+        <p:txBody>
+          <a:bodyPr rtlCol="0" anchor="ctr"/>
+          <a:lstStyle/>
+          <a:p>
+            <a:pPr algn="ctr"/>
+            <a:r>
+              <a:rPr lang="en-US" sz="1050" dirty="0" smtClean="0">
+                <a:solidFill>
+                  <a:schemeClr val="tx1"/>
+                </a:solidFill>
+              </a:rPr>
+              <a:t>0.0482</a:t>
+            </a:r>
+            <a:endParaRPr lang="en-US" sz="1050" dirty="0">
+              <a:solidFill>
+                <a:schemeClr val="tx1"/>
+              </a:solidFill>
+            </a:endParaRPr>
+          </a:p>
+        </p:txBody>
+      </p:sp>
+      <p:cxnSp>
+        <p:nvCxnSpPr>
+          <p:cNvPr id="110" name="Straight Connector 109"/>
+          <p:cNvCxnSpPr/>
+          <p:nvPr/>
+        </p:nvCxnSpPr>
+        <p:spPr>
+          <a:xfrm>
+            <a:off x="9235208" y="5340699"/>
+            <a:ext cx="1" cy="266700"/>
+          </a:xfrm>
+          <a:prstGeom prst="line">
+            <a:avLst/>
+          </a:prstGeom>
+          <a:ln>
+            <a:prstDash val="dash"/>
+          </a:ln>
+        </p:spPr>
+        <p:style>
+          <a:lnRef idx="1">
+            <a:schemeClr val="accent1"/>
+          </a:lnRef>
+          <a:fillRef idx="0">
+            <a:schemeClr val="accent1"/>
+          </a:fillRef>
+          <a:effectRef idx="0">
+            <a:schemeClr val="accent1"/>
+          </a:effectRef>
+          <a:fontRef idx="minor">
+            <a:schemeClr val="tx1"/>
+          </a:fontRef>
+        </p:style>
+      </p:cxnSp>
+      <p:sp>
+        <p:nvSpPr>
+          <p:cNvPr id="111" name="Right Brace 110"/>
+          <p:cNvSpPr/>
+          <p:nvPr/>
+        </p:nvSpPr>
+        <p:spPr>
+          <a:xfrm>
+            <a:off x="9635349" y="4352691"/>
+            <a:ext cx="176875" cy="1548110"/>
+          </a:xfrm>
+          <a:prstGeom prst="rightBrace">
+            <a:avLst>
+              <a:gd name="adj1" fmla="val 49816"/>
+              <a:gd name="adj2" fmla="val 50000"/>
+            </a:avLst>
+          </a:prstGeom>
+        </p:spPr>
+        <p:style>
+          <a:lnRef idx="1">
+            <a:schemeClr val="accent1"/>
+          </a:lnRef>
+          <a:fillRef idx="0">
+            <a:schemeClr val="accent1"/>
+          </a:fillRef>
+          <a:effectRef idx="0">
+            <a:schemeClr val="accent1"/>
+          </a:effectRef>
+          <a:fontRef idx="minor">
+            <a:schemeClr val="tx1"/>
+          </a:fontRef>
+        </p:style>
+        <p:txBody>
+          <a:bodyPr rtlCol="0" anchor="ctr"/>
+          <a:lstStyle/>
+          <a:p>
+            <a:pPr algn="ctr"/>
+            <a:endParaRPr lang="en-US"/>
+          </a:p>
+        </p:txBody>
+      </p:sp>
+      <p:cxnSp>
+        <p:nvCxnSpPr>
+          <p:cNvPr id="21" name="Straight Arrow Connector 20"/>
+          <p:cNvCxnSpPr/>
+          <p:nvPr/>
+        </p:nvCxnSpPr>
+        <p:spPr>
+          <a:xfrm>
+            <a:off x="2275252" y="4185433"/>
+            <a:ext cx="251055" cy="0"/>
+          </a:xfrm>
+          <a:prstGeom prst="straightConnector1">
+            <a:avLst/>
+          </a:prstGeom>
+          <a:ln>
+            <a:tailEnd type="triangle"/>
+          </a:ln>
+        </p:spPr>
+        <p:style>
+          <a:lnRef idx="3">
+            <a:schemeClr val="accent2"/>
+          </a:lnRef>
+          <a:fillRef idx="0">
+            <a:schemeClr val="accent2"/>
+          </a:fillRef>
+          <a:effectRef idx="2">
+            <a:schemeClr val="accent2"/>
+          </a:effectRef>
+          <a:fontRef idx="minor">
+            <a:schemeClr val="tx1"/>
+          </a:fontRef>
+        </p:style>
+      </p:cxnSp>
+      <p:sp>
+        <p:nvSpPr>
+          <p:cNvPr id="64" name="TextBox 63"/>
+          <p:cNvSpPr txBox="1"/>
+          <p:nvPr/>
+        </p:nvSpPr>
+        <p:spPr>
+          <a:xfrm>
+            <a:off x="262596" y="118396"/>
+            <a:ext cx="11120930" cy="646331"/>
+          </a:xfrm>
+          <a:prstGeom prst="rect">
+            <a:avLst/>
+          </a:prstGeom>
+          <a:noFill/>
+        </p:spPr>
+        <p:txBody>
+          <a:bodyPr wrap="none" rtlCol="0">
+            <a:spAutoFit/>
+          </a:bodyPr>
+          <a:lstStyle/>
+          <a:p>
+            <a:r>
+              <a:rPr lang="en-US" sz="3600" dirty="0" smtClean="0"/>
+              <a:t>Skip gram neural network architecture – </a:t>
+            </a:r>
+            <a:r>
+              <a:rPr lang="en-US" sz="3600" dirty="0" smtClean="0">
+                <a:solidFill>
+                  <a:srgbClr val="FF0000"/>
+                </a:solidFill>
+              </a:rPr>
+              <a:t>OLD / INCORRECT</a:t>
+            </a:r>
+            <a:endParaRPr lang="en-US" sz="3600" dirty="0">
+              <a:solidFill>
+                <a:srgbClr val="FF0000"/>
+              </a:solidFill>
+            </a:endParaRPr>
+          </a:p>
+        </p:txBody>
+      </p:sp>
+    </p:spTree>
+    <p:extLst>
+      <p:ext uri="{BB962C8B-B14F-4D97-AF65-F5344CB8AC3E}">
+        <p14:creationId xmlns:p14="http://schemas.microsoft.com/office/powerpoint/2010/main" val="2878863945"/>
+      </p:ext>
+    </p:extLst>
+  </p:cSld>
+  <p:clrMapOvr>
+    <a:masterClrMapping/>
+  </p:clrMapOvr>
+</p:sld>
+</file>
+
+<file path=ppt/slides/slide3.xml><?xml version="1.0" encoding="utf-8"?>
+<p:sld xmlns:a="http://schemas.openxmlformats.org/drawingml/2006/main" xmlns:r="http://schemas.openxmlformats.org/officeDocument/2006/relationships" xmlns:p="http://schemas.openxmlformats.org/presentationml/2006/main">
+  <p:cSld>
+    <p:spTree>
+      <p:nvGrpSpPr>
+        <p:cNvPr id="1" name=""/>
+        <p:cNvGrpSpPr/>
+        <p:nvPr/>
+      </p:nvGrpSpPr>
+      <p:grpSpPr>
+        <a:xfrm>
+          <a:off x="0" y="0"/>
+          <a:ext cx="0" cy="0"/>
+          <a:chOff x="0" y="0"/>
+          <a:chExt cx="0" cy="0"/>
+        </a:xfrm>
+      </p:grpSpPr>
+      <p:sp>
+        <p:nvSpPr>
           <p:cNvPr id="15" name="TextBox 14"/>
           <p:cNvSpPr txBox="1"/>
           <p:nvPr/>
@@ -7411,7 +9382,7 @@
 </p:sld>
 </file>
 
-<file path=ppt/slides/slide3.xml><?xml version="1.0" encoding="utf-8"?>
+<file path=ppt/slides/slide4.xml><?xml version="1.0" encoding="utf-8"?>
 <p:sld xmlns:a="http://schemas.openxmlformats.org/drawingml/2006/main" xmlns:r="http://schemas.openxmlformats.org/officeDocument/2006/relationships" xmlns:p="http://schemas.openxmlformats.org/presentationml/2006/main">
   <p:cSld>
     <p:spTree>
@@ -7973,7 +9944,7 @@
 </p:sld>
 </file>
 
-<file path=ppt/slides/slide4.xml><?xml version="1.0" encoding="utf-8"?>
+<file path=ppt/slides/slide5.xml><?xml version="1.0" encoding="utf-8"?>
 <p:sld xmlns:a="http://schemas.openxmlformats.org/drawingml/2006/main" xmlns:r="http://schemas.openxmlformats.org/officeDocument/2006/relationships" xmlns:p="http://schemas.openxmlformats.org/presentationml/2006/main">
   <p:cSld>
     <p:spTree>

</xml_diff>